<commit_message>
completed Task 3: Presentatio based on findings
</commit_message>
<xml_diff>
--- a/submissibles/Task 3 - PowerPoint Presentation (based on findings).pptx
+++ b/submissibles/Task 3 - PowerPoint Presentation (based on findings).pptx
@@ -4,8 +4,19 @@
   <p:sldMasterIdLst>
     <p:sldMasterId id="2147483648" r:id="rId1"/>
   </p:sldMasterIdLst>
+  <p:notesMasterIdLst>
+    <p:notesMasterId r:id="rId11"/>
+  </p:notesMasterIdLst>
   <p:sldIdLst>
     <p:sldId id="256" r:id="rId2"/>
+    <p:sldId id="257" r:id="rId3"/>
+    <p:sldId id="259" r:id="rId4"/>
+    <p:sldId id="260" r:id="rId5"/>
+    <p:sldId id="261" r:id="rId6"/>
+    <p:sldId id="262" r:id="rId7"/>
+    <p:sldId id="264" r:id="rId8"/>
+    <p:sldId id="265" r:id="rId9"/>
+    <p:sldId id="266" r:id="rId10"/>
   </p:sldIdLst>
   <p:sldSz cx="12192000" cy="6858000"/>
   <p:notesSz cx="6858000" cy="9144000"/>
@@ -105,6 +116,1124 @@
     </a:lvl9pPr>
   </p:defaultTextStyle>
 </p:presentation>
+</file>
+
+<file path=ppt/notesMasters/notesMaster1.xml><?xml version="1.0" encoding="utf-8"?>
+<p:notesMaster xmlns:a="http://schemas.openxmlformats.org/drawingml/2006/main" xmlns:r="http://schemas.openxmlformats.org/officeDocument/2006/relationships" xmlns:p="http://schemas.openxmlformats.org/presentationml/2006/main">
+  <p:cSld>
+    <p:bg>
+      <p:bgRef idx="1001">
+        <a:schemeClr val="bg1"/>
+      </p:bgRef>
+    </p:bg>
+    <p:spTree>
+      <p:nvGrpSpPr>
+        <p:cNvPr id="1" name=""/>
+        <p:cNvGrpSpPr/>
+        <p:nvPr/>
+      </p:nvGrpSpPr>
+      <p:grpSpPr>
+        <a:xfrm>
+          <a:off x="0" y="0"/>
+          <a:ext cx="0" cy="0"/>
+          <a:chOff x="0" y="0"/>
+          <a:chExt cx="0" cy="0"/>
+        </a:xfrm>
+      </p:grpSpPr>
+      <p:sp>
+        <p:nvSpPr>
+          <p:cNvPr id="2" name="Header Placeholder 1"/>
+          <p:cNvSpPr>
+            <a:spLocks noGrp="1"/>
+          </p:cNvSpPr>
+          <p:nvPr>
+            <p:ph type="hdr" sz="quarter"/>
+          </p:nvPr>
+        </p:nvSpPr>
+        <p:spPr>
+          <a:xfrm>
+            <a:off x="0" y="0"/>
+            <a:ext cx="2971800" cy="458788"/>
+          </a:xfrm>
+          <a:prstGeom prst="rect">
+            <a:avLst/>
+          </a:prstGeom>
+        </p:spPr>
+        <p:txBody>
+          <a:bodyPr vert="horz" lIns="91440" tIns="45720" rIns="91440" bIns="45720" rtlCol="0"/>
+          <a:lstStyle>
+            <a:lvl1pPr algn="l">
+              <a:defRPr sz="1200"/>
+            </a:lvl1pPr>
+          </a:lstStyle>
+          <a:p>
+            <a:endParaRPr lang="en-GB"/>
+          </a:p>
+        </p:txBody>
+      </p:sp>
+      <p:sp>
+        <p:nvSpPr>
+          <p:cNvPr id="3" name="Date Placeholder 2"/>
+          <p:cNvSpPr>
+            <a:spLocks noGrp="1"/>
+          </p:cNvSpPr>
+          <p:nvPr>
+            <p:ph type="dt" idx="1"/>
+          </p:nvPr>
+        </p:nvSpPr>
+        <p:spPr>
+          <a:xfrm>
+            <a:off x="3884613" y="0"/>
+            <a:ext cx="2971800" cy="458788"/>
+          </a:xfrm>
+          <a:prstGeom prst="rect">
+            <a:avLst/>
+          </a:prstGeom>
+        </p:spPr>
+        <p:txBody>
+          <a:bodyPr vert="horz" lIns="91440" tIns="45720" rIns="91440" bIns="45720" rtlCol="0"/>
+          <a:lstStyle>
+            <a:lvl1pPr algn="r">
+              <a:defRPr sz="1200"/>
+            </a:lvl1pPr>
+          </a:lstStyle>
+          <a:p>
+            <a:fld id="{9E9BC88A-B747-45AC-8C98-E540F3CDB3AC}" type="datetimeFigureOut">
+              <a:rPr lang="en-GB" smtClean="0"/>
+              <a:t>21/06/2025</a:t>
+            </a:fld>
+            <a:endParaRPr lang="en-GB"/>
+          </a:p>
+        </p:txBody>
+      </p:sp>
+      <p:sp>
+        <p:nvSpPr>
+          <p:cNvPr id="4" name="Slide Image Placeholder 3"/>
+          <p:cNvSpPr>
+            <a:spLocks noGrp="1" noRot="1" noChangeAspect="1"/>
+          </p:cNvSpPr>
+          <p:nvPr>
+            <p:ph type="sldImg" idx="2"/>
+          </p:nvPr>
+        </p:nvSpPr>
+        <p:spPr>
+          <a:xfrm>
+            <a:off x="685800" y="1143000"/>
+            <a:ext cx="5486400" cy="3086100"/>
+          </a:xfrm>
+          <a:prstGeom prst="rect">
+            <a:avLst/>
+          </a:prstGeom>
+          <a:noFill/>
+          <a:ln w="12700">
+            <a:solidFill>
+              <a:prstClr val="black"/>
+            </a:solidFill>
+          </a:ln>
+        </p:spPr>
+        <p:txBody>
+          <a:bodyPr vert="horz" lIns="91440" tIns="45720" rIns="91440" bIns="45720" rtlCol="0" anchor="ctr"/>
+          <a:lstStyle/>
+          <a:p>
+            <a:endParaRPr lang="en-GB"/>
+          </a:p>
+        </p:txBody>
+      </p:sp>
+      <p:sp>
+        <p:nvSpPr>
+          <p:cNvPr id="5" name="Notes Placeholder 4"/>
+          <p:cNvSpPr>
+            <a:spLocks noGrp="1"/>
+          </p:cNvSpPr>
+          <p:nvPr>
+            <p:ph type="body" sz="quarter" idx="3"/>
+          </p:nvPr>
+        </p:nvSpPr>
+        <p:spPr>
+          <a:xfrm>
+            <a:off x="685800" y="4400550"/>
+            <a:ext cx="5486400" cy="3600450"/>
+          </a:xfrm>
+          <a:prstGeom prst="rect">
+            <a:avLst/>
+          </a:prstGeom>
+        </p:spPr>
+        <p:txBody>
+          <a:bodyPr vert="horz" lIns="91440" tIns="45720" rIns="91440" bIns="45720" rtlCol="0"/>
+          <a:lstStyle/>
+          <a:p>
+            <a:pPr lvl="0"/>
+            <a:r>
+              <a:rPr lang="en-US"/>
+              <a:t>Click to edit Master text styles</a:t>
+            </a:r>
+          </a:p>
+          <a:p>
+            <a:pPr lvl="1"/>
+            <a:r>
+              <a:rPr lang="en-US"/>
+              <a:t>Second level</a:t>
+            </a:r>
+          </a:p>
+          <a:p>
+            <a:pPr lvl="2"/>
+            <a:r>
+              <a:rPr lang="en-US"/>
+              <a:t>Third level</a:t>
+            </a:r>
+          </a:p>
+          <a:p>
+            <a:pPr lvl="3"/>
+            <a:r>
+              <a:rPr lang="en-US"/>
+              <a:t>Fourth level</a:t>
+            </a:r>
+          </a:p>
+          <a:p>
+            <a:pPr lvl="4"/>
+            <a:r>
+              <a:rPr lang="en-US"/>
+              <a:t>Fifth level</a:t>
+            </a:r>
+            <a:endParaRPr lang="en-GB"/>
+          </a:p>
+        </p:txBody>
+      </p:sp>
+      <p:sp>
+        <p:nvSpPr>
+          <p:cNvPr id="6" name="Footer Placeholder 5"/>
+          <p:cNvSpPr>
+            <a:spLocks noGrp="1"/>
+          </p:cNvSpPr>
+          <p:nvPr>
+            <p:ph type="ftr" sz="quarter" idx="4"/>
+          </p:nvPr>
+        </p:nvSpPr>
+        <p:spPr>
+          <a:xfrm>
+            <a:off x="0" y="8685213"/>
+            <a:ext cx="2971800" cy="458787"/>
+          </a:xfrm>
+          <a:prstGeom prst="rect">
+            <a:avLst/>
+          </a:prstGeom>
+        </p:spPr>
+        <p:txBody>
+          <a:bodyPr vert="horz" lIns="91440" tIns="45720" rIns="91440" bIns="45720" rtlCol="0" anchor="b"/>
+          <a:lstStyle>
+            <a:lvl1pPr algn="l">
+              <a:defRPr sz="1200"/>
+            </a:lvl1pPr>
+          </a:lstStyle>
+          <a:p>
+            <a:endParaRPr lang="en-GB"/>
+          </a:p>
+        </p:txBody>
+      </p:sp>
+      <p:sp>
+        <p:nvSpPr>
+          <p:cNvPr id="7" name="Slide Number Placeholder 6"/>
+          <p:cNvSpPr>
+            <a:spLocks noGrp="1"/>
+          </p:cNvSpPr>
+          <p:nvPr>
+            <p:ph type="sldNum" sz="quarter" idx="5"/>
+          </p:nvPr>
+        </p:nvSpPr>
+        <p:spPr>
+          <a:xfrm>
+            <a:off x="3884613" y="8685213"/>
+            <a:ext cx="2971800" cy="458787"/>
+          </a:xfrm>
+          <a:prstGeom prst="rect">
+            <a:avLst/>
+          </a:prstGeom>
+        </p:spPr>
+        <p:txBody>
+          <a:bodyPr vert="horz" lIns="91440" tIns="45720" rIns="91440" bIns="45720" rtlCol="0" anchor="b"/>
+          <a:lstStyle>
+            <a:lvl1pPr algn="r">
+              <a:defRPr sz="1200"/>
+            </a:lvl1pPr>
+          </a:lstStyle>
+          <a:p>
+            <a:fld id="{43932783-590D-41BD-A55F-0A9D2258B8B1}" type="slidenum">
+              <a:rPr lang="en-GB" smtClean="0"/>
+              <a:t>‹#›</a:t>
+            </a:fld>
+            <a:endParaRPr lang="en-GB"/>
+          </a:p>
+        </p:txBody>
+      </p:sp>
+    </p:spTree>
+    <p:extLst>
+      <p:ext uri="{BB962C8B-B14F-4D97-AF65-F5344CB8AC3E}">
+        <p14:creationId xmlns:p14="http://schemas.microsoft.com/office/powerpoint/2010/main" val="2350914108"/>
+      </p:ext>
+    </p:extLst>
+  </p:cSld>
+  <p:clrMap bg1="lt1" tx1="dk1" bg2="lt2" tx2="dk2" accent1="accent1" accent2="accent2" accent3="accent3" accent4="accent4" accent5="accent5" accent6="accent6" hlink="hlink" folHlink="folHlink"/>
+  <p:notesStyle>
+    <a:lvl1pPr marL="0" algn="l" defTabSz="914400" rtl="0" eaLnBrk="1" latinLnBrk="0" hangingPunct="1">
+      <a:defRPr sz="1200" kern="1200">
+        <a:solidFill>
+          <a:schemeClr val="tx1"/>
+        </a:solidFill>
+        <a:latin typeface="+mn-lt"/>
+        <a:ea typeface="+mn-ea"/>
+        <a:cs typeface="+mn-cs"/>
+      </a:defRPr>
+    </a:lvl1pPr>
+    <a:lvl2pPr marL="457200" algn="l" defTabSz="914400" rtl="0" eaLnBrk="1" latinLnBrk="0" hangingPunct="1">
+      <a:defRPr sz="1200" kern="1200">
+        <a:solidFill>
+          <a:schemeClr val="tx1"/>
+        </a:solidFill>
+        <a:latin typeface="+mn-lt"/>
+        <a:ea typeface="+mn-ea"/>
+        <a:cs typeface="+mn-cs"/>
+      </a:defRPr>
+    </a:lvl2pPr>
+    <a:lvl3pPr marL="914400" algn="l" defTabSz="914400" rtl="0" eaLnBrk="1" latinLnBrk="0" hangingPunct="1">
+      <a:defRPr sz="1200" kern="1200">
+        <a:solidFill>
+          <a:schemeClr val="tx1"/>
+        </a:solidFill>
+        <a:latin typeface="+mn-lt"/>
+        <a:ea typeface="+mn-ea"/>
+        <a:cs typeface="+mn-cs"/>
+      </a:defRPr>
+    </a:lvl3pPr>
+    <a:lvl4pPr marL="1371600" algn="l" defTabSz="914400" rtl="0" eaLnBrk="1" latinLnBrk="0" hangingPunct="1">
+      <a:defRPr sz="1200" kern="1200">
+        <a:solidFill>
+          <a:schemeClr val="tx1"/>
+        </a:solidFill>
+        <a:latin typeface="+mn-lt"/>
+        <a:ea typeface="+mn-ea"/>
+        <a:cs typeface="+mn-cs"/>
+      </a:defRPr>
+    </a:lvl4pPr>
+    <a:lvl5pPr marL="1828800" algn="l" defTabSz="914400" rtl="0" eaLnBrk="1" latinLnBrk="0" hangingPunct="1">
+      <a:defRPr sz="1200" kern="1200">
+        <a:solidFill>
+          <a:schemeClr val="tx1"/>
+        </a:solidFill>
+        <a:latin typeface="+mn-lt"/>
+        <a:ea typeface="+mn-ea"/>
+        <a:cs typeface="+mn-cs"/>
+      </a:defRPr>
+    </a:lvl5pPr>
+    <a:lvl6pPr marL="2286000" algn="l" defTabSz="914400" rtl="0" eaLnBrk="1" latinLnBrk="0" hangingPunct="1">
+      <a:defRPr sz="1200" kern="1200">
+        <a:solidFill>
+          <a:schemeClr val="tx1"/>
+        </a:solidFill>
+        <a:latin typeface="+mn-lt"/>
+        <a:ea typeface="+mn-ea"/>
+        <a:cs typeface="+mn-cs"/>
+      </a:defRPr>
+    </a:lvl6pPr>
+    <a:lvl7pPr marL="2743200" algn="l" defTabSz="914400" rtl="0" eaLnBrk="1" latinLnBrk="0" hangingPunct="1">
+      <a:defRPr sz="1200" kern="1200">
+        <a:solidFill>
+          <a:schemeClr val="tx1"/>
+        </a:solidFill>
+        <a:latin typeface="+mn-lt"/>
+        <a:ea typeface="+mn-ea"/>
+        <a:cs typeface="+mn-cs"/>
+      </a:defRPr>
+    </a:lvl7pPr>
+    <a:lvl8pPr marL="3200400" algn="l" defTabSz="914400" rtl="0" eaLnBrk="1" latinLnBrk="0" hangingPunct="1">
+      <a:defRPr sz="1200" kern="1200">
+        <a:solidFill>
+          <a:schemeClr val="tx1"/>
+        </a:solidFill>
+        <a:latin typeface="+mn-lt"/>
+        <a:ea typeface="+mn-ea"/>
+        <a:cs typeface="+mn-cs"/>
+      </a:defRPr>
+    </a:lvl8pPr>
+    <a:lvl9pPr marL="3657600" algn="l" defTabSz="914400" rtl="0" eaLnBrk="1" latinLnBrk="0" hangingPunct="1">
+      <a:defRPr sz="1200" kern="1200">
+        <a:solidFill>
+          <a:schemeClr val="tx1"/>
+        </a:solidFill>
+        <a:latin typeface="+mn-lt"/>
+        <a:ea typeface="+mn-ea"/>
+        <a:cs typeface="+mn-cs"/>
+      </a:defRPr>
+    </a:lvl9pPr>
+  </p:notesStyle>
+</p:notesMaster>
+</file>
+
+<file path=ppt/notesSlides/notesSlide1.xml><?xml version="1.0" encoding="utf-8"?>
+<p:notes xmlns:a="http://schemas.openxmlformats.org/drawingml/2006/main" xmlns:r="http://schemas.openxmlformats.org/officeDocument/2006/relationships" xmlns:p="http://schemas.openxmlformats.org/presentationml/2006/main">
+  <p:cSld>
+    <p:spTree>
+      <p:nvGrpSpPr>
+        <p:cNvPr id="1" name=""/>
+        <p:cNvGrpSpPr/>
+        <p:nvPr/>
+      </p:nvGrpSpPr>
+      <p:grpSpPr>
+        <a:xfrm>
+          <a:off x="0" y="0"/>
+          <a:ext cx="0" cy="0"/>
+          <a:chOff x="0" y="0"/>
+          <a:chExt cx="0" cy="0"/>
+        </a:xfrm>
+      </p:grpSpPr>
+      <p:sp>
+        <p:nvSpPr>
+          <p:cNvPr id="2" name="Slide Image Placeholder 1"/>
+          <p:cNvSpPr>
+            <a:spLocks noGrp="1" noRot="1" noChangeAspect="1"/>
+          </p:cNvSpPr>
+          <p:nvPr>
+            <p:ph type="sldImg"/>
+          </p:nvPr>
+        </p:nvSpPr>
+        <p:spPr/>
+      </p:sp>
+      <p:sp>
+        <p:nvSpPr>
+          <p:cNvPr id="3" name="Notes Placeholder 2"/>
+          <p:cNvSpPr>
+            <a:spLocks noGrp="1"/>
+          </p:cNvSpPr>
+          <p:nvPr>
+            <p:ph type="body" idx="1"/>
+          </p:nvPr>
+        </p:nvSpPr>
+        <p:spPr/>
+        <p:txBody>
+          <a:bodyPr/>
+          <a:lstStyle/>
+          <a:p>
+            <a:r>
+              <a:rPr lang="en-US" dirty="0"/>
+              <a:t>Emotional </a:t>
+            </a:r>
+            <a:r>
+              <a:rPr lang="en-US" dirty="0" err="1"/>
+              <a:t>labour</a:t>
+            </a:r>
+            <a:r>
+              <a:rPr lang="en-US" dirty="0"/>
+              <a:t> was a recurring burden for HCAs, worsened by limited recognition and mental health resources. The cumulative pressure affects performance and long-term retention.</a:t>
+            </a:r>
+            <a:endParaRPr lang="en-GB" dirty="0"/>
+          </a:p>
+        </p:txBody>
+      </p:sp>
+      <p:sp>
+        <p:nvSpPr>
+          <p:cNvPr id="4" name="Slide Number Placeholder 3"/>
+          <p:cNvSpPr>
+            <a:spLocks noGrp="1"/>
+          </p:cNvSpPr>
+          <p:nvPr>
+            <p:ph type="sldNum" sz="quarter" idx="5"/>
+          </p:nvPr>
+        </p:nvSpPr>
+        <p:spPr/>
+        <p:txBody>
+          <a:bodyPr/>
+          <a:lstStyle/>
+          <a:p>
+            <a:fld id="{43932783-590D-41BD-A55F-0A9D2258B8B1}" type="slidenum">
+              <a:rPr lang="en-GB" smtClean="0"/>
+              <a:t>3</a:t>
+            </a:fld>
+            <a:endParaRPr lang="en-GB"/>
+          </a:p>
+        </p:txBody>
+      </p:sp>
+    </p:spTree>
+    <p:extLst>
+      <p:ext uri="{BB962C8B-B14F-4D97-AF65-F5344CB8AC3E}">
+        <p14:creationId xmlns:p14="http://schemas.microsoft.com/office/powerpoint/2010/main" val="3081987125"/>
+      </p:ext>
+    </p:extLst>
+  </p:cSld>
+  <p:clrMapOvr>
+    <a:masterClrMapping/>
+  </p:clrMapOvr>
+</p:notes>
+</file>
+
+<file path=ppt/notesSlides/notesSlide2.xml><?xml version="1.0" encoding="utf-8"?>
+<p:notes xmlns:a="http://schemas.openxmlformats.org/drawingml/2006/main" xmlns:r="http://schemas.openxmlformats.org/officeDocument/2006/relationships" xmlns:p="http://schemas.openxmlformats.org/presentationml/2006/main">
+  <p:cSld>
+    <p:spTree>
+      <p:nvGrpSpPr>
+        <p:cNvPr id="1" name=""/>
+        <p:cNvGrpSpPr/>
+        <p:nvPr/>
+      </p:nvGrpSpPr>
+      <p:grpSpPr>
+        <a:xfrm>
+          <a:off x="0" y="0"/>
+          <a:ext cx="0" cy="0"/>
+          <a:chOff x="0" y="0"/>
+          <a:chExt cx="0" cy="0"/>
+        </a:xfrm>
+      </p:grpSpPr>
+      <p:sp>
+        <p:nvSpPr>
+          <p:cNvPr id="2" name="Slide Image Placeholder 1"/>
+          <p:cNvSpPr>
+            <a:spLocks noGrp="1" noRot="1" noChangeAspect="1"/>
+          </p:cNvSpPr>
+          <p:nvPr>
+            <p:ph type="sldImg"/>
+          </p:nvPr>
+        </p:nvSpPr>
+        <p:spPr/>
+      </p:sp>
+      <p:sp>
+        <p:nvSpPr>
+          <p:cNvPr id="3" name="Notes Placeholder 2"/>
+          <p:cNvSpPr>
+            <a:spLocks noGrp="1"/>
+          </p:cNvSpPr>
+          <p:nvPr>
+            <p:ph type="body" idx="1"/>
+          </p:nvPr>
+        </p:nvSpPr>
+        <p:spPr/>
+        <p:txBody>
+          <a:bodyPr/>
+          <a:lstStyle/>
+          <a:p>
+            <a:r>
+              <a:rPr lang="en-US" dirty="0"/>
+              <a:t>Emotional </a:t>
+            </a:r>
+            <a:r>
+              <a:rPr lang="en-US" dirty="0" err="1"/>
+              <a:t>labour</a:t>
+            </a:r>
+            <a:r>
+              <a:rPr lang="en-US" dirty="0"/>
+              <a:t> was a recurring burden for HCAs, worsened by limited recognition and mental health resources. The cumulative pressure affects performance and long-term retention.</a:t>
+            </a:r>
+            <a:endParaRPr lang="en-GB" dirty="0"/>
+          </a:p>
+        </p:txBody>
+      </p:sp>
+      <p:sp>
+        <p:nvSpPr>
+          <p:cNvPr id="4" name="Slide Number Placeholder 3"/>
+          <p:cNvSpPr>
+            <a:spLocks noGrp="1"/>
+          </p:cNvSpPr>
+          <p:nvPr>
+            <p:ph type="sldNum" sz="quarter" idx="5"/>
+          </p:nvPr>
+        </p:nvSpPr>
+        <p:spPr/>
+        <p:txBody>
+          <a:bodyPr/>
+          <a:lstStyle/>
+          <a:p>
+            <a:fld id="{43932783-590D-41BD-A55F-0A9D2258B8B1}" type="slidenum">
+              <a:rPr lang="en-GB" smtClean="0"/>
+              <a:t>4</a:t>
+            </a:fld>
+            <a:endParaRPr lang="en-GB"/>
+          </a:p>
+        </p:txBody>
+      </p:sp>
+    </p:spTree>
+    <p:extLst>
+      <p:ext uri="{BB962C8B-B14F-4D97-AF65-F5344CB8AC3E}">
+        <p14:creationId xmlns:p14="http://schemas.microsoft.com/office/powerpoint/2010/main" val="2947997011"/>
+      </p:ext>
+    </p:extLst>
+  </p:cSld>
+  <p:clrMapOvr>
+    <a:masterClrMapping/>
+  </p:clrMapOvr>
+</p:notes>
+</file>
+
+<file path=ppt/notesSlides/notesSlide3.xml><?xml version="1.0" encoding="utf-8"?>
+<p:notes xmlns:a="http://schemas.openxmlformats.org/drawingml/2006/main" xmlns:r="http://schemas.openxmlformats.org/officeDocument/2006/relationships" xmlns:p="http://schemas.openxmlformats.org/presentationml/2006/main">
+  <p:cSld>
+    <p:spTree>
+      <p:nvGrpSpPr>
+        <p:cNvPr id="1" name="">
+          <a:extLst>
+            <a:ext uri="{FF2B5EF4-FFF2-40B4-BE49-F238E27FC236}">
+              <a16:creationId xmlns:a16="http://schemas.microsoft.com/office/drawing/2014/main" id="{06138B11-FC1A-F73D-C83E-BAC089223DA0}"/>
+            </a:ext>
+          </a:extLst>
+        </p:cNvPr>
+        <p:cNvGrpSpPr/>
+        <p:nvPr/>
+      </p:nvGrpSpPr>
+      <p:grpSpPr>
+        <a:xfrm>
+          <a:off x="0" y="0"/>
+          <a:ext cx="0" cy="0"/>
+          <a:chOff x="0" y="0"/>
+          <a:chExt cx="0" cy="0"/>
+        </a:xfrm>
+      </p:grpSpPr>
+      <p:sp>
+        <p:nvSpPr>
+          <p:cNvPr id="2" name="Slide Image Placeholder 1">
+            <a:extLst>
+              <a:ext uri="{FF2B5EF4-FFF2-40B4-BE49-F238E27FC236}">
+                <a16:creationId xmlns:a16="http://schemas.microsoft.com/office/drawing/2014/main" id="{93603840-2796-EDE5-A1AF-A47F98FC32F5}"/>
+              </a:ext>
+            </a:extLst>
+          </p:cNvPr>
+          <p:cNvSpPr>
+            <a:spLocks noGrp="1" noRot="1" noChangeAspect="1"/>
+          </p:cNvSpPr>
+          <p:nvPr>
+            <p:ph type="sldImg"/>
+          </p:nvPr>
+        </p:nvSpPr>
+        <p:spPr/>
+      </p:sp>
+      <p:sp>
+        <p:nvSpPr>
+          <p:cNvPr id="3" name="Notes Placeholder 2">
+            <a:extLst>
+              <a:ext uri="{FF2B5EF4-FFF2-40B4-BE49-F238E27FC236}">
+                <a16:creationId xmlns:a16="http://schemas.microsoft.com/office/drawing/2014/main" id="{70BF5073-AF12-1C40-58EB-39A73C84EBF9}"/>
+              </a:ext>
+            </a:extLst>
+          </p:cNvPr>
+          <p:cNvSpPr>
+            <a:spLocks noGrp="1"/>
+          </p:cNvSpPr>
+          <p:nvPr>
+            <p:ph type="body" idx="1"/>
+          </p:nvPr>
+        </p:nvSpPr>
+        <p:spPr/>
+        <p:txBody>
+          <a:bodyPr/>
+          <a:lstStyle/>
+          <a:p>
+            <a:r>
+              <a:rPr lang="en-US" dirty="0"/>
+              <a:t>Without training and recognition, HCAs cannot meet the complex needs of patients, despite their willingness and presence at the bedside.</a:t>
+            </a:r>
+            <a:endParaRPr lang="en-GB" dirty="0"/>
+          </a:p>
+        </p:txBody>
+      </p:sp>
+      <p:sp>
+        <p:nvSpPr>
+          <p:cNvPr id="4" name="Slide Number Placeholder 3">
+            <a:extLst>
+              <a:ext uri="{FF2B5EF4-FFF2-40B4-BE49-F238E27FC236}">
+                <a16:creationId xmlns:a16="http://schemas.microsoft.com/office/drawing/2014/main" id="{F2C5F37F-B719-ADA1-6E7C-4F953D45AA81}"/>
+              </a:ext>
+            </a:extLst>
+          </p:cNvPr>
+          <p:cNvSpPr>
+            <a:spLocks noGrp="1"/>
+          </p:cNvSpPr>
+          <p:nvPr>
+            <p:ph type="sldNum" sz="quarter" idx="5"/>
+          </p:nvPr>
+        </p:nvSpPr>
+        <p:spPr/>
+        <p:txBody>
+          <a:bodyPr/>
+          <a:lstStyle/>
+          <a:p>
+            <a:fld id="{43932783-590D-41BD-A55F-0A9D2258B8B1}" type="slidenum">
+              <a:rPr lang="en-GB" smtClean="0"/>
+              <a:t>5</a:t>
+            </a:fld>
+            <a:endParaRPr lang="en-GB"/>
+          </a:p>
+        </p:txBody>
+      </p:sp>
+    </p:spTree>
+    <p:extLst>
+      <p:ext uri="{BB962C8B-B14F-4D97-AF65-F5344CB8AC3E}">
+        <p14:creationId xmlns:p14="http://schemas.microsoft.com/office/powerpoint/2010/main" val="3595382845"/>
+      </p:ext>
+    </p:extLst>
+  </p:cSld>
+  <p:clrMapOvr>
+    <a:masterClrMapping/>
+  </p:clrMapOvr>
+</p:notes>
+</file>
+
+<file path=ppt/notesSlides/notesSlide4.xml><?xml version="1.0" encoding="utf-8"?>
+<p:notes xmlns:a="http://schemas.openxmlformats.org/drawingml/2006/main" xmlns:r="http://schemas.openxmlformats.org/officeDocument/2006/relationships" xmlns:p="http://schemas.openxmlformats.org/presentationml/2006/main">
+  <p:cSld>
+    <p:spTree>
+      <p:nvGrpSpPr>
+        <p:cNvPr id="1" name="">
+          <a:extLst>
+            <a:ext uri="{FF2B5EF4-FFF2-40B4-BE49-F238E27FC236}">
+              <a16:creationId xmlns:a16="http://schemas.microsoft.com/office/drawing/2014/main" id="{7E9B55D5-C3D6-EFE7-CA60-BC444D8D9C02}"/>
+            </a:ext>
+          </a:extLst>
+        </p:cNvPr>
+        <p:cNvGrpSpPr/>
+        <p:nvPr/>
+      </p:nvGrpSpPr>
+      <p:grpSpPr>
+        <a:xfrm>
+          <a:off x="0" y="0"/>
+          <a:ext cx="0" cy="0"/>
+          <a:chOff x="0" y="0"/>
+          <a:chExt cx="0" cy="0"/>
+        </a:xfrm>
+      </p:grpSpPr>
+      <p:sp>
+        <p:nvSpPr>
+          <p:cNvPr id="2" name="Slide Image Placeholder 1">
+            <a:extLst>
+              <a:ext uri="{FF2B5EF4-FFF2-40B4-BE49-F238E27FC236}">
+                <a16:creationId xmlns:a16="http://schemas.microsoft.com/office/drawing/2014/main" id="{B70393E4-C1A6-F358-8994-E1924702D80A}"/>
+              </a:ext>
+            </a:extLst>
+          </p:cNvPr>
+          <p:cNvSpPr>
+            <a:spLocks noGrp="1" noRot="1" noChangeAspect="1"/>
+          </p:cNvSpPr>
+          <p:nvPr>
+            <p:ph type="sldImg"/>
+          </p:nvPr>
+        </p:nvSpPr>
+        <p:spPr/>
+      </p:sp>
+      <p:sp>
+        <p:nvSpPr>
+          <p:cNvPr id="3" name="Notes Placeholder 2">
+            <a:extLst>
+              <a:ext uri="{FF2B5EF4-FFF2-40B4-BE49-F238E27FC236}">
+                <a16:creationId xmlns:a16="http://schemas.microsoft.com/office/drawing/2014/main" id="{AFB8D2FF-3809-89EC-4D4F-16504C02B98C}"/>
+              </a:ext>
+            </a:extLst>
+          </p:cNvPr>
+          <p:cNvSpPr>
+            <a:spLocks noGrp="1"/>
+          </p:cNvSpPr>
+          <p:nvPr>
+            <p:ph type="body" idx="1"/>
+          </p:nvPr>
+        </p:nvSpPr>
+        <p:spPr/>
+        <p:txBody>
+          <a:bodyPr/>
+          <a:lstStyle/>
+          <a:p>
+            <a:r>
+              <a:rPr lang="en-US" dirty="0"/>
+              <a:t>The continuity HCAs bring is invaluable. Yet, healthcare systems rarely acknowledge this contribution as integral to patient outcomes.</a:t>
+            </a:r>
+            <a:endParaRPr lang="en-GB" dirty="0"/>
+          </a:p>
+        </p:txBody>
+      </p:sp>
+      <p:sp>
+        <p:nvSpPr>
+          <p:cNvPr id="4" name="Slide Number Placeholder 3">
+            <a:extLst>
+              <a:ext uri="{FF2B5EF4-FFF2-40B4-BE49-F238E27FC236}">
+                <a16:creationId xmlns:a16="http://schemas.microsoft.com/office/drawing/2014/main" id="{5EAC7F48-AC40-4E5E-E925-DD3B45634647}"/>
+              </a:ext>
+            </a:extLst>
+          </p:cNvPr>
+          <p:cNvSpPr>
+            <a:spLocks noGrp="1"/>
+          </p:cNvSpPr>
+          <p:nvPr>
+            <p:ph type="sldNum" sz="quarter" idx="5"/>
+          </p:nvPr>
+        </p:nvSpPr>
+        <p:spPr/>
+        <p:txBody>
+          <a:bodyPr/>
+          <a:lstStyle/>
+          <a:p>
+            <a:fld id="{43932783-590D-41BD-A55F-0A9D2258B8B1}" type="slidenum">
+              <a:rPr lang="en-GB" smtClean="0"/>
+              <a:t>6</a:t>
+            </a:fld>
+            <a:endParaRPr lang="en-GB"/>
+          </a:p>
+        </p:txBody>
+      </p:sp>
+    </p:spTree>
+    <p:extLst>
+      <p:ext uri="{BB962C8B-B14F-4D97-AF65-F5344CB8AC3E}">
+        <p14:creationId xmlns:p14="http://schemas.microsoft.com/office/powerpoint/2010/main" val="2757605725"/>
+      </p:ext>
+    </p:extLst>
+  </p:cSld>
+  <p:clrMapOvr>
+    <a:masterClrMapping/>
+  </p:clrMapOvr>
+</p:notes>
+</file>
+
+<file path=ppt/notesSlides/notesSlide5.xml><?xml version="1.0" encoding="utf-8"?>
+<p:notes xmlns:a="http://schemas.openxmlformats.org/drawingml/2006/main" xmlns:r="http://schemas.openxmlformats.org/officeDocument/2006/relationships" xmlns:p="http://schemas.openxmlformats.org/presentationml/2006/main">
+  <p:cSld>
+    <p:spTree>
+      <p:nvGrpSpPr>
+        <p:cNvPr id="1" name="">
+          <a:extLst>
+            <a:ext uri="{FF2B5EF4-FFF2-40B4-BE49-F238E27FC236}">
+              <a16:creationId xmlns:a16="http://schemas.microsoft.com/office/drawing/2014/main" id="{38CCB154-59A7-F309-82B6-E9ED0FEF57FF}"/>
+            </a:ext>
+          </a:extLst>
+        </p:cNvPr>
+        <p:cNvGrpSpPr/>
+        <p:nvPr/>
+      </p:nvGrpSpPr>
+      <p:grpSpPr>
+        <a:xfrm>
+          <a:off x="0" y="0"/>
+          <a:ext cx="0" cy="0"/>
+          <a:chOff x="0" y="0"/>
+          <a:chExt cx="0" cy="0"/>
+        </a:xfrm>
+      </p:grpSpPr>
+      <p:sp>
+        <p:nvSpPr>
+          <p:cNvPr id="2" name="Slide Image Placeholder 1">
+            <a:extLst>
+              <a:ext uri="{FF2B5EF4-FFF2-40B4-BE49-F238E27FC236}">
+                <a16:creationId xmlns:a16="http://schemas.microsoft.com/office/drawing/2014/main" id="{44AC0DA2-A9AA-FDB9-3DC0-451DA296790C}"/>
+              </a:ext>
+            </a:extLst>
+          </p:cNvPr>
+          <p:cNvSpPr>
+            <a:spLocks noGrp="1" noRot="1" noChangeAspect="1"/>
+          </p:cNvSpPr>
+          <p:nvPr>
+            <p:ph type="sldImg"/>
+          </p:nvPr>
+        </p:nvSpPr>
+        <p:spPr/>
+      </p:sp>
+      <p:sp>
+        <p:nvSpPr>
+          <p:cNvPr id="3" name="Notes Placeholder 2">
+            <a:extLst>
+              <a:ext uri="{FF2B5EF4-FFF2-40B4-BE49-F238E27FC236}">
+                <a16:creationId xmlns:a16="http://schemas.microsoft.com/office/drawing/2014/main" id="{F268951D-64E9-F67A-DAD5-05874056D23B}"/>
+              </a:ext>
+            </a:extLst>
+          </p:cNvPr>
+          <p:cNvSpPr>
+            <a:spLocks noGrp="1"/>
+          </p:cNvSpPr>
+          <p:nvPr>
+            <p:ph type="body" idx="1"/>
+          </p:nvPr>
+        </p:nvSpPr>
+        <p:spPr/>
+        <p:txBody>
+          <a:bodyPr/>
+          <a:lstStyle/>
+          <a:p>
+            <a:r>
+              <a:rPr lang="en-US" dirty="0"/>
+              <a:t>These findings answer the research questions by revealing how HCAs are essential yet undervalued. Systemic changes are needed to empower HCAs and improve the sustainability of palliative care.</a:t>
+            </a:r>
+            <a:endParaRPr lang="en-GB" dirty="0"/>
+          </a:p>
+        </p:txBody>
+      </p:sp>
+      <p:sp>
+        <p:nvSpPr>
+          <p:cNvPr id="4" name="Slide Number Placeholder 3">
+            <a:extLst>
+              <a:ext uri="{FF2B5EF4-FFF2-40B4-BE49-F238E27FC236}">
+                <a16:creationId xmlns:a16="http://schemas.microsoft.com/office/drawing/2014/main" id="{34511695-E3C5-DCCA-7057-FA60488FB5A0}"/>
+              </a:ext>
+            </a:extLst>
+          </p:cNvPr>
+          <p:cNvSpPr>
+            <a:spLocks noGrp="1"/>
+          </p:cNvSpPr>
+          <p:nvPr>
+            <p:ph type="sldNum" sz="quarter" idx="5"/>
+          </p:nvPr>
+        </p:nvSpPr>
+        <p:spPr/>
+        <p:txBody>
+          <a:bodyPr/>
+          <a:lstStyle/>
+          <a:p>
+            <a:fld id="{43932783-590D-41BD-A55F-0A9D2258B8B1}" type="slidenum">
+              <a:rPr lang="en-GB" smtClean="0"/>
+              <a:t>7</a:t>
+            </a:fld>
+            <a:endParaRPr lang="en-GB"/>
+          </a:p>
+        </p:txBody>
+      </p:sp>
+    </p:spTree>
+    <p:extLst>
+      <p:ext uri="{BB962C8B-B14F-4D97-AF65-F5344CB8AC3E}">
+        <p14:creationId xmlns:p14="http://schemas.microsoft.com/office/powerpoint/2010/main" val="1926182756"/>
+      </p:ext>
+    </p:extLst>
+  </p:cSld>
+  <p:clrMapOvr>
+    <a:masterClrMapping/>
+  </p:clrMapOvr>
+</p:notes>
+</file>
+
+<file path=ppt/notesSlides/notesSlide6.xml><?xml version="1.0" encoding="utf-8"?>
+<p:notes xmlns:a="http://schemas.openxmlformats.org/drawingml/2006/main" xmlns:r="http://schemas.openxmlformats.org/officeDocument/2006/relationships" xmlns:p="http://schemas.openxmlformats.org/presentationml/2006/main">
+  <p:cSld>
+    <p:spTree>
+      <p:nvGrpSpPr>
+        <p:cNvPr id="1" name="">
+          <a:extLst>
+            <a:ext uri="{FF2B5EF4-FFF2-40B4-BE49-F238E27FC236}">
+              <a16:creationId xmlns:a16="http://schemas.microsoft.com/office/drawing/2014/main" id="{32964EA0-81E3-3EA9-4980-582C0C0CA02F}"/>
+            </a:ext>
+          </a:extLst>
+        </p:cNvPr>
+        <p:cNvGrpSpPr/>
+        <p:nvPr/>
+      </p:nvGrpSpPr>
+      <p:grpSpPr>
+        <a:xfrm>
+          <a:off x="0" y="0"/>
+          <a:ext cx="0" cy="0"/>
+          <a:chOff x="0" y="0"/>
+          <a:chExt cx="0" cy="0"/>
+        </a:xfrm>
+      </p:grpSpPr>
+      <p:sp>
+        <p:nvSpPr>
+          <p:cNvPr id="2" name="Slide Image Placeholder 1">
+            <a:extLst>
+              <a:ext uri="{FF2B5EF4-FFF2-40B4-BE49-F238E27FC236}">
+                <a16:creationId xmlns:a16="http://schemas.microsoft.com/office/drawing/2014/main" id="{342D4864-BE3C-5E69-288A-244ACF615007}"/>
+              </a:ext>
+            </a:extLst>
+          </p:cNvPr>
+          <p:cNvSpPr>
+            <a:spLocks noGrp="1" noRot="1" noChangeAspect="1"/>
+          </p:cNvSpPr>
+          <p:nvPr>
+            <p:ph type="sldImg"/>
+          </p:nvPr>
+        </p:nvSpPr>
+        <p:spPr/>
+      </p:sp>
+      <p:sp>
+        <p:nvSpPr>
+          <p:cNvPr id="3" name="Notes Placeholder 2">
+            <a:extLst>
+              <a:ext uri="{FF2B5EF4-FFF2-40B4-BE49-F238E27FC236}">
+                <a16:creationId xmlns:a16="http://schemas.microsoft.com/office/drawing/2014/main" id="{4B334381-153F-8E0F-53A2-170D5EAAC9A8}"/>
+              </a:ext>
+            </a:extLst>
+          </p:cNvPr>
+          <p:cNvSpPr>
+            <a:spLocks noGrp="1"/>
+          </p:cNvSpPr>
+          <p:nvPr>
+            <p:ph type="body" idx="1"/>
+          </p:nvPr>
+        </p:nvSpPr>
+        <p:spPr/>
+        <p:txBody>
+          <a:bodyPr/>
+          <a:lstStyle/>
+          <a:p>
+            <a:pPr marL="0" marR="0" lvl="0" indent="0" algn="l" defTabSz="914400" rtl="0" eaLnBrk="1" fontAlgn="auto" latinLnBrk="0" hangingPunct="1">
+              <a:lnSpc>
+                <a:spcPct val="100000"/>
+              </a:lnSpc>
+              <a:spcBef>
+                <a:spcPts val="0"/>
+              </a:spcBef>
+              <a:spcAft>
+                <a:spcPts val="0"/>
+              </a:spcAft>
+              <a:buClrTx/>
+              <a:buSzTx/>
+              <a:buFontTx/>
+              <a:buNone/>
+              <a:tabLst/>
+              <a:defRPr/>
+            </a:pPr>
+            <a:r>
+              <a:rPr lang="en-US" dirty="0"/>
+              <a:t>Training and emotional wellbeing must be institutional priorities. These recommendations focus on professional growth and mental health.</a:t>
+            </a:r>
+          </a:p>
+        </p:txBody>
+      </p:sp>
+      <p:sp>
+        <p:nvSpPr>
+          <p:cNvPr id="4" name="Slide Number Placeholder 3">
+            <a:extLst>
+              <a:ext uri="{FF2B5EF4-FFF2-40B4-BE49-F238E27FC236}">
+                <a16:creationId xmlns:a16="http://schemas.microsoft.com/office/drawing/2014/main" id="{F2B4FF2E-9414-30A5-85A5-E98B140CDCC9}"/>
+              </a:ext>
+            </a:extLst>
+          </p:cNvPr>
+          <p:cNvSpPr>
+            <a:spLocks noGrp="1"/>
+          </p:cNvSpPr>
+          <p:nvPr>
+            <p:ph type="sldNum" sz="quarter" idx="5"/>
+          </p:nvPr>
+        </p:nvSpPr>
+        <p:spPr/>
+        <p:txBody>
+          <a:bodyPr/>
+          <a:lstStyle/>
+          <a:p>
+            <a:fld id="{43932783-590D-41BD-A55F-0A9D2258B8B1}" type="slidenum">
+              <a:rPr lang="en-GB" smtClean="0"/>
+              <a:t>8</a:t>
+            </a:fld>
+            <a:endParaRPr lang="en-GB"/>
+          </a:p>
+        </p:txBody>
+      </p:sp>
+    </p:spTree>
+    <p:extLst>
+      <p:ext uri="{BB962C8B-B14F-4D97-AF65-F5344CB8AC3E}">
+        <p14:creationId xmlns:p14="http://schemas.microsoft.com/office/powerpoint/2010/main" val="1585698875"/>
+      </p:ext>
+    </p:extLst>
+  </p:cSld>
+  <p:clrMapOvr>
+    <a:masterClrMapping/>
+  </p:clrMapOvr>
+</p:notes>
+</file>
+
+<file path=ppt/notesSlides/notesSlide7.xml><?xml version="1.0" encoding="utf-8"?>
+<p:notes xmlns:a="http://schemas.openxmlformats.org/drawingml/2006/main" xmlns:r="http://schemas.openxmlformats.org/officeDocument/2006/relationships" xmlns:p="http://schemas.openxmlformats.org/presentationml/2006/main">
+  <p:cSld>
+    <p:spTree>
+      <p:nvGrpSpPr>
+        <p:cNvPr id="1" name="">
+          <a:extLst>
+            <a:ext uri="{FF2B5EF4-FFF2-40B4-BE49-F238E27FC236}">
+              <a16:creationId xmlns:a16="http://schemas.microsoft.com/office/drawing/2014/main" id="{DA90B7C8-002A-1453-0647-056242ECDB0B}"/>
+            </a:ext>
+          </a:extLst>
+        </p:cNvPr>
+        <p:cNvGrpSpPr/>
+        <p:nvPr/>
+      </p:nvGrpSpPr>
+      <p:grpSpPr>
+        <a:xfrm>
+          <a:off x="0" y="0"/>
+          <a:ext cx="0" cy="0"/>
+          <a:chOff x="0" y="0"/>
+          <a:chExt cx="0" cy="0"/>
+        </a:xfrm>
+      </p:grpSpPr>
+      <p:sp>
+        <p:nvSpPr>
+          <p:cNvPr id="2" name="Slide Image Placeholder 1">
+            <a:extLst>
+              <a:ext uri="{FF2B5EF4-FFF2-40B4-BE49-F238E27FC236}">
+                <a16:creationId xmlns:a16="http://schemas.microsoft.com/office/drawing/2014/main" id="{5DEDC4A9-72B7-5F45-E322-52A1B28AEC5B}"/>
+              </a:ext>
+            </a:extLst>
+          </p:cNvPr>
+          <p:cNvSpPr>
+            <a:spLocks noGrp="1" noRot="1" noChangeAspect="1"/>
+          </p:cNvSpPr>
+          <p:nvPr>
+            <p:ph type="sldImg"/>
+          </p:nvPr>
+        </p:nvSpPr>
+        <p:spPr/>
+      </p:sp>
+      <p:sp>
+        <p:nvSpPr>
+          <p:cNvPr id="3" name="Notes Placeholder 2">
+            <a:extLst>
+              <a:ext uri="{FF2B5EF4-FFF2-40B4-BE49-F238E27FC236}">
+                <a16:creationId xmlns:a16="http://schemas.microsoft.com/office/drawing/2014/main" id="{DFDFECAD-0C68-9077-266F-4F6C098BB3CF}"/>
+              </a:ext>
+            </a:extLst>
+          </p:cNvPr>
+          <p:cNvSpPr>
+            <a:spLocks noGrp="1"/>
+          </p:cNvSpPr>
+          <p:nvPr>
+            <p:ph type="body" idx="1"/>
+          </p:nvPr>
+        </p:nvSpPr>
+        <p:spPr/>
+        <p:txBody>
+          <a:bodyPr/>
+          <a:lstStyle/>
+          <a:p>
+            <a:r>
+              <a:rPr lang="en-US" dirty="0"/>
+              <a:t>Greater inclusion and policy-based recognition will cement HCAs as essential pillars of palliative care.</a:t>
+            </a:r>
+            <a:endParaRPr lang="en-GB" dirty="0"/>
+          </a:p>
+        </p:txBody>
+      </p:sp>
+      <p:sp>
+        <p:nvSpPr>
+          <p:cNvPr id="4" name="Slide Number Placeholder 3">
+            <a:extLst>
+              <a:ext uri="{FF2B5EF4-FFF2-40B4-BE49-F238E27FC236}">
+                <a16:creationId xmlns:a16="http://schemas.microsoft.com/office/drawing/2014/main" id="{24A6A8B7-8D8D-EAB2-5EEC-F79E3CF6A2CB}"/>
+              </a:ext>
+            </a:extLst>
+          </p:cNvPr>
+          <p:cNvSpPr>
+            <a:spLocks noGrp="1"/>
+          </p:cNvSpPr>
+          <p:nvPr>
+            <p:ph type="sldNum" sz="quarter" idx="5"/>
+          </p:nvPr>
+        </p:nvSpPr>
+        <p:spPr/>
+        <p:txBody>
+          <a:bodyPr/>
+          <a:lstStyle/>
+          <a:p>
+            <a:fld id="{43932783-590D-41BD-A55F-0A9D2258B8B1}" type="slidenum">
+              <a:rPr lang="en-GB" smtClean="0"/>
+              <a:t>9</a:t>
+            </a:fld>
+            <a:endParaRPr lang="en-GB"/>
+          </a:p>
+        </p:txBody>
+      </p:sp>
+    </p:spTree>
+    <p:extLst>
+      <p:ext uri="{BB962C8B-B14F-4D97-AF65-F5344CB8AC3E}">
+        <p14:creationId xmlns:p14="http://schemas.microsoft.com/office/powerpoint/2010/main" val="2513270708"/>
+      </p:ext>
+    </p:extLst>
+  </p:cSld>
+  <p:clrMapOvr>
+    <a:masterClrMapping/>
+  </p:clrMapOvr>
+</p:notes>
 </file>
 
 <file path=ppt/slideLayouts/slideLayout1.xml><?xml version="1.0" encoding="utf-8"?>
@@ -3307,6 +4436,14 @@
 <file path=ppt/slides/slide1.xml><?xml version="1.0" encoding="utf-8"?>
 <p:sld xmlns:a="http://schemas.openxmlformats.org/drawingml/2006/main" xmlns:r="http://schemas.openxmlformats.org/officeDocument/2006/relationships" xmlns:p="http://schemas.openxmlformats.org/presentationml/2006/main">
   <p:cSld>
+    <p:bg>
+      <p:bgPr>
+        <a:solidFill>
+          <a:schemeClr val="bg1"/>
+        </a:solidFill>
+        <a:effectLst/>
+      </p:bgPr>
+    </p:bg>
     <p:spTree>
       <p:nvGrpSpPr>
         <p:cNvPr id="1" name=""/>
@@ -3321,10 +4458,3364 @@
           <a:chExt cx="0" cy="0"/>
         </a:xfrm>
       </p:grpSpPr>
+      <p:pic>
+        <p:nvPicPr>
+          <p:cNvPr id="13" name="Picture 12" descr="People holding hands">
+            <a:extLst>
+              <a:ext uri="{FF2B5EF4-FFF2-40B4-BE49-F238E27FC236}">
+                <a16:creationId xmlns:a16="http://schemas.microsoft.com/office/drawing/2014/main" id="{F53A8EB3-D1F6-B92A-B19A-0B012DF40EED}"/>
+              </a:ext>
+            </a:extLst>
+          </p:cNvPr>
+          <p:cNvPicPr>
+            <a:picLocks noChangeAspect="1"/>
+          </p:cNvPicPr>
+          <p:nvPr/>
+        </p:nvPicPr>
+        <p:blipFill>
+          <a:blip r:embed="rId2"/>
+          <a:srcRect l="5884" r="-1" b="-1"/>
+          <a:stretch>
+            <a:fillRect/>
+          </a:stretch>
+        </p:blipFill>
+        <p:spPr>
+          <a:xfrm>
+            <a:off x="787114" y="1106570"/>
+            <a:ext cx="6449549" cy="4574217"/>
+          </a:xfrm>
+          <a:prstGeom prst="rect">
+            <a:avLst/>
+          </a:prstGeom>
+        </p:spPr>
+      </p:pic>
+      <p:sp>
+        <p:nvSpPr>
+          <p:cNvPr id="2" name="TextBox 1">
+            <a:extLst>
+              <a:ext uri="{FF2B5EF4-FFF2-40B4-BE49-F238E27FC236}">
+                <a16:creationId xmlns:a16="http://schemas.microsoft.com/office/drawing/2014/main" id="{2C992EE2-8D02-80C7-DA95-A4DF15959208}"/>
+              </a:ext>
+            </a:extLst>
+          </p:cNvPr>
+          <p:cNvSpPr txBox="1"/>
+          <p:nvPr/>
+        </p:nvSpPr>
+        <p:spPr>
+          <a:xfrm>
+            <a:off x="7516329" y="1344377"/>
+            <a:ext cx="4433623" cy="3447832"/>
+          </a:xfrm>
+          <a:prstGeom prst="rect">
+            <a:avLst/>
+          </a:prstGeom>
+        </p:spPr>
+        <p:txBody>
+          <a:bodyPr vert="horz" lIns="91440" tIns="45720" rIns="91440" bIns="45720" rtlCol="0" anchor="t">
+            <a:normAutofit/>
+          </a:bodyPr>
+          <a:lstStyle/>
+          <a:p>
+            <a:pPr>
+              <a:lnSpc>
+                <a:spcPct val="150000"/>
+              </a:lnSpc>
+              <a:spcBef>
+                <a:spcPct val="0"/>
+              </a:spcBef>
+              <a:spcAft>
+                <a:spcPts val="600"/>
+              </a:spcAft>
+            </a:pPr>
+            <a:r>
+              <a:rPr lang="en-US" sz="2000" b="1" noProof="0" dirty="0"/>
+              <a:t>IDENTIFYING CHALLENGES FACED BY HEALTHCARE ASSISTANTS IN ENSURING PATIENT COMFORT AND MANAGING PATIENT CARE EFFECTIVELY</a:t>
+            </a:r>
+          </a:p>
+        </p:txBody>
+      </p:sp>
+      <p:grpSp>
+        <p:nvGrpSpPr>
+          <p:cNvPr id="24" name="Group 23">
+            <a:extLst>
+              <a:ext uri="{FF2B5EF4-FFF2-40B4-BE49-F238E27FC236}">
+                <a16:creationId xmlns:a16="http://schemas.microsoft.com/office/drawing/2014/main" id="{31C49F18-8757-4E87-5C2E-9D6D7B82BA3B}"/>
+              </a:ext>
+              <a:ext uri="{C183D7F6-B498-43B3-948B-1728B52AA6E4}">
+                <adec:decorative xmlns:adec="http://schemas.microsoft.com/office/drawing/2017/decorative" val="1"/>
+              </a:ext>
+            </a:extLst>
+          </p:cNvPr>
+          <p:cNvGrpSpPr>
+            <a:grpSpLocks noGrp="1" noUngrp="1" noRot="1" noChangeAspect="1" noMove="1" noResize="1"/>
+          </p:cNvGrpSpPr>
+          <p:nvPr>
+            <p:extLst>
+              <p:ext uri="{386F3935-93C4-4BCD-93E2-E3B085C9AB24}">
+                <p16:designElem xmlns:p16="http://schemas.microsoft.com/office/powerpoint/2015/main" val="1"/>
+              </p:ext>
+            </p:extLst>
+          </p:nvPr>
+        </p:nvGrpSpPr>
+        <p:grpSpPr>
+          <a:xfrm>
+            <a:off x="-5025" y="6737718"/>
+            <a:ext cx="12207200" cy="123363"/>
+            <a:chOff x="-5025" y="6737718"/>
+            <a:chExt cx="12207200" cy="123363"/>
+          </a:xfrm>
+        </p:grpSpPr>
+        <p:sp>
+          <p:nvSpPr>
+            <p:cNvPr id="25" name="Rectangle 24">
+              <a:extLst>
+                <a:ext uri="{FF2B5EF4-FFF2-40B4-BE49-F238E27FC236}">
+                  <a16:creationId xmlns:a16="http://schemas.microsoft.com/office/drawing/2014/main" id="{25C84D91-E5BF-B919-ACEF-4A25262CEE72}"/>
+                </a:ext>
+                <a:ext uri="{C183D7F6-B498-43B3-948B-1728B52AA6E4}">
+                  <adec:decorative xmlns:adec="http://schemas.microsoft.com/office/drawing/2017/decorative" val="1"/>
+                </a:ext>
+              </a:extLst>
+            </p:cNvPr>
+            <p:cNvSpPr/>
+            <p:nvPr>
+              <p:extLst>
+                <p:ext uri="{386F3935-93C4-4BCD-93E2-E3B085C9AB24}">
+                  <p16:designElem xmlns:p16="http://schemas.microsoft.com/office/powerpoint/2015/main" val="1"/>
+                </p:ext>
+              </p:extLst>
+            </p:nvPr>
+          </p:nvSpPr>
+          <p:spPr>
+            <a:xfrm rot="5400000" flipH="1">
+              <a:off x="6036894" y="695800"/>
+              <a:ext cx="123362" cy="12207199"/>
+            </a:xfrm>
+            <a:prstGeom prst="rect">
+              <a:avLst/>
+            </a:prstGeom>
+            <a:gradFill>
+              <a:gsLst>
+                <a:gs pos="0">
+                  <a:schemeClr val="accent5"/>
+                </a:gs>
+                <a:gs pos="100000">
+                  <a:schemeClr val="accent2"/>
+                </a:gs>
+              </a:gsLst>
+              <a:lin ang="1800000" scaled="0"/>
+            </a:gradFill>
+            <a:ln>
+              <a:noFill/>
+            </a:ln>
+          </p:spPr>
+          <p:style>
+            <a:lnRef idx="2">
+              <a:schemeClr val="accent1">
+                <a:shade val="50000"/>
+              </a:schemeClr>
+            </a:lnRef>
+            <a:fillRef idx="1">
+              <a:schemeClr val="accent1"/>
+            </a:fillRef>
+            <a:effectRef idx="0">
+              <a:schemeClr val="accent1"/>
+            </a:effectRef>
+            <a:fontRef idx="minor">
+              <a:schemeClr val="lt1"/>
+            </a:fontRef>
+          </p:style>
+          <p:txBody>
+            <a:bodyPr rtlCol="0" anchor="ctr"/>
+            <a:lstStyle/>
+            <a:p>
+              <a:pPr algn="ctr"/>
+              <a:endParaRPr lang="en-US"/>
+            </a:p>
+          </p:txBody>
+        </p:sp>
+        <p:sp>
+          <p:nvSpPr>
+            <p:cNvPr id="26" name="Rectangle 25">
+              <a:extLst>
+                <a:ext uri="{FF2B5EF4-FFF2-40B4-BE49-F238E27FC236}">
+                  <a16:creationId xmlns:a16="http://schemas.microsoft.com/office/drawing/2014/main" id="{DD889E38-27CA-E23F-B646-8D7B4BB17DBC}"/>
+                </a:ext>
+                <a:ext uri="{C183D7F6-B498-43B3-948B-1728B52AA6E4}">
+                  <adec:decorative xmlns:adec="http://schemas.microsoft.com/office/drawing/2017/decorative" val="1"/>
+                </a:ext>
+              </a:extLst>
+            </p:cNvPr>
+            <p:cNvSpPr/>
+            <p:nvPr>
+              <p:extLst>
+                <p:ext uri="{386F3935-93C4-4BCD-93E2-E3B085C9AB24}">
+                  <p16:designElem xmlns:p16="http://schemas.microsoft.com/office/powerpoint/2015/main" val="1"/>
+                </p:ext>
+              </p:extLst>
+            </p:nvPr>
+          </p:nvSpPr>
+          <p:spPr>
+            <a:xfrm rot="16200000">
+              <a:off x="9176406" y="3835311"/>
+              <a:ext cx="123362" cy="5928176"/>
+            </a:xfrm>
+            <a:prstGeom prst="rect">
+              <a:avLst/>
+            </a:prstGeom>
+            <a:gradFill>
+              <a:gsLst>
+                <a:gs pos="19000">
+                  <a:schemeClr val="accent5">
+                    <a:alpha val="0"/>
+                  </a:schemeClr>
+                </a:gs>
+                <a:gs pos="100000">
+                  <a:schemeClr val="accent5">
+                    <a:lumMod val="60000"/>
+                    <a:lumOff val="40000"/>
+                  </a:schemeClr>
+                </a:gs>
+              </a:gsLst>
+              <a:lin ang="600000" scaled="0"/>
+            </a:gradFill>
+            <a:ln>
+              <a:noFill/>
+            </a:ln>
+          </p:spPr>
+          <p:style>
+            <a:lnRef idx="2">
+              <a:schemeClr val="accent1">
+                <a:shade val="50000"/>
+              </a:schemeClr>
+            </a:lnRef>
+            <a:fillRef idx="1">
+              <a:schemeClr val="accent1"/>
+            </a:fillRef>
+            <a:effectRef idx="0">
+              <a:schemeClr val="accent1"/>
+            </a:effectRef>
+            <a:fontRef idx="minor">
+              <a:schemeClr val="lt1"/>
+            </a:fontRef>
+          </p:style>
+          <p:txBody>
+            <a:bodyPr rtlCol="0" anchor="ctr"/>
+            <a:lstStyle/>
+            <a:p>
+              <a:pPr algn="ctr"/>
+              <a:endParaRPr lang="en-US"/>
+            </a:p>
+          </p:txBody>
+        </p:sp>
+      </p:grpSp>
+      <p:sp>
+        <p:nvSpPr>
+          <p:cNvPr id="4" name="TextBox 3">
+            <a:extLst>
+              <a:ext uri="{FF2B5EF4-FFF2-40B4-BE49-F238E27FC236}">
+                <a16:creationId xmlns:a16="http://schemas.microsoft.com/office/drawing/2014/main" id="{3BA3EFB6-C1F5-68D3-F2D5-649EC35A9032}"/>
+              </a:ext>
+            </a:extLst>
+          </p:cNvPr>
+          <p:cNvSpPr txBox="1"/>
+          <p:nvPr/>
+        </p:nvSpPr>
+        <p:spPr>
+          <a:xfrm>
+            <a:off x="8235133" y="5513623"/>
+            <a:ext cx="3445766" cy="1485319"/>
+          </a:xfrm>
+          <a:prstGeom prst="rect">
+            <a:avLst/>
+          </a:prstGeom>
+          <a:noFill/>
+        </p:spPr>
+        <p:txBody>
+          <a:bodyPr vert="horz" lIns="91440" tIns="45720" rIns="91440" bIns="45720" rtlCol="0">
+            <a:normAutofit/>
+          </a:bodyPr>
+          <a:lstStyle/>
+          <a:p>
+            <a:pPr>
+              <a:lnSpc>
+                <a:spcPct val="90000"/>
+              </a:lnSpc>
+              <a:spcBef>
+                <a:spcPts val="1000"/>
+              </a:spcBef>
+            </a:pPr>
+            <a:r>
+              <a:rPr lang="en-US" sz="2000" b="1" noProof="0" dirty="0"/>
+              <a:t>Presented by</a:t>
+            </a:r>
+            <a:r>
+              <a:rPr lang="en-US" sz="2000" noProof="0" dirty="0"/>
+              <a:t>: </a:t>
+            </a:r>
+            <a:br>
+              <a:rPr lang="en-US" sz="2000" noProof="0" dirty="0"/>
+            </a:br>
+            <a:r>
+              <a:rPr lang="en-US" sz="2000" b="1" noProof="0" dirty="0"/>
+              <a:t>Date</a:t>
+            </a:r>
+            <a:r>
+              <a:rPr lang="en-US" sz="2000" noProof="0" dirty="0"/>
+              <a:t>: </a:t>
+            </a:r>
+          </a:p>
+        </p:txBody>
+      </p:sp>
     </p:spTree>
     <p:extLst>
       <p:ext uri="{BB962C8B-B14F-4D97-AF65-F5344CB8AC3E}">
         <p14:creationId xmlns:p14="http://schemas.microsoft.com/office/powerpoint/2010/main" val="3600912862"/>
+      </p:ext>
+    </p:extLst>
+  </p:cSld>
+  <p:clrMapOvr>
+    <a:masterClrMapping/>
+  </p:clrMapOvr>
+</p:sld>
+</file>
+
+<file path=ppt/slides/slide2.xml><?xml version="1.0" encoding="utf-8"?>
+<p:sld xmlns:a="http://schemas.openxmlformats.org/drawingml/2006/main" xmlns:r="http://schemas.openxmlformats.org/officeDocument/2006/relationships" xmlns:p="http://schemas.openxmlformats.org/presentationml/2006/main">
+  <p:cSld>
+    <p:spTree>
+      <p:nvGrpSpPr>
+        <p:cNvPr id="1" name=""/>
+        <p:cNvGrpSpPr/>
+        <p:nvPr/>
+      </p:nvGrpSpPr>
+      <p:grpSpPr>
+        <a:xfrm>
+          <a:off x="0" y="0"/>
+          <a:ext cx="0" cy="0"/>
+          <a:chOff x="0" y="0"/>
+          <a:chExt cx="0" cy="0"/>
+        </a:xfrm>
+      </p:grpSpPr>
+      <p:sp>
+        <p:nvSpPr>
+          <p:cNvPr id="3" name="TextBox 2">
+            <a:extLst>
+              <a:ext uri="{FF2B5EF4-FFF2-40B4-BE49-F238E27FC236}">
+                <a16:creationId xmlns:a16="http://schemas.microsoft.com/office/drawing/2014/main" id="{EF59584A-4064-37EF-B7A4-81859405D05A}"/>
+              </a:ext>
+            </a:extLst>
+          </p:cNvPr>
+          <p:cNvSpPr txBox="1"/>
+          <p:nvPr/>
+        </p:nvSpPr>
+        <p:spPr>
+          <a:xfrm>
+            <a:off x="923365" y="681335"/>
+            <a:ext cx="6096000" cy="646331"/>
+          </a:xfrm>
+          <a:prstGeom prst="rect">
+            <a:avLst/>
+          </a:prstGeom>
+          <a:noFill/>
+        </p:spPr>
+        <p:txBody>
+          <a:bodyPr wrap="square">
+            <a:spAutoFit/>
+          </a:bodyPr>
+          <a:lstStyle/>
+          <a:p>
+            <a:r>
+              <a:rPr lang="en-GB" sz="3600" b="1" noProof="0" dirty="0"/>
+              <a:t>Identification of Key Themes</a:t>
+            </a:r>
+          </a:p>
+        </p:txBody>
+      </p:sp>
+      <p:sp>
+        <p:nvSpPr>
+          <p:cNvPr id="4" name="Rectangle 3">
+            <a:extLst>
+              <a:ext uri="{FF2B5EF4-FFF2-40B4-BE49-F238E27FC236}">
+                <a16:creationId xmlns:a16="http://schemas.microsoft.com/office/drawing/2014/main" id="{CAEB3EC1-96C4-57C7-DED8-199658D61B3D}"/>
+              </a:ext>
+            </a:extLst>
+          </p:cNvPr>
+          <p:cNvSpPr/>
+          <p:nvPr/>
+        </p:nvSpPr>
+        <p:spPr>
+          <a:xfrm>
+            <a:off x="1066799" y="1357246"/>
+            <a:ext cx="1004047" cy="125506"/>
+          </a:xfrm>
+          <a:prstGeom prst="rect">
+            <a:avLst/>
+          </a:prstGeom>
+          <a:ln>
+            <a:noFill/>
+          </a:ln>
+        </p:spPr>
+        <p:style>
+          <a:lnRef idx="2">
+            <a:schemeClr val="accent2">
+              <a:shade val="15000"/>
+            </a:schemeClr>
+          </a:lnRef>
+          <a:fillRef idx="1">
+            <a:schemeClr val="accent2"/>
+          </a:fillRef>
+          <a:effectRef idx="0">
+            <a:schemeClr val="accent2"/>
+          </a:effectRef>
+          <a:fontRef idx="minor">
+            <a:schemeClr val="lt1"/>
+          </a:fontRef>
+        </p:style>
+        <p:txBody>
+          <a:bodyPr rtlCol="0" anchor="ctr"/>
+          <a:lstStyle/>
+          <a:p>
+            <a:pPr algn="ctr"/>
+            <a:endParaRPr lang="en-GB" noProof="0" dirty="0"/>
+          </a:p>
+        </p:txBody>
+      </p:sp>
+      <p:sp>
+        <p:nvSpPr>
+          <p:cNvPr id="5" name="Rectangle 1">
+            <a:extLst>
+              <a:ext uri="{FF2B5EF4-FFF2-40B4-BE49-F238E27FC236}">
+                <a16:creationId xmlns:a16="http://schemas.microsoft.com/office/drawing/2014/main" id="{042EB3D4-F04C-BF50-5DE7-38F49894D419}"/>
+              </a:ext>
+            </a:extLst>
+          </p:cNvPr>
+          <p:cNvSpPr>
+            <a:spLocks noChangeArrowheads="1"/>
+          </p:cNvSpPr>
+          <p:nvPr/>
+        </p:nvSpPr>
+        <p:spPr bwMode="auto">
+          <a:xfrm>
+            <a:off x="1066799" y="1818911"/>
+            <a:ext cx="6171305" cy="2947538"/>
+          </a:xfrm>
+          <a:prstGeom prst="rect">
+            <a:avLst/>
+          </a:prstGeom>
+          <a:noFill/>
+          <a:ln>
+            <a:noFill/>
+          </a:ln>
+          <a:effectLst/>
+          <a:extLst>
+            <a:ext uri="{909E8E84-426E-40DD-AFC4-6F175D3DCCD1}">
+              <a14:hiddenFill xmlns:a14="http://schemas.microsoft.com/office/drawing/2010/main">
+                <a:solidFill>
+                  <a:schemeClr val="accent1"/>
+                </a:solidFill>
+              </a14:hiddenFill>
+            </a:ext>
+            <a:ext uri="{91240B29-F687-4F45-9708-019B960494DF}">
+              <a14:hiddenLine xmlns:a14="http://schemas.microsoft.com/office/drawing/2010/main" w="9525">
+                <a:solidFill>
+                  <a:schemeClr val="tx1"/>
+                </a:solidFill>
+                <a:miter lim="800000"/>
+                <a:headEnd/>
+                <a:tailEnd/>
+              </a14:hiddenLine>
+            </a:ext>
+            <a:ext uri="{AF507438-7753-43E0-B8FC-AC1667EBCBE1}">
+              <a14:hiddenEffects xmlns:a14="http://schemas.microsoft.com/office/drawing/2010/main">
+                <a:effectLst>
+                  <a:outerShdw dist="35921" dir="2700000" algn="ctr" rotWithShape="0">
+                    <a:schemeClr val="bg2"/>
+                  </a:outerShdw>
+                </a:effectLst>
+              </a14:hiddenEffects>
+            </a:ext>
+          </a:extLst>
+        </p:spPr>
+        <p:txBody>
+          <a:bodyPr vert="horz" wrap="none" lIns="91440" tIns="45720" rIns="91440" bIns="45720" numCol="1" anchor="ctr" anchorCtr="0" compatLnSpc="1">
+            <a:prstTxWarp prst="textNoShape">
+              <a:avLst/>
+            </a:prstTxWarp>
+            <a:spAutoFit/>
+          </a:bodyPr>
+          <a:lstStyle/>
+          <a:p>
+            <a:pPr marL="358775" marR="0" lvl="0" indent="-358775" algn="l" defTabSz="914400" rtl="0" eaLnBrk="0" fontAlgn="base" latinLnBrk="0" hangingPunct="0">
+              <a:lnSpc>
+                <a:spcPct val="200000"/>
+              </a:lnSpc>
+              <a:spcBef>
+                <a:spcPct val="0"/>
+              </a:spcBef>
+              <a:spcAft>
+                <a:spcPct val="0"/>
+              </a:spcAft>
+              <a:buClrTx/>
+              <a:buSzTx/>
+              <a:buFont typeface="Wingdings" panose="05000000000000000000" pitchFamily="2" charset="2"/>
+              <a:buChar char="q"/>
+              <a:tabLst/>
+            </a:pPr>
+            <a:r>
+              <a:rPr kumimoji="0" lang="en-GB" sz="2400" b="0" i="0" u="none" strike="noStrike" cap="none" normalizeH="0" baseline="0" noProof="0" dirty="0">
+                <a:ln>
+                  <a:noFill/>
+                </a:ln>
+                <a:solidFill>
+                  <a:schemeClr val="tx1"/>
+                </a:solidFill>
+                <a:effectLst/>
+                <a:latin typeface="+mj-lt"/>
+              </a:rPr>
+              <a:t>Emotional Labour and Burnout</a:t>
+            </a:r>
+          </a:p>
+          <a:p>
+            <a:pPr marL="358775" marR="0" lvl="0" indent="-358775" algn="l" defTabSz="914400" rtl="0" eaLnBrk="0" fontAlgn="base" latinLnBrk="0" hangingPunct="0">
+              <a:lnSpc>
+                <a:spcPct val="200000"/>
+              </a:lnSpc>
+              <a:spcBef>
+                <a:spcPct val="0"/>
+              </a:spcBef>
+              <a:spcAft>
+                <a:spcPct val="0"/>
+              </a:spcAft>
+              <a:buClrTx/>
+              <a:buSzTx/>
+              <a:buFont typeface="Wingdings" panose="05000000000000000000" pitchFamily="2" charset="2"/>
+              <a:buChar char="q"/>
+              <a:tabLst/>
+            </a:pPr>
+            <a:r>
+              <a:rPr kumimoji="0" lang="en-GB" sz="2400" b="0" i="0" u="none" strike="noStrike" cap="none" normalizeH="0" baseline="0" noProof="0" dirty="0">
+                <a:ln>
+                  <a:noFill/>
+                </a:ln>
+                <a:solidFill>
+                  <a:schemeClr val="tx1"/>
+                </a:solidFill>
+                <a:effectLst/>
+                <a:latin typeface="+mj-lt"/>
+              </a:rPr>
+              <a:t>Communication and Team Integration</a:t>
+            </a:r>
+          </a:p>
+          <a:p>
+            <a:pPr marL="358775" marR="0" lvl="0" indent="-358775" algn="l" defTabSz="914400" rtl="0" eaLnBrk="0" fontAlgn="base" latinLnBrk="0" hangingPunct="0">
+              <a:lnSpc>
+                <a:spcPct val="200000"/>
+              </a:lnSpc>
+              <a:spcBef>
+                <a:spcPct val="0"/>
+              </a:spcBef>
+              <a:spcAft>
+                <a:spcPct val="0"/>
+              </a:spcAft>
+              <a:buClrTx/>
+              <a:buSzTx/>
+              <a:buFont typeface="Wingdings" panose="05000000000000000000" pitchFamily="2" charset="2"/>
+              <a:buChar char="q"/>
+              <a:tabLst/>
+            </a:pPr>
+            <a:r>
+              <a:rPr kumimoji="0" lang="en-GB" sz="2400" b="0" i="0" u="none" strike="noStrike" cap="none" normalizeH="0" baseline="0" noProof="0" dirty="0">
+                <a:ln>
+                  <a:noFill/>
+                </a:ln>
+                <a:solidFill>
+                  <a:schemeClr val="tx1"/>
+                </a:solidFill>
+                <a:effectLst/>
+                <a:latin typeface="+mj-lt"/>
+              </a:rPr>
+              <a:t>Training, Competence, and Recognition</a:t>
+            </a:r>
+          </a:p>
+          <a:p>
+            <a:pPr marL="358775" marR="0" lvl="0" indent="-358775" algn="l" defTabSz="914400" rtl="0" eaLnBrk="0" fontAlgn="base" latinLnBrk="0" hangingPunct="0">
+              <a:lnSpc>
+                <a:spcPct val="200000"/>
+              </a:lnSpc>
+              <a:spcBef>
+                <a:spcPct val="0"/>
+              </a:spcBef>
+              <a:spcAft>
+                <a:spcPct val="0"/>
+              </a:spcAft>
+              <a:buClrTx/>
+              <a:buSzTx/>
+              <a:buFont typeface="Wingdings" panose="05000000000000000000" pitchFamily="2" charset="2"/>
+              <a:buChar char="q"/>
+              <a:tabLst/>
+            </a:pPr>
+            <a:r>
+              <a:rPr kumimoji="0" lang="en-GB" sz="2400" b="0" i="0" u="none" strike="noStrike" cap="none" normalizeH="0" baseline="0" noProof="0" dirty="0">
+                <a:ln>
+                  <a:noFill/>
+                </a:ln>
+                <a:solidFill>
+                  <a:schemeClr val="tx1"/>
+                </a:solidFill>
+                <a:effectLst/>
+                <a:latin typeface="+mj-lt"/>
+              </a:rPr>
+              <a:t>Contribution to Quality and Continuity of Care</a:t>
+            </a:r>
+          </a:p>
+        </p:txBody>
+      </p:sp>
+      <p:sp>
+        <p:nvSpPr>
+          <p:cNvPr id="7" name="TextBox 6">
+            <a:extLst>
+              <a:ext uri="{FF2B5EF4-FFF2-40B4-BE49-F238E27FC236}">
+                <a16:creationId xmlns:a16="http://schemas.microsoft.com/office/drawing/2014/main" id="{A4C84AC7-9D7F-0CE9-FBD1-C0E6350BD2C4}"/>
+              </a:ext>
+            </a:extLst>
+          </p:cNvPr>
+          <p:cNvSpPr txBox="1"/>
+          <p:nvPr/>
+        </p:nvSpPr>
+        <p:spPr>
+          <a:xfrm>
+            <a:off x="3254188" y="5680048"/>
+            <a:ext cx="8821271" cy="830997"/>
+          </a:xfrm>
+          <a:prstGeom prst="rect">
+            <a:avLst/>
+          </a:prstGeom>
+          <a:noFill/>
+        </p:spPr>
+        <p:txBody>
+          <a:bodyPr wrap="square">
+            <a:spAutoFit/>
+          </a:bodyPr>
+          <a:lstStyle/>
+          <a:p>
+            <a:r>
+              <a:rPr lang="en-US" sz="1600" i="1" dirty="0"/>
+              <a:t>This review identified four dominant themes across 12 peer-reviewed studies. These themes provide a lens through which the contributions and challenges of healthcare assistants (HCAs) in palliative care can be understood. The next few slides explore each theme critically.</a:t>
+            </a:r>
+            <a:endParaRPr lang="en-GB" sz="1600" i="1" dirty="0"/>
+          </a:p>
+        </p:txBody>
+      </p:sp>
+      <p:pic>
+        <p:nvPicPr>
+          <p:cNvPr id="1027" name="Picture 3" descr="Info icon">
+            <a:extLst>
+              <a:ext uri="{FF2B5EF4-FFF2-40B4-BE49-F238E27FC236}">
+                <a16:creationId xmlns:a16="http://schemas.microsoft.com/office/drawing/2014/main" id="{B41C923B-4C7F-BB72-86AB-B96B579F1FC4}"/>
+              </a:ext>
+            </a:extLst>
+          </p:cNvPr>
+          <p:cNvPicPr>
+            <a:picLocks noChangeAspect="1" noChangeArrowheads="1"/>
+          </p:cNvPicPr>
+          <p:nvPr/>
+        </p:nvPicPr>
+        <p:blipFill>
+          <a:blip r:embed="rId2">
+            <a:extLst>
+              <a:ext uri="{28A0092B-C50C-407E-A947-70E740481C1C}">
+                <a14:useLocalDpi xmlns:a14="http://schemas.microsoft.com/office/drawing/2010/main" val="0"/>
+              </a:ext>
+            </a:extLst>
+          </a:blip>
+          <a:srcRect/>
+          <a:stretch>
+            <a:fillRect/>
+          </a:stretch>
+        </p:blipFill>
+        <p:spPr bwMode="auto">
+          <a:xfrm>
+            <a:off x="1952053" y="5680048"/>
+            <a:ext cx="860261" cy="860261"/>
+          </a:xfrm>
+          <a:prstGeom prst="rect">
+            <a:avLst/>
+          </a:prstGeom>
+          <a:noFill/>
+          <a:extLst>
+            <a:ext uri="{909E8E84-426E-40DD-AFC4-6F175D3DCCD1}">
+              <a14:hiddenFill xmlns:a14="http://schemas.microsoft.com/office/drawing/2010/main">
+                <a:solidFill>
+                  <a:srgbClr val="FFFFFF"/>
+                </a:solidFill>
+              </a14:hiddenFill>
+            </a:ext>
+          </a:extLst>
+        </p:spPr>
+      </p:pic>
+      <p:pic>
+        <p:nvPicPr>
+          <p:cNvPr id="1033" name="Picture 9">
+            <a:extLst>
+              <a:ext uri="{FF2B5EF4-FFF2-40B4-BE49-F238E27FC236}">
+                <a16:creationId xmlns:a16="http://schemas.microsoft.com/office/drawing/2014/main" id="{B65932BC-DB8A-21AE-2A85-5BC78B5B7EDF}"/>
+              </a:ext>
+            </a:extLst>
+          </p:cNvPr>
+          <p:cNvPicPr>
+            <a:picLocks noChangeAspect="1" noChangeArrowheads="1"/>
+          </p:cNvPicPr>
+          <p:nvPr/>
+        </p:nvPicPr>
+        <p:blipFill>
+          <a:blip r:embed="rId3">
+            <a:extLst>
+              <a:ext uri="{28A0092B-C50C-407E-A947-70E740481C1C}">
+                <a14:useLocalDpi xmlns:a14="http://schemas.microsoft.com/office/drawing/2010/main" val="0"/>
+              </a:ext>
+            </a:extLst>
+          </a:blip>
+          <a:srcRect/>
+          <a:stretch>
+            <a:fillRect/>
+          </a:stretch>
+        </p:blipFill>
+        <p:spPr bwMode="auto">
+          <a:xfrm>
+            <a:off x="7906871" y="1129051"/>
+            <a:ext cx="3766017" cy="4056331"/>
+          </a:xfrm>
+          <a:prstGeom prst="rect">
+            <a:avLst/>
+          </a:prstGeom>
+          <a:noFill/>
+          <a:extLst>
+            <a:ext uri="{909E8E84-426E-40DD-AFC4-6F175D3DCCD1}">
+              <a14:hiddenFill xmlns:a14="http://schemas.microsoft.com/office/drawing/2010/main">
+                <a:solidFill>
+                  <a:srgbClr val="FFFFFF"/>
+                </a:solidFill>
+              </a14:hiddenFill>
+            </a:ext>
+          </a:extLst>
+        </p:spPr>
+      </p:pic>
+    </p:spTree>
+    <p:extLst>
+      <p:ext uri="{BB962C8B-B14F-4D97-AF65-F5344CB8AC3E}">
+        <p14:creationId xmlns:p14="http://schemas.microsoft.com/office/powerpoint/2010/main" val="2968425621"/>
+      </p:ext>
+    </p:extLst>
+  </p:cSld>
+  <p:clrMapOvr>
+    <a:masterClrMapping/>
+  </p:clrMapOvr>
+</p:sld>
+</file>
+
+<file path=ppt/slides/slide3.xml><?xml version="1.0" encoding="utf-8"?>
+<p:sld xmlns:a="http://schemas.openxmlformats.org/drawingml/2006/main" xmlns:r="http://schemas.openxmlformats.org/officeDocument/2006/relationships" xmlns:p="http://schemas.openxmlformats.org/presentationml/2006/main">
+  <p:cSld>
+    <p:spTree>
+      <p:nvGrpSpPr>
+        <p:cNvPr id="1" name="">
+          <a:extLst>
+            <a:ext uri="{FF2B5EF4-FFF2-40B4-BE49-F238E27FC236}">
+              <a16:creationId xmlns:a16="http://schemas.microsoft.com/office/drawing/2014/main" id="{3B53F5B6-8A5D-BEB8-BDB7-D715CCDB50C0}"/>
+            </a:ext>
+          </a:extLst>
+        </p:cNvPr>
+        <p:cNvGrpSpPr/>
+        <p:nvPr/>
+      </p:nvGrpSpPr>
+      <p:grpSpPr>
+        <a:xfrm>
+          <a:off x="0" y="0"/>
+          <a:ext cx="0" cy="0"/>
+          <a:chOff x="0" y="0"/>
+          <a:chExt cx="0" cy="0"/>
+        </a:xfrm>
+      </p:grpSpPr>
+      <p:sp>
+        <p:nvSpPr>
+          <p:cNvPr id="3" name="TextBox 2">
+            <a:extLst>
+              <a:ext uri="{FF2B5EF4-FFF2-40B4-BE49-F238E27FC236}">
+                <a16:creationId xmlns:a16="http://schemas.microsoft.com/office/drawing/2014/main" id="{4664F409-DBDD-A0B3-36F3-D2C732A000BF}"/>
+              </a:ext>
+            </a:extLst>
+          </p:cNvPr>
+          <p:cNvSpPr txBox="1"/>
+          <p:nvPr/>
+        </p:nvSpPr>
+        <p:spPr>
+          <a:xfrm>
+            <a:off x="923364" y="681335"/>
+            <a:ext cx="8910917" cy="646331"/>
+          </a:xfrm>
+          <a:prstGeom prst="rect">
+            <a:avLst/>
+          </a:prstGeom>
+          <a:noFill/>
+        </p:spPr>
+        <p:txBody>
+          <a:bodyPr wrap="square">
+            <a:spAutoFit/>
+          </a:bodyPr>
+          <a:lstStyle/>
+          <a:p>
+            <a:r>
+              <a:rPr lang="en-US" sz="3600" b="1" dirty="0"/>
+              <a:t>Theme 1 – Emotional Labour and Burnout</a:t>
+            </a:r>
+            <a:endParaRPr lang="en-GB" sz="3600" b="1" noProof="0" dirty="0"/>
+          </a:p>
+        </p:txBody>
+      </p:sp>
+      <p:sp>
+        <p:nvSpPr>
+          <p:cNvPr id="4" name="Rectangle 3">
+            <a:extLst>
+              <a:ext uri="{FF2B5EF4-FFF2-40B4-BE49-F238E27FC236}">
+                <a16:creationId xmlns:a16="http://schemas.microsoft.com/office/drawing/2014/main" id="{EA856742-121B-35CE-3E07-F39EB2F73CF7}"/>
+              </a:ext>
+            </a:extLst>
+          </p:cNvPr>
+          <p:cNvSpPr/>
+          <p:nvPr/>
+        </p:nvSpPr>
+        <p:spPr>
+          <a:xfrm>
+            <a:off x="1066799" y="1357246"/>
+            <a:ext cx="1004047" cy="125506"/>
+          </a:xfrm>
+          <a:prstGeom prst="rect">
+            <a:avLst/>
+          </a:prstGeom>
+          <a:ln>
+            <a:noFill/>
+          </a:ln>
+        </p:spPr>
+        <p:style>
+          <a:lnRef idx="2">
+            <a:schemeClr val="accent2">
+              <a:shade val="15000"/>
+            </a:schemeClr>
+          </a:lnRef>
+          <a:fillRef idx="1">
+            <a:schemeClr val="accent2"/>
+          </a:fillRef>
+          <a:effectRef idx="0">
+            <a:schemeClr val="accent2"/>
+          </a:effectRef>
+          <a:fontRef idx="minor">
+            <a:schemeClr val="lt1"/>
+          </a:fontRef>
+        </p:style>
+        <p:txBody>
+          <a:bodyPr rtlCol="0" anchor="ctr"/>
+          <a:lstStyle/>
+          <a:p>
+            <a:pPr algn="ctr"/>
+            <a:endParaRPr lang="en-GB" noProof="0" dirty="0"/>
+          </a:p>
+        </p:txBody>
+      </p:sp>
+      <p:sp>
+        <p:nvSpPr>
+          <p:cNvPr id="2" name="Rectangle 1">
+            <a:extLst>
+              <a:ext uri="{FF2B5EF4-FFF2-40B4-BE49-F238E27FC236}">
+                <a16:creationId xmlns:a16="http://schemas.microsoft.com/office/drawing/2014/main" id="{9A108239-4CA3-F098-427C-D60EABFF1507}"/>
+              </a:ext>
+            </a:extLst>
+          </p:cNvPr>
+          <p:cNvSpPr>
+            <a:spLocks noChangeArrowheads="1"/>
+          </p:cNvSpPr>
+          <p:nvPr/>
+        </p:nvSpPr>
+        <p:spPr bwMode="auto">
+          <a:xfrm>
+            <a:off x="1057656" y="1622070"/>
+            <a:ext cx="10226040" cy="4622869"/>
+          </a:xfrm>
+          <a:prstGeom prst="rect">
+            <a:avLst/>
+          </a:prstGeom>
+          <a:noFill/>
+          <a:ln>
+            <a:noFill/>
+          </a:ln>
+          <a:effectLst/>
+          <a:extLst>
+            <a:ext uri="{909E8E84-426E-40DD-AFC4-6F175D3DCCD1}">
+              <a14:hiddenFill xmlns:a14="http://schemas.microsoft.com/office/drawing/2010/main">
+                <a:solidFill>
+                  <a:schemeClr val="accent1"/>
+                </a:solidFill>
+              </a14:hiddenFill>
+            </a:ext>
+            <a:ext uri="{91240B29-F687-4F45-9708-019B960494DF}">
+              <a14:hiddenLine xmlns:a14="http://schemas.microsoft.com/office/drawing/2010/main" w="9525">
+                <a:solidFill>
+                  <a:schemeClr val="tx1"/>
+                </a:solidFill>
+                <a:miter lim="800000"/>
+                <a:headEnd/>
+                <a:tailEnd/>
+              </a14:hiddenLine>
+            </a:ext>
+            <a:ext uri="{AF507438-7753-43E0-B8FC-AC1667EBCBE1}">
+              <a14:hiddenEffects xmlns:a14="http://schemas.microsoft.com/office/drawing/2010/main">
+                <a:effectLst>
+                  <a:outerShdw dist="35921" dir="2700000" algn="ctr" rotWithShape="0">
+                    <a:schemeClr val="bg2"/>
+                  </a:outerShdw>
+                </a:effectLst>
+              </a14:hiddenEffects>
+            </a:ext>
+          </a:extLst>
+        </p:spPr>
+        <p:txBody>
+          <a:bodyPr vert="horz" wrap="square" lIns="91440" tIns="45720" rIns="91440" bIns="45720" numCol="1" anchor="ctr" anchorCtr="0" compatLnSpc="1">
+            <a:prstTxWarp prst="textNoShape">
+              <a:avLst/>
+            </a:prstTxWarp>
+            <a:spAutoFit/>
+          </a:bodyPr>
+          <a:lstStyle/>
+          <a:p>
+            <a:pPr marL="357188" marR="0" lvl="0" indent="-357188" algn="just" defTabSz="914400" rtl="0" eaLnBrk="0" fontAlgn="base" latinLnBrk="0" hangingPunct="0">
+              <a:lnSpc>
+                <a:spcPct val="150000"/>
+              </a:lnSpc>
+              <a:spcBef>
+                <a:spcPct val="0"/>
+              </a:spcBef>
+              <a:spcAft>
+                <a:spcPct val="0"/>
+              </a:spcAft>
+              <a:buClrTx/>
+              <a:buSzTx/>
+              <a:buFont typeface="Wingdings" panose="05000000000000000000" pitchFamily="2" charset="2"/>
+              <a:buChar char="ü"/>
+              <a:tabLst/>
+            </a:pPr>
+            <a:r>
+              <a:rPr kumimoji="0" lang="en-US" altLang="en-US" b="0" i="0" u="none" strike="noStrike" cap="none" normalizeH="0" baseline="0" dirty="0">
+                <a:ln>
+                  <a:noFill/>
+                </a:ln>
+                <a:solidFill>
+                  <a:schemeClr val="tx1"/>
+                </a:solidFill>
+                <a:effectLst/>
+                <a:latin typeface="+mj-lt"/>
+              </a:rPr>
+              <a:t>HCAs face significant emotional strain due to close, prolonged care with terminal patients (Akram et al., 2017; Molero Jurado et al., 2018).</a:t>
+            </a:r>
+          </a:p>
+          <a:p>
+            <a:pPr marL="357188" marR="0" lvl="0" indent="-357188" algn="just" defTabSz="914400" rtl="0" eaLnBrk="0" fontAlgn="base" latinLnBrk="0" hangingPunct="0">
+              <a:lnSpc>
+                <a:spcPct val="150000"/>
+              </a:lnSpc>
+              <a:spcBef>
+                <a:spcPct val="0"/>
+              </a:spcBef>
+              <a:spcAft>
+                <a:spcPct val="0"/>
+              </a:spcAft>
+              <a:buClrTx/>
+              <a:buSzTx/>
+              <a:buFont typeface="Wingdings" panose="05000000000000000000" pitchFamily="2" charset="2"/>
+              <a:buChar char="ü"/>
+              <a:tabLst/>
+            </a:pPr>
+            <a:endParaRPr kumimoji="0" lang="en-US" altLang="en-US" b="0" i="0" u="none" strike="noStrike" cap="none" normalizeH="0" baseline="0" dirty="0">
+              <a:ln>
+                <a:noFill/>
+              </a:ln>
+              <a:solidFill>
+                <a:schemeClr val="tx1"/>
+              </a:solidFill>
+              <a:effectLst/>
+              <a:latin typeface="+mj-lt"/>
+            </a:endParaRPr>
+          </a:p>
+          <a:p>
+            <a:pPr marL="357188" marR="0" lvl="0" indent="-357188" algn="just" defTabSz="914400" rtl="0" eaLnBrk="0" fontAlgn="base" latinLnBrk="0" hangingPunct="0">
+              <a:lnSpc>
+                <a:spcPct val="150000"/>
+              </a:lnSpc>
+              <a:spcBef>
+                <a:spcPct val="0"/>
+              </a:spcBef>
+              <a:spcAft>
+                <a:spcPct val="0"/>
+              </a:spcAft>
+              <a:buClrTx/>
+              <a:buSzTx/>
+              <a:buFont typeface="Wingdings" panose="05000000000000000000" pitchFamily="2" charset="2"/>
+              <a:buChar char="ü"/>
+              <a:tabLst/>
+            </a:pPr>
+            <a:r>
+              <a:rPr kumimoji="0" lang="en-US" altLang="en-US" b="0" i="0" u="none" strike="noStrike" cap="none" normalizeH="0" baseline="0" dirty="0">
+                <a:ln>
+                  <a:noFill/>
+                </a:ln>
+                <a:solidFill>
+                  <a:schemeClr val="tx1"/>
+                </a:solidFill>
+                <a:effectLst/>
+                <a:latin typeface="+mj-lt"/>
+              </a:rPr>
+              <a:t>High levels of burnout were linked to a lack of emotional support and coping strategies (Bamonti et al., 2017; Navarro-Abal et al., 2018).</a:t>
+            </a:r>
+          </a:p>
+          <a:p>
+            <a:pPr marL="357188" marR="0" lvl="0" indent="-357188" algn="just" defTabSz="914400" rtl="0" eaLnBrk="0" fontAlgn="base" latinLnBrk="0" hangingPunct="0">
+              <a:lnSpc>
+                <a:spcPct val="150000"/>
+              </a:lnSpc>
+              <a:spcBef>
+                <a:spcPct val="0"/>
+              </a:spcBef>
+              <a:spcAft>
+                <a:spcPct val="0"/>
+              </a:spcAft>
+              <a:buClrTx/>
+              <a:buSzTx/>
+              <a:buFont typeface="Wingdings" panose="05000000000000000000" pitchFamily="2" charset="2"/>
+              <a:buChar char="ü"/>
+              <a:tabLst/>
+            </a:pPr>
+            <a:endParaRPr kumimoji="0" lang="en-US" altLang="en-US" b="0" i="0" u="none" strike="noStrike" cap="none" normalizeH="0" baseline="0" dirty="0">
+              <a:ln>
+                <a:noFill/>
+              </a:ln>
+              <a:solidFill>
+                <a:schemeClr val="tx1"/>
+              </a:solidFill>
+              <a:effectLst/>
+              <a:latin typeface="+mj-lt"/>
+            </a:endParaRPr>
+          </a:p>
+          <a:p>
+            <a:pPr marL="357188" marR="0" lvl="0" indent="-357188" algn="just" defTabSz="914400" rtl="0" eaLnBrk="0" fontAlgn="base" latinLnBrk="0" hangingPunct="0">
+              <a:lnSpc>
+                <a:spcPct val="150000"/>
+              </a:lnSpc>
+              <a:spcBef>
+                <a:spcPct val="0"/>
+              </a:spcBef>
+              <a:spcAft>
+                <a:spcPct val="0"/>
+              </a:spcAft>
+              <a:buClrTx/>
+              <a:buSzTx/>
+              <a:buFont typeface="Wingdings" panose="05000000000000000000" pitchFamily="2" charset="2"/>
+              <a:buChar char="ü"/>
+              <a:tabLst/>
+            </a:pPr>
+            <a:r>
+              <a:rPr kumimoji="0" lang="en-US" altLang="en-US" b="0" i="0" u="none" strike="noStrike" cap="none" normalizeH="0" baseline="0" dirty="0">
+                <a:ln>
+                  <a:noFill/>
+                </a:ln>
+                <a:solidFill>
+                  <a:schemeClr val="tx1"/>
+                </a:solidFill>
+                <a:effectLst/>
+                <a:latin typeface="+mj-lt"/>
+              </a:rPr>
+              <a:t>COVID-19 worsened emotional distress due to fear of infection and isolation (Schrader et al., 2023; Yip et al., 2024).</a:t>
+            </a:r>
+          </a:p>
+          <a:p>
+            <a:pPr marL="357188" marR="0" lvl="0" indent="-357188" algn="just" defTabSz="914400" rtl="0" eaLnBrk="0" fontAlgn="base" latinLnBrk="0" hangingPunct="0">
+              <a:lnSpc>
+                <a:spcPct val="150000"/>
+              </a:lnSpc>
+              <a:spcBef>
+                <a:spcPct val="0"/>
+              </a:spcBef>
+              <a:spcAft>
+                <a:spcPct val="0"/>
+              </a:spcAft>
+              <a:buClrTx/>
+              <a:buSzTx/>
+              <a:buFont typeface="Wingdings" panose="05000000000000000000" pitchFamily="2" charset="2"/>
+              <a:buChar char="ü"/>
+              <a:tabLst/>
+            </a:pPr>
+            <a:endParaRPr kumimoji="0" lang="en-US" altLang="en-US" b="0" i="0" u="none" strike="noStrike" cap="none" normalizeH="0" baseline="0" dirty="0">
+              <a:ln>
+                <a:noFill/>
+              </a:ln>
+              <a:solidFill>
+                <a:schemeClr val="tx1"/>
+              </a:solidFill>
+              <a:effectLst/>
+              <a:latin typeface="+mj-lt"/>
+            </a:endParaRPr>
+          </a:p>
+          <a:p>
+            <a:pPr marL="357188" marR="0" lvl="0" indent="-357188" algn="just" defTabSz="914400" rtl="0" eaLnBrk="0" fontAlgn="base" latinLnBrk="0" hangingPunct="0">
+              <a:lnSpc>
+                <a:spcPct val="150000"/>
+              </a:lnSpc>
+              <a:spcBef>
+                <a:spcPct val="0"/>
+              </a:spcBef>
+              <a:spcAft>
+                <a:spcPct val="0"/>
+              </a:spcAft>
+              <a:buClrTx/>
+              <a:buSzTx/>
+              <a:buFont typeface="Wingdings" panose="05000000000000000000" pitchFamily="2" charset="2"/>
+              <a:buChar char="ü"/>
+              <a:tabLst/>
+            </a:pPr>
+            <a:r>
+              <a:rPr kumimoji="0" lang="en-US" altLang="en-US" b="0" i="0" u="none" strike="noStrike" cap="none" normalizeH="0" baseline="0" dirty="0">
+                <a:ln>
+                  <a:noFill/>
+                </a:ln>
+                <a:solidFill>
+                  <a:schemeClr val="tx1"/>
+                </a:solidFill>
+                <a:effectLst/>
+                <a:latin typeface="+mj-lt"/>
+              </a:rPr>
+              <a:t>Despite their emotional burden, HCAs are often overlooked in institutional burnout support (Blanco-Donoso et al., 2021; Carlebach &amp; Shucksmith, 2020).</a:t>
+            </a:r>
+          </a:p>
+        </p:txBody>
+      </p:sp>
+    </p:spTree>
+    <p:extLst>
+      <p:ext uri="{BB962C8B-B14F-4D97-AF65-F5344CB8AC3E}">
+        <p14:creationId xmlns:p14="http://schemas.microsoft.com/office/powerpoint/2010/main" val="1436760748"/>
+      </p:ext>
+    </p:extLst>
+  </p:cSld>
+  <p:clrMapOvr>
+    <a:masterClrMapping/>
+  </p:clrMapOvr>
+</p:sld>
+</file>
+
+<file path=ppt/slides/slide4.xml><?xml version="1.0" encoding="utf-8"?>
+<p:sld xmlns:a="http://schemas.openxmlformats.org/drawingml/2006/main" xmlns:r="http://schemas.openxmlformats.org/officeDocument/2006/relationships" xmlns:p="http://schemas.openxmlformats.org/presentationml/2006/main">
+  <p:cSld>
+    <p:spTree>
+      <p:nvGrpSpPr>
+        <p:cNvPr id="1" name="">
+          <a:extLst>
+            <a:ext uri="{FF2B5EF4-FFF2-40B4-BE49-F238E27FC236}">
+              <a16:creationId xmlns:a16="http://schemas.microsoft.com/office/drawing/2014/main" id="{81E6226F-1239-2B18-6661-29171C6135CC}"/>
+            </a:ext>
+          </a:extLst>
+        </p:cNvPr>
+        <p:cNvGrpSpPr/>
+        <p:nvPr/>
+      </p:nvGrpSpPr>
+      <p:grpSpPr>
+        <a:xfrm>
+          <a:off x="0" y="0"/>
+          <a:ext cx="0" cy="0"/>
+          <a:chOff x="0" y="0"/>
+          <a:chExt cx="0" cy="0"/>
+        </a:xfrm>
+      </p:grpSpPr>
+      <p:sp>
+        <p:nvSpPr>
+          <p:cNvPr id="3" name="TextBox 2">
+            <a:extLst>
+              <a:ext uri="{FF2B5EF4-FFF2-40B4-BE49-F238E27FC236}">
+                <a16:creationId xmlns:a16="http://schemas.microsoft.com/office/drawing/2014/main" id="{ED3CA1A5-AB37-E21E-B8EE-9F671FAB6B1F}"/>
+              </a:ext>
+            </a:extLst>
+          </p:cNvPr>
+          <p:cNvSpPr txBox="1"/>
+          <p:nvPr/>
+        </p:nvSpPr>
+        <p:spPr>
+          <a:xfrm>
+            <a:off x="923364" y="681335"/>
+            <a:ext cx="10406052" cy="646331"/>
+          </a:xfrm>
+          <a:prstGeom prst="rect">
+            <a:avLst/>
+          </a:prstGeom>
+          <a:noFill/>
+        </p:spPr>
+        <p:txBody>
+          <a:bodyPr wrap="square">
+            <a:spAutoFit/>
+          </a:bodyPr>
+          <a:lstStyle/>
+          <a:p>
+            <a:r>
+              <a:rPr lang="en-US" sz="3600" b="1" dirty="0"/>
+              <a:t>Theme 2 – Communication and Team Integration</a:t>
+            </a:r>
+            <a:endParaRPr lang="en-GB" sz="3600" b="1" noProof="0" dirty="0"/>
+          </a:p>
+        </p:txBody>
+      </p:sp>
+      <p:sp>
+        <p:nvSpPr>
+          <p:cNvPr id="4" name="Rectangle 3">
+            <a:extLst>
+              <a:ext uri="{FF2B5EF4-FFF2-40B4-BE49-F238E27FC236}">
+                <a16:creationId xmlns:a16="http://schemas.microsoft.com/office/drawing/2014/main" id="{B4870263-93A5-E33B-7AF6-6DC54F49EE46}"/>
+              </a:ext>
+            </a:extLst>
+          </p:cNvPr>
+          <p:cNvSpPr/>
+          <p:nvPr/>
+        </p:nvSpPr>
+        <p:spPr>
+          <a:xfrm>
+            <a:off x="1066799" y="1357246"/>
+            <a:ext cx="1004047" cy="125506"/>
+          </a:xfrm>
+          <a:prstGeom prst="rect">
+            <a:avLst/>
+          </a:prstGeom>
+          <a:ln>
+            <a:noFill/>
+          </a:ln>
+        </p:spPr>
+        <p:style>
+          <a:lnRef idx="2">
+            <a:schemeClr val="accent2">
+              <a:shade val="15000"/>
+            </a:schemeClr>
+          </a:lnRef>
+          <a:fillRef idx="1">
+            <a:schemeClr val="accent2"/>
+          </a:fillRef>
+          <a:effectRef idx="0">
+            <a:schemeClr val="accent2"/>
+          </a:effectRef>
+          <a:fontRef idx="minor">
+            <a:schemeClr val="lt1"/>
+          </a:fontRef>
+        </p:style>
+        <p:txBody>
+          <a:bodyPr rtlCol="0" anchor="ctr"/>
+          <a:lstStyle/>
+          <a:p>
+            <a:pPr algn="ctr"/>
+            <a:endParaRPr lang="en-GB" noProof="0" dirty="0"/>
+          </a:p>
+        </p:txBody>
+      </p:sp>
+      <p:sp>
+        <p:nvSpPr>
+          <p:cNvPr id="2" name="Rectangle 1">
+            <a:extLst>
+              <a:ext uri="{FF2B5EF4-FFF2-40B4-BE49-F238E27FC236}">
+                <a16:creationId xmlns:a16="http://schemas.microsoft.com/office/drawing/2014/main" id="{8CDC5139-7D4B-DA94-AC9B-2F9B4F8DD478}"/>
+              </a:ext>
+            </a:extLst>
+          </p:cNvPr>
+          <p:cNvSpPr>
+            <a:spLocks noChangeArrowheads="1"/>
+          </p:cNvSpPr>
+          <p:nvPr/>
+        </p:nvSpPr>
+        <p:spPr bwMode="auto">
+          <a:xfrm>
+            <a:off x="1057656" y="1622071"/>
+            <a:ext cx="10406052" cy="4622869"/>
+          </a:xfrm>
+          <a:prstGeom prst="rect">
+            <a:avLst/>
+          </a:prstGeom>
+          <a:noFill/>
+          <a:ln>
+            <a:noFill/>
+          </a:ln>
+          <a:effectLst/>
+          <a:extLst>
+            <a:ext uri="{909E8E84-426E-40DD-AFC4-6F175D3DCCD1}">
+              <a14:hiddenFill xmlns:a14="http://schemas.microsoft.com/office/drawing/2010/main">
+                <a:solidFill>
+                  <a:schemeClr val="accent1"/>
+                </a:solidFill>
+              </a14:hiddenFill>
+            </a:ext>
+            <a:ext uri="{91240B29-F687-4F45-9708-019B960494DF}">
+              <a14:hiddenLine xmlns:a14="http://schemas.microsoft.com/office/drawing/2010/main" w="9525">
+                <a:solidFill>
+                  <a:schemeClr val="tx1"/>
+                </a:solidFill>
+                <a:miter lim="800000"/>
+                <a:headEnd/>
+                <a:tailEnd/>
+              </a14:hiddenLine>
+            </a:ext>
+            <a:ext uri="{AF507438-7753-43E0-B8FC-AC1667EBCBE1}">
+              <a14:hiddenEffects xmlns:a14="http://schemas.microsoft.com/office/drawing/2010/main">
+                <a:effectLst>
+                  <a:outerShdw dist="35921" dir="2700000" algn="ctr" rotWithShape="0">
+                    <a:schemeClr val="bg2"/>
+                  </a:outerShdw>
+                </a:effectLst>
+              </a14:hiddenEffects>
+            </a:ext>
+          </a:extLst>
+        </p:spPr>
+        <p:txBody>
+          <a:bodyPr vert="horz" wrap="square" lIns="91440" tIns="45720" rIns="91440" bIns="45720" numCol="1" anchor="ctr" anchorCtr="0" compatLnSpc="1">
+            <a:prstTxWarp prst="textNoShape">
+              <a:avLst/>
+            </a:prstTxWarp>
+            <a:spAutoFit/>
+          </a:bodyPr>
+          <a:lstStyle/>
+          <a:p>
+            <a:pPr marL="357188" marR="0" lvl="0" indent="-357188" algn="just" defTabSz="914400" rtl="0" eaLnBrk="0" fontAlgn="base" latinLnBrk="0" hangingPunct="0">
+              <a:lnSpc>
+                <a:spcPct val="150000"/>
+              </a:lnSpc>
+              <a:spcBef>
+                <a:spcPct val="0"/>
+              </a:spcBef>
+              <a:spcAft>
+                <a:spcPct val="0"/>
+              </a:spcAft>
+              <a:buClrTx/>
+              <a:buSzTx/>
+              <a:buFont typeface="Wingdings" panose="05000000000000000000" pitchFamily="2" charset="2"/>
+              <a:buChar char="ü"/>
+              <a:tabLst/>
+            </a:pPr>
+            <a:r>
+              <a:rPr kumimoji="0" lang="en-US" altLang="en-US" b="0" i="0" u="none" strike="noStrike" cap="none" normalizeH="0" baseline="0" dirty="0">
+                <a:ln>
+                  <a:noFill/>
+                </a:ln>
+                <a:solidFill>
+                  <a:schemeClr val="tx1"/>
+                </a:solidFill>
+                <a:effectLst/>
+                <a:latin typeface="+mj-lt"/>
+              </a:rPr>
+              <a:t>Fragmented communication often excludes HCAs from clinical decision-making (McPherson et al., 2019; Carlebach &amp; Shucksmith, 2020).</a:t>
+            </a:r>
+          </a:p>
+          <a:p>
+            <a:pPr marL="357188" marR="0" lvl="0" indent="-357188" algn="just" defTabSz="914400" rtl="0" eaLnBrk="0" fontAlgn="base" latinLnBrk="0" hangingPunct="0">
+              <a:lnSpc>
+                <a:spcPct val="150000"/>
+              </a:lnSpc>
+              <a:spcBef>
+                <a:spcPct val="0"/>
+              </a:spcBef>
+              <a:spcAft>
+                <a:spcPct val="0"/>
+              </a:spcAft>
+              <a:buClrTx/>
+              <a:buSzTx/>
+              <a:buFont typeface="Wingdings" panose="05000000000000000000" pitchFamily="2" charset="2"/>
+              <a:buChar char="ü"/>
+              <a:tabLst/>
+            </a:pPr>
+            <a:endParaRPr kumimoji="0" lang="en-US" altLang="en-US" b="0" i="0" u="none" strike="noStrike" cap="none" normalizeH="0" baseline="0" dirty="0">
+              <a:ln>
+                <a:noFill/>
+              </a:ln>
+              <a:solidFill>
+                <a:schemeClr val="tx1"/>
+              </a:solidFill>
+              <a:effectLst/>
+              <a:latin typeface="+mj-lt"/>
+            </a:endParaRPr>
+          </a:p>
+          <a:p>
+            <a:pPr marL="357188" marR="0" lvl="0" indent="-357188" algn="just" defTabSz="914400" rtl="0" eaLnBrk="0" fontAlgn="base" latinLnBrk="0" hangingPunct="0">
+              <a:lnSpc>
+                <a:spcPct val="150000"/>
+              </a:lnSpc>
+              <a:spcBef>
+                <a:spcPct val="0"/>
+              </a:spcBef>
+              <a:spcAft>
+                <a:spcPct val="0"/>
+              </a:spcAft>
+              <a:buClrTx/>
+              <a:buSzTx/>
+              <a:buFont typeface="Wingdings" panose="05000000000000000000" pitchFamily="2" charset="2"/>
+              <a:buChar char="ü"/>
+              <a:tabLst/>
+            </a:pPr>
+            <a:r>
+              <a:rPr kumimoji="0" lang="en-US" altLang="en-US" b="0" i="0" u="none" strike="noStrike" cap="none" normalizeH="0" baseline="0" dirty="0">
+                <a:ln>
+                  <a:noFill/>
+                </a:ln>
+                <a:solidFill>
+                  <a:schemeClr val="tx1"/>
+                </a:solidFill>
+                <a:effectLst/>
+                <a:latin typeface="+mj-lt"/>
+              </a:rPr>
+              <a:t>Studies highlighted HCAs' struggle to advocate for patients without authority (Jansen et al., 2017; Yip et al., 2024).</a:t>
+            </a:r>
+          </a:p>
+          <a:p>
+            <a:pPr marL="357188" marR="0" lvl="0" indent="-357188" algn="just" defTabSz="914400" rtl="0" eaLnBrk="0" fontAlgn="base" latinLnBrk="0" hangingPunct="0">
+              <a:lnSpc>
+                <a:spcPct val="150000"/>
+              </a:lnSpc>
+              <a:spcBef>
+                <a:spcPct val="0"/>
+              </a:spcBef>
+              <a:spcAft>
+                <a:spcPct val="0"/>
+              </a:spcAft>
+              <a:buClrTx/>
+              <a:buSzTx/>
+              <a:buFont typeface="Wingdings" panose="05000000000000000000" pitchFamily="2" charset="2"/>
+              <a:buChar char="ü"/>
+              <a:tabLst/>
+            </a:pPr>
+            <a:endParaRPr kumimoji="0" lang="en-US" altLang="en-US" b="0" i="0" u="none" strike="noStrike" cap="none" normalizeH="0" baseline="0" dirty="0">
+              <a:ln>
+                <a:noFill/>
+              </a:ln>
+              <a:solidFill>
+                <a:schemeClr val="tx1"/>
+              </a:solidFill>
+              <a:effectLst/>
+              <a:latin typeface="+mj-lt"/>
+            </a:endParaRPr>
+          </a:p>
+          <a:p>
+            <a:pPr marL="357188" marR="0" lvl="0" indent="-357188" algn="just" defTabSz="914400" rtl="0" eaLnBrk="0" fontAlgn="base" latinLnBrk="0" hangingPunct="0">
+              <a:lnSpc>
+                <a:spcPct val="150000"/>
+              </a:lnSpc>
+              <a:spcBef>
+                <a:spcPct val="0"/>
+              </a:spcBef>
+              <a:spcAft>
+                <a:spcPct val="0"/>
+              </a:spcAft>
+              <a:buClrTx/>
+              <a:buSzTx/>
+              <a:buFont typeface="Wingdings" panose="05000000000000000000" pitchFamily="2" charset="2"/>
+              <a:buChar char="ü"/>
+              <a:tabLst/>
+            </a:pPr>
+            <a:r>
+              <a:rPr kumimoji="0" lang="en-US" altLang="en-US" b="0" i="0" u="none" strike="noStrike" cap="none" normalizeH="0" baseline="0" dirty="0">
+                <a:ln>
+                  <a:noFill/>
+                </a:ln>
+                <a:solidFill>
+                  <a:schemeClr val="tx1"/>
+                </a:solidFill>
+                <a:effectLst/>
+                <a:latin typeface="+mj-lt"/>
+              </a:rPr>
+              <a:t>Poor integration into multidisciplinary teams undermines collaborative care (Seow, 2018; Navarro-Abal et al., 2018).</a:t>
+            </a:r>
+          </a:p>
+          <a:p>
+            <a:pPr marL="357188" marR="0" lvl="0" indent="-357188" algn="just" defTabSz="914400" rtl="0" eaLnBrk="0" fontAlgn="base" latinLnBrk="0" hangingPunct="0">
+              <a:lnSpc>
+                <a:spcPct val="150000"/>
+              </a:lnSpc>
+              <a:spcBef>
+                <a:spcPct val="0"/>
+              </a:spcBef>
+              <a:spcAft>
+                <a:spcPct val="0"/>
+              </a:spcAft>
+              <a:buClrTx/>
+              <a:buSzTx/>
+              <a:buFont typeface="Wingdings" panose="05000000000000000000" pitchFamily="2" charset="2"/>
+              <a:buChar char="ü"/>
+              <a:tabLst/>
+            </a:pPr>
+            <a:endParaRPr kumimoji="0" lang="en-US" altLang="en-US" b="0" i="0" u="none" strike="noStrike" cap="none" normalizeH="0" baseline="0" dirty="0">
+              <a:ln>
+                <a:noFill/>
+              </a:ln>
+              <a:solidFill>
+                <a:schemeClr val="tx1"/>
+              </a:solidFill>
+              <a:effectLst/>
+              <a:latin typeface="+mj-lt"/>
+            </a:endParaRPr>
+          </a:p>
+          <a:p>
+            <a:pPr marL="357188" marR="0" lvl="0" indent="-357188" algn="just" defTabSz="914400" rtl="0" eaLnBrk="0" fontAlgn="base" latinLnBrk="0" hangingPunct="0">
+              <a:lnSpc>
+                <a:spcPct val="150000"/>
+              </a:lnSpc>
+              <a:spcBef>
+                <a:spcPct val="0"/>
+              </a:spcBef>
+              <a:spcAft>
+                <a:spcPct val="0"/>
+              </a:spcAft>
+              <a:buClrTx/>
+              <a:buSzTx/>
+              <a:buFont typeface="Wingdings" panose="05000000000000000000" pitchFamily="2" charset="2"/>
+              <a:buChar char="ü"/>
+              <a:tabLst/>
+            </a:pPr>
+            <a:r>
+              <a:rPr kumimoji="0" lang="en-US" altLang="en-US" b="0" i="0" u="none" strike="noStrike" cap="none" normalizeH="0" baseline="0" dirty="0">
+                <a:ln>
+                  <a:noFill/>
+                </a:ln>
+                <a:solidFill>
+                  <a:schemeClr val="tx1"/>
+                </a:solidFill>
+                <a:effectLst/>
+                <a:latin typeface="+mj-lt"/>
+              </a:rPr>
+              <a:t>When included, HCA contributions enhanced patient monitoring and early symptom detection (Molero Jurado et al., 2018; McPherson et al., 2019).</a:t>
+            </a:r>
+          </a:p>
+        </p:txBody>
+      </p:sp>
+    </p:spTree>
+    <p:extLst>
+      <p:ext uri="{BB962C8B-B14F-4D97-AF65-F5344CB8AC3E}">
+        <p14:creationId xmlns:p14="http://schemas.microsoft.com/office/powerpoint/2010/main" val="717373673"/>
+      </p:ext>
+    </p:extLst>
+  </p:cSld>
+  <p:clrMapOvr>
+    <a:masterClrMapping/>
+  </p:clrMapOvr>
+</p:sld>
+</file>
+
+<file path=ppt/slides/slide5.xml><?xml version="1.0" encoding="utf-8"?>
+<p:sld xmlns:a="http://schemas.openxmlformats.org/drawingml/2006/main" xmlns:r="http://schemas.openxmlformats.org/officeDocument/2006/relationships" xmlns:p="http://schemas.openxmlformats.org/presentationml/2006/main">
+  <p:cSld>
+    <p:spTree>
+      <p:nvGrpSpPr>
+        <p:cNvPr id="1" name="">
+          <a:extLst>
+            <a:ext uri="{FF2B5EF4-FFF2-40B4-BE49-F238E27FC236}">
+              <a16:creationId xmlns:a16="http://schemas.microsoft.com/office/drawing/2014/main" id="{21D4AEB3-5064-F651-8B2F-0BAB1A55FD97}"/>
+            </a:ext>
+          </a:extLst>
+        </p:cNvPr>
+        <p:cNvGrpSpPr/>
+        <p:nvPr/>
+      </p:nvGrpSpPr>
+      <p:grpSpPr>
+        <a:xfrm>
+          <a:off x="0" y="0"/>
+          <a:ext cx="0" cy="0"/>
+          <a:chOff x="0" y="0"/>
+          <a:chExt cx="0" cy="0"/>
+        </a:xfrm>
+      </p:grpSpPr>
+      <p:sp>
+        <p:nvSpPr>
+          <p:cNvPr id="3" name="TextBox 2">
+            <a:extLst>
+              <a:ext uri="{FF2B5EF4-FFF2-40B4-BE49-F238E27FC236}">
+                <a16:creationId xmlns:a16="http://schemas.microsoft.com/office/drawing/2014/main" id="{C5CBF29C-31CC-D89D-D5C1-8BAFB22B2A11}"/>
+              </a:ext>
+            </a:extLst>
+          </p:cNvPr>
+          <p:cNvSpPr txBox="1"/>
+          <p:nvPr/>
+        </p:nvSpPr>
+        <p:spPr>
+          <a:xfrm>
+            <a:off x="923364" y="681335"/>
+            <a:ext cx="10406052" cy="646331"/>
+          </a:xfrm>
+          <a:prstGeom prst="rect">
+            <a:avLst/>
+          </a:prstGeom>
+          <a:noFill/>
+        </p:spPr>
+        <p:txBody>
+          <a:bodyPr wrap="square">
+            <a:spAutoFit/>
+          </a:bodyPr>
+          <a:lstStyle/>
+          <a:p>
+            <a:r>
+              <a:rPr lang="en-US" sz="3600" b="1" dirty="0"/>
+              <a:t>Theme 3 – Training, Competence and Recognition</a:t>
+            </a:r>
+            <a:endParaRPr lang="en-GB" sz="3600" b="1" noProof="0" dirty="0"/>
+          </a:p>
+        </p:txBody>
+      </p:sp>
+      <p:sp>
+        <p:nvSpPr>
+          <p:cNvPr id="4" name="Rectangle 3">
+            <a:extLst>
+              <a:ext uri="{FF2B5EF4-FFF2-40B4-BE49-F238E27FC236}">
+                <a16:creationId xmlns:a16="http://schemas.microsoft.com/office/drawing/2014/main" id="{35157849-1172-565B-AF10-40672B69F4D2}"/>
+              </a:ext>
+            </a:extLst>
+          </p:cNvPr>
+          <p:cNvSpPr/>
+          <p:nvPr/>
+        </p:nvSpPr>
+        <p:spPr>
+          <a:xfrm>
+            <a:off x="1066799" y="1357246"/>
+            <a:ext cx="1004047" cy="125506"/>
+          </a:xfrm>
+          <a:prstGeom prst="rect">
+            <a:avLst/>
+          </a:prstGeom>
+          <a:ln>
+            <a:noFill/>
+          </a:ln>
+        </p:spPr>
+        <p:style>
+          <a:lnRef idx="2">
+            <a:schemeClr val="accent2">
+              <a:shade val="15000"/>
+            </a:schemeClr>
+          </a:lnRef>
+          <a:fillRef idx="1">
+            <a:schemeClr val="accent2"/>
+          </a:fillRef>
+          <a:effectRef idx="0">
+            <a:schemeClr val="accent2"/>
+          </a:effectRef>
+          <a:fontRef idx="minor">
+            <a:schemeClr val="lt1"/>
+          </a:fontRef>
+        </p:style>
+        <p:txBody>
+          <a:bodyPr rtlCol="0" anchor="ctr"/>
+          <a:lstStyle/>
+          <a:p>
+            <a:pPr algn="ctr"/>
+            <a:endParaRPr lang="en-GB" noProof="0" dirty="0"/>
+          </a:p>
+        </p:txBody>
+      </p:sp>
+      <p:sp>
+        <p:nvSpPr>
+          <p:cNvPr id="2" name="Rectangle 1">
+            <a:extLst>
+              <a:ext uri="{FF2B5EF4-FFF2-40B4-BE49-F238E27FC236}">
+                <a16:creationId xmlns:a16="http://schemas.microsoft.com/office/drawing/2014/main" id="{07443457-DB12-6F21-7C93-1246BD084D9F}"/>
+              </a:ext>
+            </a:extLst>
+          </p:cNvPr>
+          <p:cNvSpPr>
+            <a:spLocks noChangeArrowheads="1"/>
+          </p:cNvSpPr>
+          <p:nvPr/>
+        </p:nvSpPr>
+        <p:spPr bwMode="auto">
+          <a:xfrm>
+            <a:off x="1057656" y="1622072"/>
+            <a:ext cx="10406052" cy="4622869"/>
+          </a:xfrm>
+          <a:prstGeom prst="rect">
+            <a:avLst/>
+          </a:prstGeom>
+          <a:noFill/>
+          <a:ln>
+            <a:noFill/>
+          </a:ln>
+          <a:effectLst/>
+          <a:extLst>
+            <a:ext uri="{909E8E84-426E-40DD-AFC4-6F175D3DCCD1}">
+              <a14:hiddenFill xmlns:a14="http://schemas.microsoft.com/office/drawing/2010/main">
+                <a:solidFill>
+                  <a:schemeClr val="accent1"/>
+                </a:solidFill>
+              </a14:hiddenFill>
+            </a:ext>
+            <a:ext uri="{91240B29-F687-4F45-9708-019B960494DF}">
+              <a14:hiddenLine xmlns:a14="http://schemas.microsoft.com/office/drawing/2010/main" w="9525">
+                <a:solidFill>
+                  <a:schemeClr val="tx1"/>
+                </a:solidFill>
+                <a:miter lim="800000"/>
+                <a:headEnd/>
+                <a:tailEnd/>
+              </a14:hiddenLine>
+            </a:ext>
+            <a:ext uri="{AF507438-7753-43E0-B8FC-AC1667EBCBE1}">
+              <a14:hiddenEffects xmlns:a14="http://schemas.microsoft.com/office/drawing/2010/main">
+                <a:effectLst>
+                  <a:outerShdw dist="35921" dir="2700000" algn="ctr" rotWithShape="0">
+                    <a:schemeClr val="bg2"/>
+                  </a:outerShdw>
+                </a:effectLst>
+              </a14:hiddenEffects>
+            </a:ext>
+          </a:extLst>
+        </p:spPr>
+        <p:txBody>
+          <a:bodyPr vert="horz" wrap="square" lIns="91440" tIns="45720" rIns="91440" bIns="45720" numCol="1" anchor="ctr" anchorCtr="0" compatLnSpc="1">
+            <a:prstTxWarp prst="textNoShape">
+              <a:avLst/>
+            </a:prstTxWarp>
+            <a:spAutoFit/>
+          </a:bodyPr>
+          <a:lstStyle/>
+          <a:p>
+            <a:pPr marL="357188" marR="0" lvl="0" indent="-357188" algn="just" defTabSz="914400" rtl="0" eaLnBrk="0" fontAlgn="base" latinLnBrk="0" hangingPunct="0">
+              <a:lnSpc>
+                <a:spcPct val="150000"/>
+              </a:lnSpc>
+              <a:spcBef>
+                <a:spcPct val="0"/>
+              </a:spcBef>
+              <a:spcAft>
+                <a:spcPct val="0"/>
+              </a:spcAft>
+              <a:buClrTx/>
+              <a:buSzTx/>
+              <a:buFont typeface="Wingdings" panose="05000000000000000000" pitchFamily="2" charset="2"/>
+              <a:buChar char="ü"/>
+              <a:tabLst/>
+            </a:pPr>
+            <a:r>
+              <a:rPr kumimoji="0" lang="en-US" altLang="en-US" b="0" i="0" u="none" strike="noStrike" cap="none" normalizeH="0" baseline="0" dirty="0">
+                <a:ln>
+                  <a:noFill/>
+                </a:ln>
+                <a:solidFill>
+                  <a:schemeClr val="tx1"/>
+                </a:solidFill>
+                <a:effectLst/>
+                <a:latin typeface="+mj-lt"/>
+              </a:rPr>
+              <a:t>Limited access to continuous professional development affects care quality (Cheong &amp; Hsu, 2021; Akram et al., 2017).</a:t>
+            </a:r>
+          </a:p>
+          <a:p>
+            <a:pPr marL="357188" marR="0" lvl="0" indent="-357188" algn="just" defTabSz="914400" rtl="0" eaLnBrk="0" fontAlgn="base" latinLnBrk="0" hangingPunct="0">
+              <a:lnSpc>
+                <a:spcPct val="150000"/>
+              </a:lnSpc>
+              <a:spcBef>
+                <a:spcPct val="0"/>
+              </a:spcBef>
+              <a:spcAft>
+                <a:spcPct val="0"/>
+              </a:spcAft>
+              <a:buClrTx/>
+              <a:buSzTx/>
+              <a:buFont typeface="Wingdings" panose="05000000000000000000" pitchFamily="2" charset="2"/>
+              <a:buChar char="ü"/>
+              <a:tabLst/>
+            </a:pPr>
+            <a:endParaRPr kumimoji="0" lang="en-US" altLang="en-US" b="0" i="0" u="none" strike="noStrike" cap="none" normalizeH="0" baseline="0" dirty="0">
+              <a:ln>
+                <a:noFill/>
+              </a:ln>
+              <a:solidFill>
+                <a:schemeClr val="tx1"/>
+              </a:solidFill>
+              <a:effectLst/>
+              <a:latin typeface="+mj-lt"/>
+            </a:endParaRPr>
+          </a:p>
+          <a:p>
+            <a:pPr marL="357188" marR="0" lvl="0" indent="-357188" algn="just" defTabSz="914400" rtl="0" eaLnBrk="0" fontAlgn="base" latinLnBrk="0" hangingPunct="0">
+              <a:lnSpc>
+                <a:spcPct val="150000"/>
+              </a:lnSpc>
+              <a:spcBef>
+                <a:spcPct val="0"/>
+              </a:spcBef>
+              <a:spcAft>
+                <a:spcPct val="0"/>
+              </a:spcAft>
+              <a:buClrTx/>
+              <a:buSzTx/>
+              <a:buFont typeface="Wingdings" panose="05000000000000000000" pitchFamily="2" charset="2"/>
+              <a:buChar char="ü"/>
+              <a:tabLst/>
+            </a:pPr>
+            <a:r>
+              <a:rPr kumimoji="0" lang="en-US" altLang="en-US" b="0" i="0" u="none" strike="noStrike" cap="none" normalizeH="0" baseline="0" dirty="0">
+                <a:ln>
+                  <a:noFill/>
+                </a:ln>
+                <a:solidFill>
+                  <a:schemeClr val="tx1"/>
+                </a:solidFill>
+                <a:effectLst/>
+                <a:latin typeface="+mj-lt"/>
+              </a:rPr>
+              <a:t>Many HCAs report lacking adequate training to manage palliative-specific needs (McPherson et al., 2019; Schrader et al., 2023).</a:t>
+            </a:r>
+          </a:p>
+          <a:p>
+            <a:pPr marL="357188" marR="0" lvl="0" indent="-357188" algn="just" defTabSz="914400" rtl="0" eaLnBrk="0" fontAlgn="base" latinLnBrk="0" hangingPunct="0">
+              <a:lnSpc>
+                <a:spcPct val="150000"/>
+              </a:lnSpc>
+              <a:spcBef>
+                <a:spcPct val="0"/>
+              </a:spcBef>
+              <a:spcAft>
+                <a:spcPct val="0"/>
+              </a:spcAft>
+              <a:buClrTx/>
+              <a:buSzTx/>
+              <a:buFont typeface="Wingdings" panose="05000000000000000000" pitchFamily="2" charset="2"/>
+              <a:buChar char="ü"/>
+              <a:tabLst/>
+            </a:pPr>
+            <a:endParaRPr kumimoji="0" lang="en-US" altLang="en-US" b="0" i="0" u="none" strike="noStrike" cap="none" normalizeH="0" baseline="0" dirty="0">
+              <a:ln>
+                <a:noFill/>
+              </a:ln>
+              <a:solidFill>
+                <a:schemeClr val="tx1"/>
+              </a:solidFill>
+              <a:effectLst/>
+              <a:latin typeface="+mj-lt"/>
+            </a:endParaRPr>
+          </a:p>
+          <a:p>
+            <a:pPr marL="357188" marR="0" lvl="0" indent="-357188" algn="just" defTabSz="914400" rtl="0" eaLnBrk="0" fontAlgn="base" latinLnBrk="0" hangingPunct="0">
+              <a:lnSpc>
+                <a:spcPct val="150000"/>
+              </a:lnSpc>
+              <a:spcBef>
+                <a:spcPct val="0"/>
+              </a:spcBef>
+              <a:spcAft>
+                <a:spcPct val="0"/>
+              </a:spcAft>
+              <a:buClrTx/>
+              <a:buSzTx/>
+              <a:buFont typeface="Wingdings" panose="05000000000000000000" pitchFamily="2" charset="2"/>
+              <a:buChar char="ü"/>
+              <a:tabLst/>
+            </a:pPr>
+            <a:r>
+              <a:rPr kumimoji="0" lang="en-US" altLang="en-US" b="0" i="0" u="none" strike="noStrike" cap="none" normalizeH="0" baseline="0" dirty="0">
+                <a:ln>
+                  <a:noFill/>
+                </a:ln>
+                <a:solidFill>
+                  <a:schemeClr val="tx1"/>
+                </a:solidFill>
+                <a:effectLst/>
+                <a:latin typeface="+mj-lt"/>
+              </a:rPr>
+              <a:t>Studies stress the value of structured education to reduce anxiety and improve competence (Jansen et al., 2017; Navarro-Abal et al., 2018).</a:t>
+            </a:r>
+          </a:p>
+          <a:p>
+            <a:pPr marL="357188" marR="0" lvl="0" indent="-357188" algn="just" defTabSz="914400" rtl="0" eaLnBrk="0" fontAlgn="base" latinLnBrk="0" hangingPunct="0">
+              <a:lnSpc>
+                <a:spcPct val="150000"/>
+              </a:lnSpc>
+              <a:spcBef>
+                <a:spcPct val="0"/>
+              </a:spcBef>
+              <a:spcAft>
+                <a:spcPct val="0"/>
+              </a:spcAft>
+              <a:buClrTx/>
+              <a:buSzTx/>
+              <a:buFont typeface="Wingdings" panose="05000000000000000000" pitchFamily="2" charset="2"/>
+              <a:buChar char="ü"/>
+              <a:tabLst/>
+            </a:pPr>
+            <a:endParaRPr kumimoji="0" lang="en-US" altLang="en-US" b="0" i="0" u="none" strike="noStrike" cap="none" normalizeH="0" baseline="0" dirty="0">
+              <a:ln>
+                <a:noFill/>
+              </a:ln>
+              <a:solidFill>
+                <a:schemeClr val="tx1"/>
+              </a:solidFill>
+              <a:effectLst/>
+              <a:latin typeface="+mj-lt"/>
+            </a:endParaRPr>
+          </a:p>
+          <a:p>
+            <a:pPr marL="357188" marR="0" lvl="0" indent="-357188" algn="just" defTabSz="914400" rtl="0" eaLnBrk="0" fontAlgn="base" latinLnBrk="0" hangingPunct="0">
+              <a:lnSpc>
+                <a:spcPct val="150000"/>
+              </a:lnSpc>
+              <a:spcBef>
+                <a:spcPct val="0"/>
+              </a:spcBef>
+              <a:spcAft>
+                <a:spcPct val="0"/>
+              </a:spcAft>
+              <a:buClrTx/>
+              <a:buSzTx/>
+              <a:buFont typeface="Wingdings" panose="05000000000000000000" pitchFamily="2" charset="2"/>
+              <a:buChar char="ü"/>
+              <a:tabLst/>
+            </a:pPr>
+            <a:r>
+              <a:rPr kumimoji="0" lang="en-US" altLang="en-US" b="0" i="0" u="none" strike="noStrike" cap="none" normalizeH="0" baseline="0" dirty="0">
+                <a:ln>
+                  <a:noFill/>
+                </a:ln>
+                <a:solidFill>
+                  <a:schemeClr val="tx1"/>
+                </a:solidFill>
+                <a:effectLst/>
+                <a:latin typeface="+mj-lt"/>
+              </a:rPr>
+              <a:t>Lack of formal recognition of HCA roles leads to </a:t>
+            </a:r>
+            <a:r>
+              <a:rPr kumimoji="0" lang="en-US" altLang="en-US" b="0" i="0" u="none" strike="noStrike" cap="none" normalizeH="0" baseline="0" dirty="0" err="1">
+                <a:ln>
+                  <a:noFill/>
+                </a:ln>
+                <a:solidFill>
+                  <a:schemeClr val="tx1"/>
+                </a:solidFill>
+                <a:effectLst/>
+                <a:latin typeface="+mj-lt"/>
+              </a:rPr>
+              <a:t>underutilisation</a:t>
+            </a:r>
+            <a:r>
+              <a:rPr kumimoji="0" lang="en-US" altLang="en-US" b="0" i="0" u="none" strike="noStrike" cap="none" normalizeH="0" baseline="0" dirty="0">
+                <a:ln>
+                  <a:noFill/>
+                </a:ln>
+                <a:solidFill>
+                  <a:schemeClr val="tx1"/>
+                </a:solidFill>
+                <a:effectLst/>
+                <a:latin typeface="+mj-lt"/>
+              </a:rPr>
+              <a:t> and low morale (Carlebach &amp; Shucksmith, 2020; Yip et al., 2024).</a:t>
+            </a:r>
+          </a:p>
+        </p:txBody>
+      </p:sp>
+    </p:spTree>
+    <p:extLst>
+      <p:ext uri="{BB962C8B-B14F-4D97-AF65-F5344CB8AC3E}">
+        <p14:creationId xmlns:p14="http://schemas.microsoft.com/office/powerpoint/2010/main" val="897535417"/>
+      </p:ext>
+    </p:extLst>
+  </p:cSld>
+  <p:clrMapOvr>
+    <a:masterClrMapping/>
+  </p:clrMapOvr>
+</p:sld>
+</file>
+
+<file path=ppt/slides/slide6.xml><?xml version="1.0" encoding="utf-8"?>
+<p:sld xmlns:a="http://schemas.openxmlformats.org/drawingml/2006/main" xmlns:r="http://schemas.openxmlformats.org/officeDocument/2006/relationships" xmlns:p="http://schemas.openxmlformats.org/presentationml/2006/main">
+  <p:cSld>
+    <p:spTree>
+      <p:nvGrpSpPr>
+        <p:cNvPr id="1" name="">
+          <a:extLst>
+            <a:ext uri="{FF2B5EF4-FFF2-40B4-BE49-F238E27FC236}">
+              <a16:creationId xmlns:a16="http://schemas.microsoft.com/office/drawing/2014/main" id="{3535BEA0-9C92-D30A-94A0-724B139D450E}"/>
+            </a:ext>
+          </a:extLst>
+        </p:cNvPr>
+        <p:cNvGrpSpPr/>
+        <p:nvPr/>
+      </p:nvGrpSpPr>
+      <p:grpSpPr>
+        <a:xfrm>
+          <a:off x="0" y="0"/>
+          <a:ext cx="0" cy="0"/>
+          <a:chOff x="0" y="0"/>
+          <a:chExt cx="0" cy="0"/>
+        </a:xfrm>
+      </p:grpSpPr>
+      <p:sp>
+        <p:nvSpPr>
+          <p:cNvPr id="3" name="TextBox 2">
+            <a:extLst>
+              <a:ext uri="{FF2B5EF4-FFF2-40B4-BE49-F238E27FC236}">
+                <a16:creationId xmlns:a16="http://schemas.microsoft.com/office/drawing/2014/main" id="{D5D8A4E2-6015-8A96-EB02-4690A66D6690}"/>
+              </a:ext>
+            </a:extLst>
+          </p:cNvPr>
+          <p:cNvSpPr txBox="1"/>
+          <p:nvPr/>
+        </p:nvSpPr>
+        <p:spPr>
+          <a:xfrm>
+            <a:off x="923364" y="681335"/>
+            <a:ext cx="12075460" cy="584775"/>
+          </a:xfrm>
+          <a:prstGeom prst="rect">
+            <a:avLst/>
+          </a:prstGeom>
+          <a:noFill/>
+        </p:spPr>
+        <p:txBody>
+          <a:bodyPr wrap="square">
+            <a:spAutoFit/>
+          </a:bodyPr>
+          <a:lstStyle/>
+          <a:p>
+            <a:r>
+              <a:rPr lang="en-US" sz="3200" b="1" dirty="0"/>
+              <a:t>Theme 4 – Contribution to Quality and Continuity of Care</a:t>
+            </a:r>
+            <a:endParaRPr lang="en-GB" sz="3200" b="1" noProof="0" dirty="0"/>
+          </a:p>
+        </p:txBody>
+      </p:sp>
+      <p:sp>
+        <p:nvSpPr>
+          <p:cNvPr id="4" name="Rectangle 3">
+            <a:extLst>
+              <a:ext uri="{FF2B5EF4-FFF2-40B4-BE49-F238E27FC236}">
+                <a16:creationId xmlns:a16="http://schemas.microsoft.com/office/drawing/2014/main" id="{56D78606-CD0C-444E-B718-FCCEF88B5E8C}"/>
+              </a:ext>
+            </a:extLst>
+          </p:cNvPr>
+          <p:cNvSpPr/>
+          <p:nvPr/>
+        </p:nvSpPr>
+        <p:spPr>
+          <a:xfrm>
+            <a:off x="1066799" y="1357246"/>
+            <a:ext cx="1004047" cy="125506"/>
+          </a:xfrm>
+          <a:prstGeom prst="rect">
+            <a:avLst/>
+          </a:prstGeom>
+          <a:ln>
+            <a:noFill/>
+          </a:ln>
+        </p:spPr>
+        <p:style>
+          <a:lnRef idx="2">
+            <a:schemeClr val="accent2">
+              <a:shade val="15000"/>
+            </a:schemeClr>
+          </a:lnRef>
+          <a:fillRef idx="1">
+            <a:schemeClr val="accent2"/>
+          </a:fillRef>
+          <a:effectRef idx="0">
+            <a:schemeClr val="accent2"/>
+          </a:effectRef>
+          <a:fontRef idx="minor">
+            <a:schemeClr val="lt1"/>
+          </a:fontRef>
+        </p:style>
+        <p:txBody>
+          <a:bodyPr rtlCol="0" anchor="ctr"/>
+          <a:lstStyle/>
+          <a:p>
+            <a:pPr algn="ctr"/>
+            <a:endParaRPr lang="en-GB" noProof="0" dirty="0"/>
+          </a:p>
+        </p:txBody>
+      </p:sp>
+      <p:sp>
+        <p:nvSpPr>
+          <p:cNvPr id="2" name="Rectangle 1">
+            <a:extLst>
+              <a:ext uri="{FF2B5EF4-FFF2-40B4-BE49-F238E27FC236}">
+                <a16:creationId xmlns:a16="http://schemas.microsoft.com/office/drawing/2014/main" id="{CD1D48F5-71FE-D6FC-C183-962B7244888A}"/>
+              </a:ext>
+            </a:extLst>
+          </p:cNvPr>
+          <p:cNvSpPr>
+            <a:spLocks noChangeArrowheads="1"/>
+          </p:cNvSpPr>
+          <p:nvPr/>
+        </p:nvSpPr>
+        <p:spPr bwMode="auto">
+          <a:xfrm>
+            <a:off x="1057656" y="1622073"/>
+            <a:ext cx="10406052" cy="4622869"/>
+          </a:xfrm>
+          <a:prstGeom prst="rect">
+            <a:avLst/>
+          </a:prstGeom>
+          <a:noFill/>
+          <a:ln>
+            <a:noFill/>
+          </a:ln>
+          <a:effectLst/>
+          <a:extLst>
+            <a:ext uri="{909E8E84-426E-40DD-AFC4-6F175D3DCCD1}">
+              <a14:hiddenFill xmlns:a14="http://schemas.microsoft.com/office/drawing/2010/main">
+                <a:solidFill>
+                  <a:schemeClr val="accent1"/>
+                </a:solidFill>
+              </a14:hiddenFill>
+            </a:ext>
+            <a:ext uri="{91240B29-F687-4F45-9708-019B960494DF}">
+              <a14:hiddenLine xmlns:a14="http://schemas.microsoft.com/office/drawing/2010/main" w="9525">
+                <a:solidFill>
+                  <a:schemeClr val="tx1"/>
+                </a:solidFill>
+                <a:miter lim="800000"/>
+                <a:headEnd/>
+                <a:tailEnd/>
+              </a14:hiddenLine>
+            </a:ext>
+            <a:ext uri="{AF507438-7753-43E0-B8FC-AC1667EBCBE1}">
+              <a14:hiddenEffects xmlns:a14="http://schemas.microsoft.com/office/drawing/2010/main">
+                <a:effectLst>
+                  <a:outerShdw dist="35921" dir="2700000" algn="ctr" rotWithShape="0">
+                    <a:schemeClr val="bg2"/>
+                  </a:outerShdw>
+                </a:effectLst>
+              </a14:hiddenEffects>
+            </a:ext>
+          </a:extLst>
+        </p:spPr>
+        <p:txBody>
+          <a:bodyPr vert="horz" wrap="square" lIns="91440" tIns="45720" rIns="91440" bIns="45720" numCol="1" anchor="ctr" anchorCtr="0" compatLnSpc="1">
+            <a:prstTxWarp prst="textNoShape">
+              <a:avLst/>
+            </a:prstTxWarp>
+            <a:spAutoFit/>
+          </a:bodyPr>
+          <a:lstStyle/>
+          <a:p>
+            <a:pPr marL="357188" marR="0" lvl="0" indent="-357188" algn="just" defTabSz="914400" rtl="0" eaLnBrk="0" fontAlgn="base" latinLnBrk="0" hangingPunct="0">
+              <a:lnSpc>
+                <a:spcPct val="150000"/>
+              </a:lnSpc>
+              <a:spcBef>
+                <a:spcPct val="0"/>
+              </a:spcBef>
+              <a:spcAft>
+                <a:spcPct val="0"/>
+              </a:spcAft>
+              <a:buClrTx/>
+              <a:buSzTx/>
+              <a:buFont typeface="Wingdings" panose="05000000000000000000" pitchFamily="2" charset="2"/>
+              <a:buChar char="ü"/>
+              <a:tabLst/>
+            </a:pPr>
+            <a:r>
+              <a:rPr kumimoji="0" lang="en-US" altLang="en-US" b="0" i="0" u="none" strike="noStrike" cap="none" normalizeH="0" baseline="0" dirty="0">
+                <a:ln>
+                  <a:noFill/>
+                </a:ln>
+                <a:solidFill>
+                  <a:schemeClr val="tx1"/>
+                </a:solidFill>
+                <a:effectLst/>
+                <a:latin typeface="+mj-lt"/>
+              </a:rPr>
+              <a:t>HCAs serve as consistent figures in home and hospice settings, ensuring continuity (McPherson et al., 2019; Jansen et al., 2017).</a:t>
+            </a:r>
+          </a:p>
+          <a:p>
+            <a:pPr marL="357188" marR="0" lvl="0" indent="-357188" algn="just" defTabSz="914400" rtl="0" eaLnBrk="0" fontAlgn="base" latinLnBrk="0" hangingPunct="0">
+              <a:lnSpc>
+                <a:spcPct val="150000"/>
+              </a:lnSpc>
+              <a:spcBef>
+                <a:spcPct val="0"/>
+              </a:spcBef>
+              <a:spcAft>
+                <a:spcPct val="0"/>
+              </a:spcAft>
+              <a:buClrTx/>
+              <a:buSzTx/>
+              <a:buFont typeface="Wingdings" panose="05000000000000000000" pitchFamily="2" charset="2"/>
+              <a:buChar char="ü"/>
+              <a:tabLst/>
+            </a:pPr>
+            <a:endParaRPr kumimoji="0" lang="en-US" altLang="en-US" b="0" i="0" u="none" strike="noStrike" cap="none" normalizeH="0" baseline="0" dirty="0">
+              <a:ln>
+                <a:noFill/>
+              </a:ln>
+              <a:solidFill>
+                <a:schemeClr val="tx1"/>
+              </a:solidFill>
+              <a:effectLst/>
+              <a:latin typeface="+mj-lt"/>
+            </a:endParaRPr>
+          </a:p>
+          <a:p>
+            <a:pPr marL="357188" marR="0" lvl="0" indent="-357188" algn="just" defTabSz="914400" rtl="0" eaLnBrk="0" fontAlgn="base" latinLnBrk="0" hangingPunct="0">
+              <a:lnSpc>
+                <a:spcPct val="150000"/>
+              </a:lnSpc>
+              <a:spcBef>
+                <a:spcPct val="0"/>
+              </a:spcBef>
+              <a:spcAft>
+                <a:spcPct val="0"/>
+              </a:spcAft>
+              <a:buClrTx/>
+              <a:buSzTx/>
+              <a:buFont typeface="Wingdings" panose="05000000000000000000" pitchFamily="2" charset="2"/>
+              <a:buChar char="ü"/>
+              <a:tabLst/>
+            </a:pPr>
+            <a:r>
+              <a:rPr kumimoji="0" lang="en-US" altLang="en-US" b="0" i="0" u="none" strike="noStrike" cap="none" normalizeH="0" baseline="0" dirty="0">
+                <a:ln>
+                  <a:noFill/>
+                </a:ln>
+                <a:solidFill>
+                  <a:schemeClr val="tx1"/>
+                </a:solidFill>
+                <a:effectLst/>
+                <a:latin typeface="+mj-lt"/>
+              </a:rPr>
+              <a:t>Their familiarity with patients aids early detection of symptoms and subtle health changes (Molero Jurado et al., 2018; Cheong &amp; Hsu, 2021).</a:t>
+            </a:r>
+          </a:p>
+          <a:p>
+            <a:pPr marL="357188" marR="0" lvl="0" indent="-357188" algn="just" defTabSz="914400" rtl="0" eaLnBrk="0" fontAlgn="base" latinLnBrk="0" hangingPunct="0">
+              <a:lnSpc>
+                <a:spcPct val="150000"/>
+              </a:lnSpc>
+              <a:spcBef>
+                <a:spcPct val="0"/>
+              </a:spcBef>
+              <a:spcAft>
+                <a:spcPct val="0"/>
+              </a:spcAft>
+              <a:buClrTx/>
+              <a:buSzTx/>
+              <a:buFont typeface="Wingdings" panose="05000000000000000000" pitchFamily="2" charset="2"/>
+              <a:buChar char="ü"/>
+              <a:tabLst/>
+            </a:pPr>
+            <a:endParaRPr kumimoji="0" lang="en-US" altLang="en-US" b="0" i="0" u="none" strike="noStrike" cap="none" normalizeH="0" baseline="0" dirty="0">
+              <a:ln>
+                <a:noFill/>
+              </a:ln>
+              <a:solidFill>
+                <a:schemeClr val="tx1"/>
+              </a:solidFill>
+              <a:effectLst/>
+              <a:latin typeface="+mj-lt"/>
+            </a:endParaRPr>
+          </a:p>
+          <a:p>
+            <a:pPr marL="357188" marR="0" lvl="0" indent="-357188" algn="just" defTabSz="914400" rtl="0" eaLnBrk="0" fontAlgn="base" latinLnBrk="0" hangingPunct="0">
+              <a:lnSpc>
+                <a:spcPct val="150000"/>
+              </a:lnSpc>
+              <a:spcBef>
+                <a:spcPct val="0"/>
+              </a:spcBef>
+              <a:spcAft>
+                <a:spcPct val="0"/>
+              </a:spcAft>
+              <a:buClrTx/>
+              <a:buSzTx/>
+              <a:buFont typeface="Wingdings" panose="05000000000000000000" pitchFamily="2" charset="2"/>
+              <a:buChar char="ü"/>
+              <a:tabLst/>
+            </a:pPr>
+            <a:r>
+              <a:rPr kumimoji="0" lang="en-US" altLang="en-US" b="0" i="0" u="none" strike="noStrike" cap="none" normalizeH="0" baseline="0" dirty="0">
+                <a:ln>
+                  <a:noFill/>
+                </a:ln>
+                <a:solidFill>
+                  <a:schemeClr val="tx1"/>
+                </a:solidFill>
+                <a:effectLst/>
+                <a:latin typeface="+mj-lt"/>
+              </a:rPr>
+              <a:t>Emotional support provided by HCAs improves patient comfort and family satisfaction (Yip et al., 2024; Carlebach &amp; Shucksmith, 2020).</a:t>
+            </a:r>
+          </a:p>
+          <a:p>
+            <a:pPr marL="357188" marR="0" lvl="0" indent="-357188" algn="just" defTabSz="914400" rtl="0" eaLnBrk="0" fontAlgn="base" latinLnBrk="0" hangingPunct="0">
+              <a:lnSpc>
+                <a:spcPct val="150000"/>
+              </a:lnSpc>
+              <a:spcBef>
+                <a:spcPct val="0"/>
+              </a:spcBef>
+              <a:spcAft>
+                <a:spcPct val="0"/>
+              </a:spcAft>
+              <a:buClrTx/>
+              <a:buSzTx/>
+              <a:buFont typeface="Wingdings" panose="05000000000000000000" pitchFamily="2" charset="2"/>
+              <a:buChar char="ü"/>
+              <a:tabLst/>
+            </a:pPr>
+            <a:endParaRPr kumimoji="0" lang="en-US" altLang="en-US" b="0" i="0" u="none" strike="noStrike" cap="none" normalizeH="0" baseline="0" dirty="0">
+              <a:ln>
+                <a:noFill/>
+              </a:ln>
+              <a:solidFill>
+                <a:schemeClr val="tx1"/>
+              </a:solidFill>
+              <a:effectLst/>
+              <a:latin typeface="+mj-lt"/>
+            </a:endParaRPr>
+          </a:p>
+          <a:p>
+            <a:pPr marL="357188" marR="0" lvl="0" indent="-357188" algn="just" defTabSz="914400" rtl="0" eaLnBrk="0" fontAlgn="base" latinLnBrk="0" hangingPunct="0">
+              <a:lnSpc>
+                <a:spcPct val="150000"/>
+              </a:lnSpc>
+              <a:spcBef>
+                <a:spcPct val="0"/>
+              </a:spcBef>
+              <a:spcAft>
+                <a:spcPct val="0"/>
+              </a:spcAft>
+              <a:buClrTx/>
+              <a:buSzTx/>
+              <a:buFont typeface="Wingdings" panose="05000000000000000000" pitchFamily="2" charset="2"/>
+              <a:buChar char="ü"/>
+              <a:tabLst/>
+            </a:pPr>
+            <a:r>
+              <a:rPr kumimoji="0" lang="en-US" altLang="en-US" b="0" i="0" u="none" strike="noStrike" cap="none" normalizeH="0" baseline="0" dirty="0">
+                <a:ln>
+                  <a:noFill/>
+                </a:ln>
+                <a:solidFill>
+                  <a:schemeClr val="tx1"/>
+                </a:solidFill>
+                <a:effectLst/>
+                <a:latin typeface="+mj-lt"/>
+              </a:rPr>
+              <a:t>Their consistent presence bridges gaps between clinical visits and enhances the holistic nature of palliative care (Seow, 2018; Schrader et al., 2023).</a:t>
+            </a:r>
+          </a:p>
+        </p:txBody>
+      </p:sp>
+    </p:spTree>
+    <p:extLst>
+      <p:ext uri="{BB962C8B-B14F-4D97-AF65-F5344CB8AC3E}">
+        <p14:creationId xmlns:p14="http://schemas.microsoft.com/office/powerpoint/2010/main" val="2544127444"/>
+      </p:ext>
+    </p:extLst>
+  </p:cSld>
+  <p:clrMapOvr>
+    <a:masterClrMapping/>
+  </p:clrMapOvr>
+</p:sld>
+</file>
+
+<file path=ppt/slides/slide7.xml><?xml version="1.0" encoding="utf-8"?>
+<p:sld xmlns:a="http://schemas.openxmlformats.org/drawingml/2006/main" xmlns:r="http://schemas.openxmlformats.org/officeDocument/2006/relationships" xmlns:p="http://schemas.openxmlformats.org/presentationml/2006/main">
+  <p:cSld>
+    <p:spTree>
+      <p:nvGrpSpPr>
+        <p:cNvPr id="1" name="">
+          <a:extLst>
+            <a:ext uri="{FF2B5EF4-FFF2-40B4-BE49-F238E27FC236}">
+              <a16:creationId xmlns:a16="http://schemas.microsoft.com/office/drawing/2014/main" id="{8B35ECBC-39E7-1F47-CA28-DEDDBFA74EE6}"/>
+            </a:ext>
+          </a:extLst>
+        </p:cNvPr>
+        <p:cNvGrpSpPr/>
+        <p:nvPr/>
+      </p:nvGrpSpPr>
+      <p:grpSpPr>
+        <a:xfrm>
+          <a:off x="0" y="0"/>
+          <a:ext cx="0" cy="0"/>
+          <a:chOff x="0" y="0"/>
+          <a:chExt cx="0" cy="0"/>
+        </a:xfrm>
+      </p:grpSpPr>
+      <p:sp>
+        <p:nvSpPr>
+          <p:cNvPr id="3" name="TextBox 2">
+            <a:extLst>
+              <a:ext uri="{FF2B5EF4-FFF2-40B4-BE49-F238E27FC236}">
+                <a16:creationId xmlns:a16="http://schemas.microsoft.com/office/drawing/2014/main" id="{D5DE2261-7396-5361-A5C2-DE88F9D2CE89}"/>
+              </a:ext>
+            </a:extLst>
+          </p:cNvPr>
+          <p:cNvSpPr txBox="1"/>
+          <p:nvPr/>
+        </p:nvSpPr>
+        <p:spPr>
+          <a:xfrm>
+            <a:off x="923364" y="681335"/>
+            <a:ext cx="2581836" cy="584775"/>
+          </a:xfrm>
+          <a:prstGeom prst="rect">
+            <a:avLst/>
+          </a:prstGeom>
+          <a:noFill/>
+        </p:spPr>
+        <p:txBody>
+          <a:bodyPr wrap="square">
+            <a:spAutoFit/>
+          </a:bodyPr>
+          <a:lstStyle/>
+          <a:p>
+            <a:r>
+              <a:rPr lang="en-US" sz="3200" b="1" dirty="0"/>
+              <a:t>Conclusion</a:t>
+            </a:r>
+            <a:endParaRPr lang="en-GB" sz="3200" b="1" noProof="0" dirty="0"/>
+          </a:p>
+        </p:txBody>
+      </p:sp>
+      <p:sp>
+        <p:nvSpPr>
+          <p:cNvPr id="4" name="Rectangle 3">
+            <a:extLst>
+              <a:ext uri="{FF2B5EF4-FFF2-40B4-BE49-F238E27FC236}">
+                <a16:creationId xmlns:a16="http://schemas.microsoft.com/office/drawing/2014/main" id="{4EAE9034-9906-428F-465D-902C3E42DF02}"/>
+              </a:ext>
+            </a:extLst>
+          </p:cNvPr>
+          <p:cNvSpPr/>
+          <p:nvPr/>
+        </p:nvSpPr>
+        <p:spPr>
+          <a:xfrm>
+            <a:off x="1066799" y="1357246"/>
+            <a:ext cx="1004047" cy="125506"/>
+          </a:xfrm>
+          <a:prstGeom prst="rect">
+            <a:avLst/>
+          </a:prstGeom>
+          <a:ln>
+            <a:noFill/>
+          </a:ln>
+        </p:spPr>
+        <p:style>
+          <a:lnRef idx="2">
+            <a:schemeClr val="accent2">
+              <a:shade val="15000"/>
+            </a:schemeClr>
+          </a:lnRef>
+          <a:fillRef idx="1">
+            <a:schemeClr val="accent2"/>
+          </a:fillRef>
+          <a:effectRef idx="0">
+            <a:schemeClr val="accent2"/>
+          </a:effectRef>
+          <a:fontRef idx="minor">
+            <a:schemeClr val="lt1"/>
+          </a:fontRef>
+        </p:style>
+        <p:txBody>
+          <a:bodyPr rtlCol="0" anchor="ctr"/>
+          <a:lstStyle/>
+          <a:p>
+            <a:pPr algn="ctr"/>
+            <a:endParaRPr lang="en-GB" noProof="0" dirty="0"/>
+          </a:p>
+        </p:txBody>
+      </p:sp>
+      <p:sp>
+        <p:nvSpPr>
+          <p:cNvPr id="2" name="Rectangle 1">
+            <a:extLst>
+              <a:ext uri="{FF2B5EF4-FFF2-40B4-BE49-F238E27FC236}">
+                <a16:creationId xmlns:a16="http://schemas.microsoft.com/office/drawing/2014/main" id="{3F037083-365F-3B30-B41B-3BACC2475857}"/>
+              </a:ext>
+            </a:extLst>
+          </p:cNvPr>
+          <p:cNvSpPr>
+            <a:spLocks noChangeArrowheads="1"/>
+          </p:cNvSpPr>
+          <p:nvPr/>
+        </p:nvSpPr>
+        <p:spPr bwMode="auto">
+          <a:xfrm>
+            <a:off x="1066799" y="1901504"/>
+            <a:ext cx="10406052" cy="3741281"/>
+          </a:xfrm>
+          <a:prstGeom prst="rect">
+            <a:avLst/>
+          </a:prstGeom>
+          <a:noFill/>
+          <a:ln>
+            <a:noFill/>
+          </a:ln>
+          <a:effectLst/>
+          <a:extLst>
+            <a:ext uri="{909E8E84-426E-40DD-AFC4-6F175D3DCCD1}">
+              <a14:hiddenFill xmlns:a14="http://schemas.microsoft.com/office/drawing/2010/main">
+                <a:solidFill>
+                  <a:schemeClr val="accent1"/>
+                </a:solidFill>
+              </a14:hiddenFill>
+            </a:ext>
+            <a:ext uri="{91240B29-F687-4F45-9708-019B960494DF}">
+              <a14:hiddenLine xmlns:a14="http://schemas.microsoft.com/office/drawing/2010/main" w="9525">
+                <a:solidFill>
+                  <a:schemeClr val="tx1"/>
+                </a:solidFill>
+                <a:miter lim="800000"/>
+                <a:headEnd/>
+                <a:tailEnd/>
+              </a14:hiddenLine>
+            </a:ext>
+            <a:ext uri="{AF507438-7753-43E0-B8FC-AC1667EBCBE1}">
+              <a14:hiddenEffects xmlns:a14="http://schemas.microsoft.com/office/drawing/2010/main">
+                <a:effectLst>
+                  <a:outerShdw dist="35921" dir="2700000" algn="ctr" rotWithShape="0">
+                    <a:schemeClr val="bg2"/>
+                  </a:outerShdw>
+                </a:effectLst>
+              </a14:hiddenEffects>
+            </a:ext>
+          </a:extLst>
+        </p:spPr>
+        <p:txBody>
+          <a:bodyPr vert="horz" wrap="square" lIns="91440" tIns="45720" rIns="91440" bIns="45720" numCol="1" anchor="ctr" anchorCtr="0" compatLnSpc="1">
+            <a:prstTxWarp prst="textNoShape">
+              <a:avLst/>
+            </a:prstTxWarp>
+            <a:spAutoFit/>
+          </a:bodyPr>
+          <a:lstStyle/>
+          <a:p>
+            <a:pPr marL="357188" marR="0" lvl="0" indent="-357188" algn="just" defTabSz="914400" rtl="0" eaLnBrk="0" fontAlgn="base" latinLnBrk="0" hangingPunct="0">
+              <a:lnSpc>
+                <a:spcPct val="150000"/>
+              </a:lnSpc>
+              <a:spcBef>
+                <a:spcPct val="0"/>
+              </a:spcBef>
+              <a:spcAft>
+                <a:spcPct val="0"/>
+              </a:spcAft>
+              <a:buClrTx/>
+              <a:buSzTx/>
+              <a:buFont typeface="Wingdings" panose="05000000000000000000" pitchFamily="2" charset="2"/>
+              <a:buChar char="ü"/>
+              <a:tabLst/>
+            </a:pPr>
+            <a:r>
+              <a:rPr kumimoji="0" lang="en-US" altLang="en-US" sz="2000" b="0" i="0" u="none" strike="noStrike" cap="none" normalizeH="0" baseline="0" dirty="0">
+                <a:ln>
+                  <a:noFill/>
+                </a:ln>
+                <a:solidFill>
+                  <a:schemeClr val="tx1"/>
+                </a:solidFill>
+                <a:effectLst/>
+                <a:latin typeface="+mj-lt"/>
+              </a:rPr>
+              <a:t>HCAs experience significant emotional burnout but are overlooked in emotional support interventions.</a:t>
+            </a:r>
+          </a:p>
+          <a:p>
+            <a:pPr marL="357188" marR="0" lvl="0" indent="-357188" algn="just" defTabSz="914400" rtl="0" eaLnBrk="0" fontAlgn="base" latinLnBrk="0" hangingPunct="0">
+              <a:lnSpc>
+                <a:spcPct val="150000"/>
+              </a:lnSpc>
+              <a:spcBef>
+                <a:spcPct val="0"/>
+              </a:spcBef>
+              <a:spcAft>
+                <a:spcPct val="0"/>
+              </a:spcAft>
+              <a:buClrTx/>
+              <a:buSzTx/>
+              <a:buFont typeface="Wingdings" panose="05000000000000000000" pitchFamily="2" charset="2"/>
+              <a:buChar char="ü"/>
+              <a:tabLst/>
+            </a:pPr>
+            <a:endParaRPr kumimoji="0" lang="en-US" altLang="en-US" sz="2000" b="0" i="0" u="none" strike="noStrike" cap="none" normalizeH="0" baseline="0" dirty="0">
+              <a:ln>
+                <a:noFill/>
+              </a:ln>
+              <a:solidFill>
+                <a:schemeClr val="tx1"/>
+              </a:solidFill>
+              <a:effectLst/>
+              <a:latin typeface="+mj-lt"/>
+            </a:endParaRPr>
+          </a:p>
+          <a:p>
+            <a:pPr marL="357188" marR="0" lvl="0" indent="-357188" algn="just" defTabSz="914400" rtl="0" eaLnBrk="0" fontAlgn="base" latinLnBrk="0" hangingPunct="0">
+              <a:lnSpc>
+                <a:spcPct val="150000"/>
+              </a:lnSpc>
+              <a:spcBef>
+                <a:spcPct val="0"/>
+              </a:spcBef>
+              <a:spcAft>
+                <a:spcPct val="0"/>
+              </a:spcAft>
+              <a:buClrTx/>
+              <a:buSzTx/>
+              <a:buFont typeface="Wingdings" panose="05000000000000000000" pitchFamily="2" charset="2"/>
+              <a:buChar char="ü"/>
+              <a:tabLst/>
+            </a:pPr>
+            <a:r>
+              <a:rPr kumimoji="0" lang="en-US" altLang="en-US" sz="2000" b="0" i="0" u="none" strike="noStrike" cap="none" normalizeH="0" baseline="0" dirty="0">
+                <a:ln>
+                  <a:noFill/>
+                </a:ln>
+                <a:solidFill>
+                  <a:schemeClr val="tx1"/>
+                </a:solidFill>
+                <a:effectLst/>
+                <a:latin typeface="+mj-lt"/>
+              </a:rPr>
+              <a:t>Their contributions to patient monitoring and emotional care are hampered by exclusion from formal communication.</a:t>
+            </a:r>
+          </a:p>
+          <a:p>
+            <a:pPr marL="357188" marR="0" lvl="0" indent="-357188" algn="just" defTabSz="914400" rtl="0" eaLnBrk="0" fontAlgn="base" latinLnBrk="0" hangingPunct="0">
+              <a:lnSpc>
+                <a:spcPct val="150000"/>
+              </a:lnSpc>
+              <a:spcBef>
+                <a:spcPct val="0"/>
+              </a:spcBef>
+              <a:spcAft>
+                <a:spcPct val="0"/>
+              </a:spcAft>
+              <a:buClrTx/>
+              <a:buSzTx/>
+              <a:buFont typeface="Wingdings" panose="05000000000000000000" pitchFamily="2" charset="2"/>
+              <a:buChar char="ü"/>
+              <a:tabLst/>
+            </a:pPr>
+            <a:endParaRPr kumimoji="0" lang="en-US" altLang="en-US" sz="2000" b="0" i="0" u="none" strike="noStrike" cap="none" normalizeH="0" baseline="0" dirty="0">
+              <a:ln>
+                <a:noFill/>
+              </a:ln>
+              <a:solidFill>
+                <a:schemeClr val="tx1"/>
+              </a:solidFill>
+              <a:effectLst/>
+              <a:latin typeface="+mj-lt"/>
+            </a:endParaRPr>
+          </a:p>
+          <a:p>
+            <a:pPr marL="357188" marR="0" lvl="0" indent="-357188" algn="just" defTabSz="914400" rtl="0" eaLnBrk="0" fontAlgn="base" latinLnBrk="0" hangingPunct="0">
+              <a:lnSpc>
+                <a:spcPct val="150000"/>
+              </a:lnSpc>
+              <a:spcBef>
+                <a:spcPct val="0"/>
+              </a:spcBef>
+              <a:spcAft>
+                <a:spcPct val="0"/>
+              </a:spcAft>
+              <a:buClrTx/>
+              <a:buSzTx/>
+              <a:buFont typeface="Wingdings" panose="05000000000000000000" pitchFamily="2" charset="2"/>
+              <a:buChar char="ü"/>
+              <a:tabLst/>
+            </a:pPr>
+            <a:r>
+              <a:rPr kumimoji="0" lang="en-US" altLang="en-US" sz="2000" b="0" i="0" u="none" strike="noStrike" cap="none" normalizeH="0" baseline="0" dirty="0">
+                <a:ln>
+                  <a:noFill/>
+                </a:ln>
+                <a:solidFill>
+                  <a:schemeClr val="tx1"/>
+                </a:solidFill>
+                <a:effectLst/>
+                <a:latin typeface="+mj-lt"/>
+              </a:rPr>
+              <a:t>Training, integration, and recognition remain vital for improving their effectiveness and palliative care outcomes.</a:t>
+            </a:r>
+          </a:p>
+        </p:txBody>
+      </p:sp>
+    </p:spTree>
+    <p:extLst>
+      <p:ext uri="{BB962C8B-B14F-4D97-AF65-F5344CB8AC3E}">
+        <p14:creationId xmlns:p14="http://schemas.microsoft.com/office/powerpoint/2010/main" val="1310976736"/>
+      </p:ext>
+    </p:extLst>
+  </p:cSld>
+  <p:clrMapOvr>
+    <a:masterClrMapping/>
+  </p:clrMapOvr>
+</p:sld>
+</file>
+
+<file path=ppt/slides/slide8.xml><?xml version="1.0" encoding="utf-8"?>
+<p:sld xmlns:a="http://schemas.openxmlformats.org/drawingml/2006/main" xmlns:r="http://schemas.openxmlformats.org/officeDocument/2006/relationships" xmlns:p="http://schemas.openxmlformats.org/presentationml/2006/main">
+  <p:cSld>
+    <p:spTree>
+      <p:nvGrpSpPr>
+        <p:cNvPr id="1" name="">
+          <a:extLst>
+            <a:ext uri="{FF2B5EF4-FFF2-40B4-BE49-F238E27FC236}">
+              <a16:creationId xmlns:a16="http://schemas.microsoft.com/office/drawing/2014/main" id="{9F2AAAE5-9E7E-22BF-2238-FCF12D92C2B8}"/>
+            </a:ext>
+          </a:extLst>
+        </p:cNvPr>
+        <p:cNvGrpSpPr/>
+        <p:nvPr/>
+      </p:nvGrpSpPr>
+      <p:grpSpPr>
+        <a:xfrm>
+          <a:off x="0" y="0"/>
+          <a:ext cx="0" cy="0"/>
+          <a:chOff x="0" y="0"/>
+          <a:chExt cx="0" cy="0"/>
+        </a:xfrm>
+      </p:grpSpPr>
+      <p:sp>
+        <p:nvSpPr>
+          <p:cNvPr id="3" name="TextBox 2">
+            <a:extLst>
+              <a:ext uri="{FF2B5EF4-FFF2-40B4-BE49-F238E27FC236}">
+                <a16:creationId xmlns:a16="http://schemas.microsoft.com/office/drawing/2014/main" id="{D1A58FC7-E5EB-61E2-0F98-62B9D5F8A3DD}"/>
+              </a:ext>
+            </a:extLst>
+          </p:cNvPr>
+          <p:cNvSpPr txBox="1"/>
+          <p:nvPr/>
+        </p:nvSpPr>
+        <p:spPr>
+          <a:xfrm>
+            <a:off x="923364" y="681335"/>
+            <a:ext cx="4204448" cy="584775"/>
+          </a:xfrm>
+          <a:prstGeom prst="rect">
+            <a:avLst/>
+          </a:prstGeom>
+          <a:noFill/>
+        </p:spPr>
+        <p:txBody>
+          <a:bodyPr wrap="square">
+            <a:spAutoFit/>
+          </a:bodyPr>
+          <a:lstStyle/>
+          <a:p>
+            <a:r>
+              <a:rPr lang="en-US" sz="3200" b="1" dirty="0"/>
+              <a:t>Recommendations</a:t>
+            </a:r>
+            <a:endParaRPr lang="en-GB" sz="3200" b="1" noProof="0" dirty="0"/>
+          </a:p>
+        </p:txBody>
+      </p:sp>
+      <p:sp>
+        <p:nvSpPr>
+          <p:cNvPr id="4" name="Rectangle 3">
+            <a:extLst>
+              <a:ext uri="{FF2B5EF4-FFF2-40B4-BE49-F238E27FC236}">
+                <a16:creationId xmlns:a16="http://schemas.microsoft.com/office/drawing/2014/main" id="{8368634D-14D2-D53B-16EA-C2E08D6F0628}"/>
+              </a:ext>
+            </a:extLst>
+          </p:cNvPr>
+          <p:cNvSpPr/>
+          <p:nvPr/>
+        </p:nvSpPr>
+        <p:spPr>
+          <a:xfrm>
+            <a:off x="1066799" y="1357246"/>
+            <a:ext cx="1004047" cy="125506"/>
+          </a:xfrm>
+          <a:prstGeom prst="rect">
+            <a:avLst/>
+          </a:prstGeom>
+          <a:ln>
+            <a:noFill/>
+          </a:ln>
+        </p:spPr>
+        <p:style>
+          <a:lnRef idx="2">
+            <a:schemeClr val="accent2">
+              <a:shade val="15000"/>
+            </a:schemeClr>
+          </a:lnRef>
+          <a:fillRef idx="1">
+            <a:schemeClr val="accent2"/>
+          </a:fillRef>
+          <a:effectRef idx="0">
+            <a:schemeClr val="accent2"/>
+          </a:effectRef>
+          <a:fontRef idx="minor">
+            <a:schemeClr val="lt1"/>
+          </a:fontRef>
+        </p:style>
+        <p:txBody>
+          <a:bodyPr rtlCol="0" anchor="ctr"/>
+          <a:lstStyle/>
+          <a:p>
+            <a:pPr algn="ctr"/>
+            <a:endParaRPr lang="en-GB" noProof="0" dirty="0"/>
+          </a:p>
+        </p:txBody>
+      </p:sp>
+      <p:sp>
+        <p:nvSpPr>
+          <p:cNvPr id="2" name="Rectangle 1">
+            <a:extLst>
+              <a:ext uri="{FF2B5EF4-FFF2-40B4-BE49-F238E27FC236}">
+                <a16:creationId xmlns:a16="http://schemas.microsoft.com/office/drawing/2014/main" id="{D82794A1-E996-9839-7765-BB76E4215D92}"/>
+              </a:ext>
+            </a:extLst>
+          </p:cNvPr>
+          <p:cNvSpPr>
+            <a:spLocks noChangeArrowheads="1"/>
+          </p:cNvSpPr>
+          <p:nvPr/>
+        </p:nvSpPr>
+        <p:spPr bwMode="auto">
+          <a:xfrm>
+            <a:off x="1066799" y="2363170"/>
+            <a:ext cx="10406052" cy="2817951"/>
+          </a:xfrm>
+          <a:prstGeom prst="rect">
+            <a:avLst/>
+          </a:prstGeom>
+          <a:noFill/>
+          <a:ln>
+            <a:noFill/>
+          </a:ln>
+          <a:effectLst/>
+          <a:extLst>
+            <a:ext uri="{909E8E84-426E-40DD-AFC4-6F175D3DCCD1}">
+              <a14:hiddenFill xmlns:a14="http://schemas.microsoft.com/office/drawing/2010/main">
+                <a:solidFill>
+                  <a:schemeClr val="accent1"/>
+                </a:solidFill>
+              </a14:hiddenFill>
+            </a:ext>
+            <a:ext uri="{91240B29-F687-4F45-9708-019B960494DF}">
+              <a14:hiddenLine xmlns:a14="http://schemas.microsoft.com/office/drawing/2010/main" w="9525">
+                <a:solidFill>
+                  <a:schemeClr val="tx1"/>
+                </a:solidFill>
+                <a:miter lim="800000"/>
+                <a:headEnd/>
+                <a:tailEnd/>
+              </a14:hiddenLine>
+            </a:ext>
+            <a:ext uri="{AF507438-7753-43E0-B8FC-AC1667EBCBE1}">
+              <a14:hiddenEffects xmlns:a14="http://schemas.microsoft.com/office/drawing/2010/main">
+                <a:effectLst>
+                  <a:outerShdw dist="35921" dir="2700000" algn="ctr" rotWithShape="0">
+                    <a:schemeClr val="bg2"/>
+                  </a:outerShdw>
+                </a:effectLst>
+              </a14:hiddenEffects>
+            </a:ext>
+          </a:extLst>
+        </p:spPr>
+        <p:txBody>
+          <a:bodyPr vert="horz" wrap="square" lIns="91440" tIns="45720" rIns="91440" bIns="45720" numCol="1" anchor="ctr" anchorCtr="0" compatLnSpc="1">
+            <a:prstTxWarp prst="textNoShape">
+              <a:avLst/>
+            </a:prstTxWarp>
+            <a:spAutoFit/>
+          </a:bodyPr>
+          <a:lstStyle/>
+          <a:p>
+            <a:pPr marL="357188" marR="0" lvl="0" indent="-357188" algn="just" defTabSz="914400" rtl="0" eaLnBrk="0" fontAlgn="base" latinLnBrk="0" hangingPunct="0">
+              <a:lnSpc>
+                <a:spcPct val="150000"/>
+              </a:lnSpc>
+              <a:spcBef>
+                <a:spcPct val="0"/>
+              </a:spcBef>
+              <a:spcAft>
+                <a:spcPct val="0"/>
+              </a:spcAft>
+              <a:buClrTx/>
+              <a:buSzTx/>
+              <a:buFont typeface="Wingdings" panose="05000000000000000000" pitchFamily="2" charset="2"/>
+              <a:buChar char="ü"/>
+              <a:tabLst/>
+            </a:pPr>
+            <a:r>
+              <a:rPr kumimoji="0" lang="en-US" altLang="en-US" sz="2000" b="0" i="0" u="none" strike="noStrike" cap="none" normalizeH="0" baseline="0" dirty="0">
+                <a:ln>
+                  <a:noFill/>
+                </a:ln>
+                <a:solidFill>
+                  <a:schemeClr val="tx1"/>
+                </a:solidFill>
+                <a:effectLst/>
+                <a:latin typeface="+mj-lt"/>
+              </a:rPr>
+              <a:t>Introduce mandatory, role-specific palliative care training for all HCAs. </a:t>
+            </a:r>
+            <a:r>
+              <a:rPr kumimoji="0" lang="en-US" altLang="en-US" sz="2000" b="0" i="1" u="none" strike="noStrike" cap="none" normalizeH="0" baseline="0" dirty="0">
+                <a:ln>
+                  <a:noFill/>
+                </a:ln>
+                <a:solidFill>
+                  <a:schemeClr val="tx1"/>
+                </a:solidFill>
+                <a:effectLst/>
+                <a:latin typeface="+mj-lt"/>
+              </a:rPr>
+              <a:t>Improves competence and reduces role-related stress. </a:t>
+            </a:r>
+          </a:p>
+          <a:p>
+            <a:pPr marL="357188" marR="0" lvl="0" indent="-357188" algn="just" defTabSz="914400" rtl="0" eaLnBrk="0" fontAlgn="base" latinLnBrk="0" hangingPunct="0">
+              <a:lnSpc>
+                <a:spcPct val="150000"/>
+              </a:lnSpc>
+              <a:spcBef>
+                <a:spcPct val="0"/>
+              </a:spcBef>
+              <a:spcAft>
+                <a:spcPct val="0"/>
+              </a:spcAft>
+              <a:buClrTx/>
+              <a:buSzTx/>
+              <a:buFont typeface="Wingdings" panose="05000000000000000000" pitchFamily="2" charset="2"/>
+              <a:buChar char="ü"/>
+              <a:tabLst/>
+            </a:pPr>
+            <a:endParaRPr lang="en-US" altLang="en-US" sz="2000" dirty="0">
+              <a:latin typeface="+mj-lt"/>
+            </a:endParaRPr>
+          </a:p>
+          <a:p>
+            <a:pPr marL="357188" marR="0" lvl="0" indent="-357188" algn="just" defTabSz="914400" rtl="0" eaLnBrk="0" fontAlgn="base" latinLnBrk="0" hangingPunct="0">
+              <a:lnSpc>
+                <a:spcPct val="150000"/>
+              </a:lnSpc>
+              <a:spcBef>
+                <a:spcPct val="0"/>
+              </a:spcBef>
+              <a:spcAft>
+                <a:spcPct val="0"/>
+              </a:spcAft>
+              <a:buClrTx/>
+              <a:buSzTx/>
+              <a:buFont typeface="Wingdings" panose="05000000000000000000" pitchFamily="2" charset="2"/>
+              <a:buChar char="ü"/>
+              <a:tabLst/>
+            </a:pPr>
+            <a:endParaRPr kumimoji="0" lang="en-US" altLang="en-US" sz="2000" b="0" i="0" u="none" strike="noStrike" cap="none" normalizeH="0" baseline="0" dirty="0">
+              <a:ln>
+                <a:noFill/>
+              </a:ln>
+              <a:solidFill>
+                <a:schemeClr val="tx1"/>
+              </a:solidFill>
+              <a:effectLst/>
+              <a:latin typeface="+mj-lt"/>
+            </a:endParaRPr>
+          </a:p>
+          <a:p>
+            <a:pPr marL="357188" marR="0" lvl="0" indent="-357188" algn="just" defTabSz="914400" rtl="0" eaLnBrk="0" fontAlgn="base" latinLnBrk="0" hangingPunct="0">
+              <a:lnSpc>
+                <a:spcPct val="150000"/>
+              </a:lnSpc>
+              <a:spcBef>
+                <a:spcPct val="0"/>
+              </a:spcBef>
+              <a:spcAft>
+                <a:spcPct val="0"/>
+              </a:spcAft>
+              <a:buClrTx/>
+              <a:buSzTx/>
+              <a:buFont typeface="Wingdings" panose="05000000000000000000" pitchFamily="2" charset="2"/>
+              <a:buChar char="ü"/>
+              <a:tabLst/>
+            </a:pPr>
+            <a:r>
+              <a:rPr kumimoji="0" lang="en-US" altLang="en-US" sz="2000" b="0" i="0" u="none" strike="noStrike" cap="none" normalizeH="0" baseline="0" dirty="0">
+                <a:ln>
+                  <a:noFill/>
+                </a:ln>
+                <a:solidFill>
+                  <a:schemeClr val="tx1"/>
+                </a:solidFill>
+                <a:effectLst/>
+                <a:latin typeface="+mj-lt"/>
+              </a:rPr>
+              <a:t>Establish structured emotional support systems, including peer debriefs and access to counselling. </a:t>
+            </a:r>
+            <a:r>
+              <a:rPr kumimoji="0" lang="en-US" altLang="en-US" sz="2000" b="0" i="1" u="none" strike="noStrike" cap="none" normalizeH="0" baseline="0" dirty="0">
+                <a:ln>
+                  <a:noFill/>
+                </a:ln>
+                <a:solidFill>
+                  <a:schemeClr val="tx1"/>
+                </a:solidFill>
+                <a:effectLst/>
+                <a:latin typeface="+mj-lt"/>
+              </a:rPr>
+              <a:t>Reduces burnout and emotional fatigue.</a:t>
+            </a:r>
+          </a:p>
+        </p:txBody>
+      </p:sp>
+    </p:spTree>
+    <p:extLst>
+      <p:ext uri="{BB962C8B-B14F-4D97-AF65-F5344CB8AC3E}">
+        <p14:creationId xmlns:p14="http://schemas.microsoft.com/office/powerpoint/2010/main" val="1709189946"/>
+      </p:ext>
+    </p:extLst>
+  </p:cSld>
+  <p:clrMapOvr>
+    <a:masterClrMapping/>
+  </p:clrMapOvr>
+</p:sld>
+</file>
+
+<file path=ppt/slides/slide9.xml><?xml version="1.0" encoding="utf-8"?>
+<p:sld xmlns:a="http://schemas.openxmlformats.org/drawingml/2006/main" xmlns:r="http://schemas.openxmlformats.org/officeDocument/2006/relationships" xmlns:p="http://schemas.openxmlformats.org/presentationml/2006/main">
+  <p:cSld>
+    <p:spTree>
+      <p:nvGrpSpPr>
+        <p:cNvPr id="1" name="">
+          <a:extLst>
+            <a:ext uri="{FF2B5EF4-FFF2-40B4-BE49-F238E27FC236}">
+              <a16:creationId xmlns:a16="http://schemas.microsoft.com/office/drawing/2014/main" id="{4BEE58B9-066C-BC6B-E074-8FBA6AD6A9DE}"/>
+            </a:ext>
+          </a:extLst>
+        </p:cNvPr>
+        <p:cNvGrpSpPr/>
+        <p:nvPr/>
+      </p:nvGrpSpPr>
+      <p:grpSpPr>
+        <a:xfrm>
+          <a:off x="0" y="0"/>
+          <a:ext cx="0" cy="0"/>
+          <a:chOff x="0" y="0"/>
+          <a:chExt cx="0" cy="0"/>
+        </a:xfrm>
+      </p:grpSpPr>
+      <p:sp>
+        <p:nvSpPr>
+          <p:cNvPr id="3" name="TextBox 2">
+            <a:extLst>
+              <a:ext uri="{FF2B5EF4-FFF2-40B4-BE49-F238E27FC236}">
+                <a16:creationId xmlns:a16="http://schemas.microsoft.com/office/drawing/2014/main" id="{48AD876A-D9C9-F186-7E4B-B04AE2D0024E}"/>
+              </a:ext>
+            </a:extLst>
+          </p:cNvPr>
+          <p:cNvSpPr txBox="1"/>
+          <p:nvPr/>
+        </p:nvSpPr>
+        <p:spPr>
+          <a:xfrm>
+            <a:off x="923364" y="681335"/>
+            <a:ext cx="4204448" cy="584775"/>
+          </a:xfrm>
+          <a:prstGeom prst="rect">
+            <a:avLst/>
+          </a:prstGeom>
+          <a:noFill/>
+        </p:spPr>
+        <p:txBody>
+          <a:bodyPr wrap="square">
+            <a:spAutoFit/>
+          </a:bodyPr>
+          <a:lstStyle/>
+          <a:p>
+            <a:r>
+              <a:rPr lang="en-US" sz="3200" b="1" dirty="0"/>
+              <a:t>Recommendations</a:t>
+            </a:r>
+            <a:endParaRPr lang="en-GB" sz="3200" b="1" noProof="0" dirty="0"/>
+          </a:p>
+        </p:txBody>
+      </p:sp>
+      <p:sp>
+        <p:nvSpPr>
+          <p:cNvPr id="4" name="Rectangle 3">
+            <a:extLst>
+              <a:ext uri="{FF2B5EF4-FFF2-40B4-BE49-F238E27FC236}">
+                <a16:creationId xmlns:a16="http://schemas.microsoft.com/office/drawing/2014/main" id="{D3F8526A-08DC-9AAD-69AC-7A68E98B1D1B}"/>
+              </a:ext>
+            </a:extLst>
+          </p:cNvPr>
+          <p:cNvSpPr/>
+          <p:nvPr/>
+        </p:nvSpPr>
+        <p:spPr>
+          <a:xfrm>
+            <a:off x="1066799" y="1357246"/>
+            <a:ext cx="1004047" cy="125506"/>
+          </a:xfrm>
+          <a:prstGeom prst="rect">
+            <a:avLst/>
+          </a:prstGeom>
+          <a:ln>
+            <a:noFill/>
+          </a:ln>
+        </p:spPr>
+        <p:style>
+          <a:lnRef idx="2">
+            <a:schemeClr val="accent2">
+              <a:shade val="15000"/>
+            </a:schemeClr>
+          </a:lnRef>
+          <a:fillRef idx="1">
+            <a:schemeClr val="accent2"/>
+          </a:fillRef>
+          <a:effectRef idx="0">
+            <a:schemeClr val="accent2"/>
+          </a:effectRef>
+          <a:fontRef idx="minor">
+            <a:schemeClr val="lt1"/>
+          </a:fontRef>
+        </p:style>
+        <p:txBody>
+          <a:bodyPr rtlCol="0" anchor="ctr"/>
+          <a:lstStyle/>
+          <a:p>
+            <a:pPr algn="ctr"/>
+            <a:endParaRPr lang="en-GB" noProof="0" dirty="0"/>
+          </a:p>
+        </p:txBody>
+      </p:sp>
+      <p:sp>
+        <p:nvSpPr>
+          <p:cNvPr id="2" name="Rectangle 1">
+            <a:extLst>
+              <a:ext uri="{FF2B5EF4-FFF2-40B4-BE49-F238E27FC236}">
+                <a16:creationId xmlns:a16="http://schemas.microsoft.com/office/drawing/2014/main" id="{B66269B7-9D3D-EAD1-A75F-761F9E8365B3}"/>
+              </a:ext>
+            </a:extLst>
+          </p:cNvPr>
+          <p:cNvSpPr>
+            <a:spLocks noChangeArrowheads="1"/>
+          </p:cNvSpPr>
+          <p:nvPr/>
+        </p:nvSpPr>
+        <p:spPr bwMode="auto">
+          <a:xfrm>
+            <a:off x="1066799" y="2363170"/>
+            <a:ext cx="10139083" cy="2817951"/>
+          </a:xfrm>
+          <a:prstGeom prst="rect">
+            <a:avLst/>
+          </a:prstGeom>
+          <a:noFill/>
+          <a:ln>
+            <a:noFill/>
+          </a:ln>
+          <a:effectLst/>
+          <a:extLst>
+            <a:ext uri="{909E8E84-426E-40DD-AFC4-6F175D3DCCD1}">
+              <a14:hiddenFill xmlns:a14="http://schemas.microsoft.com/office/drawing/2010/main">
+                <a:solidFill>
+                  <a:schemeClr val="accent1"/>
+                </a:solidFill>
+              </a14:hiddenFill>
+            </a:ext>
+            <a:ext uri="{91240B29-F687-4F45-9708-019B960494DF}">
+              <a14:hiddenLine xmlns:a14="http://schemas.microsoft.com/office/drawing/2010/main" w="9525">
+                <a:solidFill>
+                  <a:schemeClr val="tx1"/>
+                </a:solidFill>
+                <a:miter lim="800000"/>
+                <a:headEnd/>
+                <a:tailEnd/>
+              </a14:hiddenLine>
+            </a:ext>
+            <a:ext uri="{AF507438-7753-43E0-B8FC-AC1667EBCBE1}">
+              <a14:hiddenEffects xmlns:a14="http://schemas.microsoft.com/office/drawing/2010/main">
+                <a:effectLst>
+                  <a:outerShdw dist="35921" dir="2700000" algn="ctr" rotWithShape="0">
+                    <a:schemeClr val="bg2"/>
+                  </a:outerShdw>
+                </a:effectLst>
+              </a14:hiddenEffects>
+            </a:ext>
+          </a:extLst>
+        </p:spPr>
+        <p:txBody>
+          <a:bodyPr vert="horz" wrap="square" lIns="91440" tIns="45720" rIns="91440" bIns="45720" numCol="1" anchor="ctr" anchorCtr="0" compatLnSpc="1">
+            <a:prstTxWarp prst="textNoShape">
+              <a:avLst/>
+            </a:prstTxWarp>
+            <a:spAutoFit/>
+          </a:bodyPr>
+          <a:lstStyle/>
+          <a:p>
+            <a:pPr marL="357188" marR="0" lvl="0" indent="-357188" algn="just" defTabSz="914400" rtl="0" eaLnBrk="0" fontAlgn="base" latinLnBrk="0" hangingPunct="0">
+              <a:lnSpc>
+                <a:spcPct val="150000"/>
+              </a:lnSpc>
+              <a:spcBef>
+                <a:spcPct val="0"/>
+              </a:spcBef>
+              <a:spcAft>
+                <a:spcPct val="0"/>
+              </a:spcAft>
+              <a:buClrTx/>
+              <a:buSzTx/>
+              <a:buFont typeface="Wingdings" panose="05000000000000000000" pitchFamily="2" charset="2"/>
+              <a:buChar char="ü"/>
+              <a:tabLst/>
+            </a:pPr>
+            <a:r>
+              <a:rPr kumimoji="0" lang="en-US" altLang="en-US" sz="2000" b="0" i="0" u="none" strike="noStrike" cap="none" normalizeH="0" baseline="0" dirty="0">
+                <a:ln>
+                  <a:noFill/>
+                </a:ln>
+                <a:solidFill>
+                  <a:schemeClr val="tx1"/>
+                </a:solidFill>
+                <a:effectLst/>
+                <a:latin typeface="+mj-lt"/>
+              </a:rPr>
+              <a:t>Ensure HCA representation in care team communications and decision-making processes. </a:t>
+            </a:r>
+            <a:r>
+              <a:rPr kumimoji="0" lang="en-US" altLang="en-US" sz="2000" b="0" i="1" u="none" strike="noStrike" cap="none" normalizeH="0" baseline="0" dirty="0">
+                <a:ln>
+                  <a:noFill/>
+                </a:ln>
+                <a:solidFill>
+                  <a:schemeClr val="tx1"/>
+                </a:solidFill>
+                <a:effectLst/>
+                <a:latin typeface="+mj-lt"/>
+              </a:rPr>
+              <a:t>Promotes effective monitoring and early intervention.</a:t>
+            </a:r>
+            <a:endParaRPr lang="en-US" altLang="en-US" sz="2000" i="1" dirty="0">
+              <a:latin typeface="+mj-lt"/>
+            </a:endParaRPr>
+          </a:p>
+          <a:p>
+            <a:pPr marL="357188" marR="0" lvl="0" indent="-357188" algn="just" defTabSz="914400" rtl="0" eaLnBrk="0" fontAlgn="base" latinLnBrk="0" hangingPunct="0">
+              <a:lnSpc>
+                <a:spcPct val="150000"/>
+              </a:lnSpc>
+              <a:spcBef>
+                <a:spcPct val="0"/>
+              </a:spcBef>
+              <a:spcAft>
+                <a:spcPct val="0"/>
+              </a:spcAft>
+              <a:buClrTx/>
+              <a:buSzTx/>
+              <a:buFont typeface="Wingdings" panose="05000000000000000000" pitchFamily="2" charset="2"/>
+              <a:buChar char="ü"/>
+              <a:tabLst/>
+            </a:pPr>
+            <a:endParaRPr kumimoji="0" lang="en-US" altLang="en-US" sz="2000" b="0" i="0" u="none" strike="noStrike" cap="none" normalizeH="0" baseline="0" dirty="0">
+              <a:ln>
+                <a:noFill/>
+              </a:ln>
+              <a:solidFill>
+                <a:schemeClr val="tx1"/>
+              </a:solidFill>
+              <a:effectLst/>
+              <a:latin typeface="+mj-lt"/>
+            </a:endParaRPr>
+          </a:p>
+          <a:p>
+            <a:pPr marR="0" lvl="0" algn="just" defTabSz="914400" rtl="0" eaLnBrk="0" fontAlgn="base" latinLnBrk="0" hangingPunct="0">
+              <a:lnSpc>
+                <a:spcPct val="150000"/>
+              </a:lnSpc>
+              <a:spcBef>
+                <a:spcPct val="0"/>
+              </a:spcBef>
+              <a:spcAft>
+                <a:spcPct val="0"/>
+              </a:spcAft>
+              <a:buClrTx/>
+              <a:buSzTx/>
+              <a:tabLst/>
+            </a:pPr>
+            <a:endParaRPr kumimoji="0" lang="en-US" altLang="en-US" sz="2000" b="0" i="0" u="none" strike="noStrike" cap="none" normalizeH="0" baseline="0" dirty="0">
+              <a:ln>
+                <a:noFill/>
+              </a:ln>
+              <a:solidFill>
+                <a:schemeClr val="tx1"/>
+              </a:solidFill>
+              <a:effectLst/>
+              <a:latin typeface="+mj-lt"/>
+            </a:endParaRPr>
+          </a:p>
+          <a:p>
+            <a:pPr marL="357188" marR="0" lvl="0" indent="-357188" algn="just" defTabSz="914400" rtl="0" eaLnBrk="0" fontAlgn="base" latinLnBrk="0" hangingPunct="0">
+              <a:lnSpc>
+                <a:spcPct val="150000"/>
+              </a:lnSpc>
+              <a:spcBef>
+                <a:spcPct val="0"/>
+              </a:spcBef>
+              <a:spcAft>
+                <a:spcPct val="0"/>
+              </a:spcAft>
+              <a:buClrTx/>
+              <a:buSzTx/>
+              <a:buFont typeface="Wingdings" panose="05000000000000000000" pitchFamily="2" charset="2"/>
+              <a:buChar char="ü"/>
+              <a:tabLst/>
+            </a:pPr>
+            <a:r>
+              <a:rPr kumimoji="0" lang="en-US" altLang="en-US" sz="2000" b="0" i="0" u="none" strike="noStrike" cap="none" normalizeH="0" baseline="0" dirty="0" err="1">
+                <a:ln>
+                  <a:noFill/>
+                </a:ln>
+                <a:solidFill>
+                  <a:schemeClr val="tx1"/>
+                </a:solidFill>
+                <a:effectLst/>
+                <a:latin typeface="+mj-lt"/>
+              </a:rPr>
+              <a:t>Recognise</a:t>
+            </a:r>
+            <a:r>
+              <a:rPr kumimoji="0" lang="en-US" altLang="en-US" sz="2000" b="0" i="0" u="none" strike="noStrike" cap="none" normalizeH="0" baseline="0" dirty="0">
+                <a:ln>
+                  <a:noFill/>
+                </a:ln>
+                <a:solidFill>
+                  <a:schemeClr val="tx1"/>
+                </a:solidFill>
+                <a:effectLst/>
+                <a:latin typeface="+mj-lt"/>
+              </a:rPr>
+              <a:t> and formally integrate HCAs’ role in care plans through policy and regulation. </a:t>
+            </a:r>
+            <a:r>
+              <a:rPr kumimoji="0" lang="en-US" altLang="en-US" sz="2000" b="0" i="1" u="none" strike="noStrike" cap="none" normalizeH="0" baseline="0" dirty="0">
+                <a:ln>
+                  <a:noFill/>
+                </a:ln>
+                <a:solidFill>
+                  <a:schemeClr val="tx1"/>
+                </a:solidFill>
+                <a:effectLst/>
+                <a:latin typeface="+mj-lt"/>
+              </a:rPr>
+              <a:t>Enhances motivation, retention, and patient satisfaction.</a:t>
+            </a:r>
+          </a:p>
+        </p:txBody>
+      </p:sp>
+    </p:spTree>
+    <p:extLst>
+      <p:ext uri="{BB962C8B-B14F-4D97-AF65-F5344CB8AC3E}">
+        <p14:creationId xmlns:p14="http://schemas.microsoft.com/office/powerpoint/2010/main" val="952987059"/>
       </p:ext>
     </p:extLst>
   </p:cSld>
@@ -3647,4 +8138,319 @@
     </a:ext>
   </a:extLst>
 </a:theme>
+</file>
+
+<file path=ppt/theme/theme2.xml><?xml version="1.0" encoding="utf-8"?>
+<a:theme xmlns:a="http://schemas.openxmlformats.org/drawingml/2006/main" name="Office Theme">
+  <a:themeElements>
+    <a:clrScheme name="Office">
+      <a:dk1>
+        <a:sysClr val="windowText" lastClr="000000"/>
+      </a:dk1>
+      <a:lt1>
+        <a:sysClr val="window" lastClr="FFFFFF"/>
+      </a:lt1>
+      <a:dk2>
+        <a:srgbClr val="0E2841"/>
+      </a:dk2>
+      <a:lt2>
+        <a:srgbClr val="E8E8E8"/>
+      </a:lt2>
+      <a:accent1>
+        <a:srgbClr val="156082"/>
+      </a:accent1>
+      <a:accent2>
+        <a:srgbClr val="E97132"/>
+      </a:accent2>
+      <a:accent3>
+        <a:srgbClr val="196B24"/>
+      </a:accent3>
+      <a:accent4>
+        <a:srgbClr val="0F9ED5"/>
+      </a:accent4>
+      <a:accent5>
+        <a:srgbClr val="A02B93"/>
+      </a:accent5>
+      <a:accent6>
+        <a:srgbClr val="4EA72E"/>
+      </a:accent6>
+      <a:hlink>
+        <a:srgbClr val="467886"/>
+      </a:hlink>
+      <a:folHlink>
+        <a:srgbClr val="96607D"/>
+      </a:folHlink>
+    </a:clrScheme>
+    <a:fontScheme name="Office">
+      <a:majorFont>
+        <a:latin typeface="Aptos Display" panose="02110004020202020204"/>
+        <a:ea typeface=""/>
+        <a:cs typeface=""/>
+        <a:font script="Jpan" typeface="游ゴシック Light"/>
+        <a:font script="Hang" typeface="맑은 고딕"/>
+        <a:font script="Hans" typeface="等线 Light"/>
+        <a:font script="Hant" typeface="新細明體"/>
+        <a:font script="Arab" typeface="Times New Roman"/>
+        <a:font script="Hebr" typeface="Times New Roman"/>
+        <a:font script="Thai" typeface="Angsana New"/>
+        <a:font script="Ethi" typeface="Nyala"/>
+        <a:font script="Beng" typeface="Vrinda"/>
+        <a:font script="Gujr" typeface="Shruti"/>
+        <a:font script="Khmr" typeface="MoolBoran"/>
+        <a:font script="Knda" typeface="Tunga"/>
+        <a:font script="Guru" typeface="Raavi"/>
+        <a:font script="Cans" typeface="Euphemia"/>
+        <a:font script="Cher" typeface="Plantagenet Cherokee"/>
+        <a:font script="Yiii" typeface="Microsoft Yi Baiti"/>
+        <a:font script="Tibt" typeface="Microsoft Himalaya"/>
+        <a:font script="Thaa" typeface="MV Boli"/>
+        <a:font script="Deva" typeface="Mangal"/>
+        <a:font script="Telu" typeface="Gautami"/>
+        <a:font script="Taml" typeface="Latha"/>
+        <a:font script="Syrc" typeface="Estrangelo Edessa"/>
+        <a:font script="Orya" typeface="Kalinga"/>
+        <a:font script="Mlym" typeface="Kartika"/>
+        <a:font script="Laoo" typeface="DokChampa"/>
+        <a:font script="Sinh" typeface="Iskoola Pota"/>
+        <a:font script="Mong" typeface="Mongolian Baiti"/>
+        <a:font script="Viet" typeface="Times New Roman"/>
+        <a:font script="Uigh" typeface="Microsoft Uighur"/>
+        <a:font script="Geor" typeface="Sylfaen"/>
+        <a:font script="Armn" typeface="Arial"/>
+        <a:font script="Bugi" typeface="Leelawadee UI"/>
+        <a:font script="Bopo" typeface="Microsoft JhengHei"/>
+        <a:font script="Java" typeface="Javanese Text"/>
+        <a:font script="Lisu" typeface="Segoe UI"/>
+        <a:font script="Mymr" typeface="Myanmar Text"/>
+        <a:font script="Nkoo" typeface="Ebrima"/>
+        <a:font script="Olck" typeface="Nirmala UI"/>
+        <a:font script="Osma" typeface="Ebrima"/>
+        <a:font script="Phag" typeface="Phagspa"/>
+        <a:font script="Syrn" typeface="Estrangelo Edessa"/>
+        <a:font script="Syrj" typeface="Estrangelo Edessa"/>
+        <a:font script="Syre" typeface="Estrangelo Edessa"/>
+        <a:font script="Sora" typeface="Nirmala UI"/>
+        <a:font script="Tale" typeface="Microsoft Tai Le"/>
+        <a:font script="Talu" typeface="Microsoft New Tai Lue"/>
+        <a:font script="Tfng" typeface="Ebrima"/>
+      </a:majorFont>
+      <a:minorFont>
+        <a:latin typeface="Aptos" panose="02110004020202020204"/>
+        <a:ea typeface=""/>
+        <a:cs typeface=""/>
+        <a:font script="Jpan" typeface="游ゴシック"/>
+        <a:font script="Hang" typeface="맑은 고딕"/>
+        <a:font script="Hans" typeface="等线"/>
+        <a:font script="Hant" typeface="新細明體"/>
+        <a:font script="Arab" typeface="Arial"/>
+        <a:font script="Hebr" typeface="Arial"/>
+        <a:font script="Thai" typeface="Cordia New"/>
+        <a:font script="Ethi" typeface="Nyala"/>
+        <a:font script="Beng" typeface="Vrinda"/>
+        <a:font script="Gujr" typeface="Shruti"/>
+        <a:font script="Khmr" typeface="DaunPenh"/>
+        <a:font script="Knda" typeface="Tunga"/>
+        <a:font script="Guru" typeface="Raavi"/>
+        <a:font script="Cans" typeface="Euphemia"/>
+        <a:font script="Cher" typeface="Plantagenet Cherokee"/>
+        <a:font script="Yiii" typeface="Microsoft Yi Baiti"/>
+        <a:font script="Tibt" typeface="Microsoft Himalaya"/>
+        <a:font script="Thaa" typeface="MV Boli"/>
+        <a:font script="Deva" typeface="Mangal"/>
+        <a:font script="Telu" typeface="Gautami"/>
+        <a:font script="Taml" typeface="Latha"/>
+        <a:font script="Syrc" typeface="Estrangelo Edessa"/>
+        <a:font script="Orya" typeface="Kalinga"/>
+        <a:font script="Mlym" typeface="Kartika"/>
+        <a:font script="Laoo" typeface="DokChampa"/>
+        <a:font script="Sinh" typeface="Iskoola Pota"/>
+        <a:font script="Mong" typeface="Mongolian Baiti"/>
+        <a:font script="Viet" typeface="Arial"/>
+        <a:font script="Uigh" typeface="Microsoft Uighur"/>
+        <a:font script="Geor" typeface="Sylfaen"/>
+        <a:font script="Armn" typeface="Arial"/>
+        <a:font script="Bugi" typeface="Leelawadee UI"/>
+        <a:font script="Bopo" typeface="Microsoft JhengHei"/>
+        <a:font script="Java" typeface="Javanese Text"/>
+        <a:font script="Lisu" typeface="Segoe UI"/>
+        <a:font script="Mymr" typeface="Myanmar Text"/>
+        <a:font script="Nkoo" typeface="Ebrima"/>
+        <a:font script="Olck" typeface="Nirmala UI"/>
+        <a:font script="Osma" typeface="Ebrima"/>
+        <a:font script="Phag" typeface="Phagspa"/>
+        <a:font script="Syrn" typeface="Estrangelo Edessa"/>
+        <a:font script="Syrj" typeface="Estrangelo Edessa"/>
+        <a:font script="Syre" typeface="Estrangelo Edessa"/>
+        <a:font script="Sora" typeface="Nirmala UI"/>
+        <a:font script="Tale" typeface="Microsoft Tai Le"/>
+        <a:font script="Talu" typeface="Microsoft New Tai Lue"/>
+        <a:font script="Tfng" typeface="Ebrima"/>
+      </a:minorFont>
+    </a:fontScheme>
+    <a:fmtScheme name="Office">
+      <a:fillStyleLst>
+        <a:solidFill>
+          <a:schemeClr val="phClr"/>
+        </a:solidFill>
+        <a:gradFill rotWithShape="1">
+          <a:gsLst>
+            <a:gs pos="0">
+              <a:schemeClr val="phClr">
+                <a:lumMod val="110000"/>
+                <a:satMod val="105000"/>
+                <a:tint val="67000"/>
+              </a:schemeClr>
+            </a:gs>
+            <a:gs pos="50000">
+              <a:schemeClr val="phClr">
+                <a:lumMod val="105000"/>
+                <a:satMod val="103000"/>
+                <a:tint val="73000"/>
+              </a:schemeClr>
+            </a:gs>
+            <a:gs pos="100000">
+              <a:schemeClr val="phClr">
+                <a:lumMod val="105000"/>
+                <a:satMod val="109000"/>
+                <a:tint val="81000"/>
+              </a:schemeClr>
+            </a:gs>
+          </a:gsLst>
+          <a:lin ang="5400000" scaled="0"/>
+        </a:gradFill>
+        <a:gradFill rotWithShape="1">
+          <a:gsLst>
+            <a:gs pos="0">
+              <a:schemeClr val="phClr">
+                <a:satMod val="103000"/>
+                <a:lumMod val="102000"/>
+                <a:tint val="94000"/>
+              </a:schemeClr>
+            </a:gs>
+            <a:gs pos="50000">
+              <a:schemeClr val="phClr">
+                <a:satMod val="110000"/>
+                <a:lumMod val="100000"/>
+                <a:shade val="100000"/>
+              </a:schemeClr>
+            </a:gs>
+            <a:gs pos="100000">
+              <a:schemeClr val="phClr">
+                <a:lumMod val="99000"/>
+                <a:satMod val="120000"/>
+                <a:shade val="78000"/>
+              </a:schemeClr>
+            </a:gs>
+          </a:gsLst>
+          <a:lin ang="5400000" scaled="0"/>
+        </a:gradFill>
+      </a:fillStyleLst>
+      <a:lnStyleLst>
+        <a:ln w="12700" cap="flat" cmpd="sng" algn="ctr">
+          <a:solidFill>
+            <a:schemeClr val="phClr"/>
+          </a:solidFill>
+          <a:prstDash val="solid"/>
+          <a:miter lim="800000"/>
+        </a:ln>
+        <a:ln w="19050" cap="flat" cmpd="sng" algn="ctr">
+          <a:solidFill>
+            <a:schemeClr val="phClr"/>
+          </a:solidFill>
+          <a:prstDash val="solid"/>
+          <a:miter lim="800000"/>
+        </a:ln>
+        <a:ln w="25400" cap="flat" cmpd="sng" algn="ctr">
+          <a:solidFill>
+            <a:schemeClr val="phClr"/>
+          </a:solidFill>
+          <a:prstDash val="solid"/>
+          <a:miter lim="800000"/>
+        </a:ln>
+      </a:lnStyleLst>
+      <a:effectStyleLst>
+        <a:effectStyle>
+          <a:effectLst/>
+        </a:effectStyle>
+        <a:effectStyle>
+          <a:effectLst/>
+        </a:effectStyle>
+        <a:effectStyle>
+          <a:effectLst>
+            <a:outerShdw blurRad="57150" dist="19050" dir="5400000" algn="ctr" rotWithShape="0">
+              <a:srgbClr val="000000">
+                <a:alpha val="63000"/>
+              </a:srgbClr>
+            </a:outerShdw>
+          </a:effectLst>
+        </a:effectStyle>
+      </a:effectStyleLst>
+      <a:bgFillStyleLst>
+        <a:solidFill>
+          <a:schemeClr val="phClr"/>
+        </a:solidFill>
+        <a:solidFill>
+          <a:schemeClr val="phClr">
+            <a:tint val="95000"/>
+            <a:satMod val="170000"/>
+          </a:schemeClr>
+        </a:solidFill>
+        <a:gradFill rotWithShape="1">
+          <a:gsLst>
+            <a:gs pos="0">
+              <a:schemeClr val="phClr">
+                <a:tint val="93000"/>
+                <a:satMod val="150000"/>
+                <a:shade val="98000"/>
+                <a:lumMod val="102000"/>
+              </a:schemeClr>
+            </a:gs>
+            <a:gs pos="50000">
+              <a:schemeClr val="phClr">
+                <a:tint val="98000"/>
+                <a:satMod val="130000"/>
+                <a:shade val="90000"/>
+                <a:lumMod val="103000"/>
+              </a:schemeClr>
+            </a:gs>
+            <a:gs pos="100000">
+              <a:schemeClr val="phClr">
+                <a:shade val="63000"/>
+                <a:satMod val="120000"/>
+              </a:schemeClr>
+            </a:gs>
+          </a:gsLst>
+          <a:lin ang="5400000" scaled="0"/>
+        </a:gradFill>
+      </a:bgFillStyleLst>
+    </a:fmtScheme>
+  </a:themeElements>
+  <a:objectDefaults>
+    <a:lnDef>
+      <a:spPr/>
+      <a:bodyPr/>
+      <a:lstStyle/>
+      <a:style>
+        <a:lnRef idx="2">
+          <a:schemeClr val="accent1"/>
+        </a:lnRef>
+        <a:fillRef idx="0">
+          <a:schemeClr val="accent1"/>
+        </a:fillRef>
+        <a:effectRef idx="1">
+          <a:schemeClr val="accent1"/>
+        </a:effectRef>
+        <a:fontRef idx="minor">
+          <a:schemeClr val="tx1"/>
+        </a:fontRef>
+      </a:style>
+    </a:lnDef>
+  </a:objectDefaults>
+  <a:extraClrSchemeLst/>
+  <a:extLst>
+    <a:ext uri="{05A4C25C-085E-4340-85A3-A5531E510DB2}">
+      <thm15:themeFamily xmlns:thm15="http://schemas.microsoft.com/office/thememl/2012/main" name="Office Theme" id="{2E142A2C-CD16-42D6-873A-C26D2A0506FA}" vid="{1BDDFF52-6CD6-40A5-AB3C-68EB2F1E4D0A}"/>
+    </a:ext>
+  </a:extLst>
+</a:theme>
 </file>
</xml_diff>